<commit_message>
Updates for SC23 to DavidR's presentations
</commit_message>
<xml_diff>
--- a/design-a.pptx
+++ b/design-a.pptx
@@ -12,7 +12,7 @@
   </p:handoutMasterIdLst>
   <p:sldIdLst>
     <p:sldId id="318" r:id="rId5"/>
-    <p:sldId id="5601" r:id="rId6"/>
+    <p:sldId id="320" r:id="rId6"/>
     <p:sldId id="5590" r:id="rId7"/>
     <p:sldId id="5577" r:id="rId8"/>
     <p:sldId id="5591" r:id="rId9"/>
@@ -284,7 +284,7 @@
           <a:p>
             <a:fld id="{0B842F42-2CE9-4E35-95C1-410DC08A50B1}" type="datetimeFigureOut">
               <a:rPr lang="en-US" smtClean="0"/>
-              <a:t>7/28/2023</a:t>
+              <a:t>10/27/2023</a:t>
             </a:fld>
             <a:endParaRPr lang="en-US"/>
           </a:p>
@@ -449,7 +449,7 @@
           <a:p>
             <a:fld id="{6F282904-F315-4730-8D91-37D99E141A6F}" type="datetimeFigureOut">
               <a:rPr lang="en-US" smtClean="0"/>
-              <a:t>7/28/2023</a:t>
+              <a:t>10/27/2023</a:t>
             </a:fld>
             <a:endParaRPr lang="en-US"/>
           </a:p>
@@ -3769,7 +3769,7 @@
           <a:p>
             <a:fld id="{68F49DD1-DDB5-AB43-B311-7649AD474C82}" type="datetimeFigureOut">
               <a:rPr lang="en-US" smtClean="0"/>
-              <a:t>7/28/2023</a:t>
+              <a:t>10/27/2023</a:t>
             </a:fld>
             <a:endParaRPr lang="en-US"/>
           </a:p>
@@ -4665,12 +4665,8 @@
           <a:lstStyle/>
           <a:p>
             <a:r>
-              <a:rPr lang="en-US" u="sng" dirty="0" err="1"/>
-              <a:t>Anshu</a:t>
-            </a:r>
-            <a:r>
               <a:rPr lang="en-US" u="sng" dirty="0"/>
-              <a:t> Dubey</a:t>
+              <a:t>David M. Rogers</a:t>
             </a:r>
             <a:r>
               <a:rPr lang="en-US" dirty="0"/>
@@ -4678,16 +4674,40 @@
             </a:r>
             <a:r>
               <a:rPr lang="en-US" sz="2000" dirty="0"/>
-              <a:t>(she/her)</a:t>
+              <a:t>(he/him)</a:t>
             </a:r>
             <a:br>
               <a:rPr lang="en-US" sz="2000" dirty="0"/>
             </a:br>
             <a:r>
               <a:rPr lang="en-US" sz="2000" dirty="0"/>
-              <a:t>Argonne National Laboratory</a:t>
-            </a:r>
+              <a:t>Oak Ridge National Laboratory</a:t>
+            </a:r>
+          </a:p>
+          <a:p>
             <a:endParaRPr lang="en-US" dirty="0"/>
+          </a:p>
+          <a:p>
+            <a:r>
+              <a:rPr lang="en-US" sz="2000" b="0" i="0" dirty="0">
+                <a:solidFill>
+                  <a:srgbClr val="111111"/>
+                </a:solidFill>
+                <a:effectLst/>
+                <a:latin typeface="+mn-lt"/>
+              </a:rPr>
+              <a:t>Better Software for Reproducible Science tutorial</a:t>
+            </a:r>
+            <a:r>
+              <a:rPr lang="en-US" sz="2000" dirty="0">
+                <a:latin typeface="+mn-lt"/>
+              </a:rPr>
+              <a:t> </a:t>
+            </a:r>
+            <a:r>
+              <a:rPr lang="en-US" sz="2000" dirty="0"/>
+              <a:t>@ SC23</a:t>
+            </a:r>
           </a:p>
           <a:p>
             <a:pPr>
@@ -4697,26 +4717,7 @@
             </a:pPr>
             <a:r>
               <a:rPr lang="en-US" sz="2000" dirty="0"/>
-              <a:t>Better Scientific Software tutorial @ NOAA Global Systems Laboratory</a:t>
-            </a:r>
-          </a:p>
-          <a:p>
-            <a:pPr>
-              <a:spcBef>
-                <a:spcPts val="2800"/>
-              </a:spcBef>
-            </a:pPr>
-            <a:r>
-              <a:rPr lang="en-US" sz="2000" dirty="0"/>
-              <a:t>Contributors: Anshu Dubey (ANL), Mark C. Miller (LLNL), David </a:t>
-            </a:r>
-            <a:r>
-              <a:rPr lang="en-US" sz="2000" dirty="0" err="1"/>
-              <a:t>Bernholdt</a:t>
-            </a:r>
-            <a:r>
-              <a:rPr lang="en-US" sz="2000" dirty="0"/>
-              <a:t> (ORNL)</a:t>
+              <a:t>Contributors: Anshu Dubey (ANL), Mark C. Miller (LLNL), David Bernholdt (ORNL), David M. Rogers (ORNL)</a:t>
             </a:r>
           </a:p>
         </p:txBody>
@@ -6524,7 +6525,7 @@
           <a:noFill/>
           <a:extLst>
             <a:ext uri="{909E8E84-426E-40dd-AFC4-6F175D3DCCD1}">
-              <a14:hiddenFill xmlns:a14="http://schemas.microsoft.com/office/drawing/2010/main" xmlns="">
+              <a14:hiddenFill xmlns="" xmlns:a14="http://schemas.microsoft.com/office/drawing/2010/main">
                 <a:solidFill>
                   <a:srgbClr val="FFFFFF"/>
                 </a:solidFill>
@@ -10678,9 +10679,9 @@
                   <a:srgbClr val="111111"/>
                 </a:solidFill>
                 <a:effectLst/>
-                <a:latin typeface="+mj-lt"/>
+                <a:latin typeface="+mn-lt"/>
               </a:rPr>
-              <a:t>David E. Bernholdt, Anshu Dubey, and Patricia A. Grubel, Better Scientific Software tutorial, in NOAA Global Systems Laboratory, Boulder, Colorado, 2023. DOI: </a:t>
+              <a:t>David E. Bernholdt, Patricia A. Grubel, David M. Rogers, and Gregory R. Watson, Better Software for Reproducible Science tutorial, in The International Conference for High-Performance Computing, Networking, Storage, and Analysis (SC23), Denver, Colorado, 2023. DOI: </a:t>
             </a:r>
             <a:r>
               <a:rPr lang="en-US" sz="1600" b="0" i="0" u="none" strike="noStrike" dirty="0">
@@ -10688,10 +10689,10 @@
                   <a:srgbClr val="2A7AE2"/>
                 </a:solidFill>
                 <a:effectLst/>
-                <a:latin typeface="+mj-lt"/>
+                <a:latin typeface="+mn-lt"/>
                 <a:hlinkClick r:id="rId4"/>
               </a:rPr>
-              <a:t>10.6084/m9.figshare.23796606</a:t>
+              <a:t>10.6084/m9.figshare.24226105</a:t>
             </a:r>
             <a:r>
               <a:rPr lang="en-US" sz="1600" b="0" i="0" dirty="0">
@@ -10699,7 +10700,7 @@
                   <a:srgbClr val="111111"/>
                 </a:solidFill>
                 <a:effectLst/>
-                <a:latin typeface="+mj-lt"/>
+                <a:latin typeface="+mn-lt"/>
               </a:rPr>
               <a:t>.</a:t>
             </a:r>
@@ -10872,7 +10873,7 @@
     </p:spTree>
     <p:extLst>
       <p:ext uri="{BB962C8B-B14F-4D97-AF65-F5344CB8AC3E}">
-        <p14:creationId xmlns:p14="http://schemas.microsoft.com/office/powerpoint/2010/main" val="3292146594"/>
+        <p14:creationId xmlns:p14="http://schemas.microsoft.com/office/powerpoint/2010/main" val="978726433"/>
       </p:ext>
     </p:extLst>
   </p:cSld>
@@ -21435,7 +21436,7 @@
               <a:effectLst/>
               <a:extLst>
                 <a:ext uri="{C572A759-6A51-4108-AA02-DFA0A04FC94B}">
-                  <ma14:wrappingTextBoxFlag xmlns:ma14="http://schemas.microsoft.com/office/mac/drawingml/2011/main" xmlns:a14="http://schemas.microsoft.com/office/drawing/2010/main" xmlns:m="http://schemas.openxmlformats.org/officeDocument/2006/math" xmlns="" val="1"/>
+                  <ma14:wrappingTextBoxFlag xmlns="" xmlns:m="http://schemas.openxmlformats.org/officeDocument/2006/math" xmlns:a14="http://schemas.microsoft.com/office/drawing/2010/main" xmlns:ma14="http://schemas.microsoft.com/office/mac/drawingml/2011/main" val="1"/>
                 </a:ext>
               </a:extLst>
             </p:spPr>
@@ -21552,7 +21553,7 @@
               <a:effectLst/>
               <a:extLst>
                 <a:ext uri="{C572A759-6A51-4108-AA02-DFA0A04FC94B}">
-                  <ma14:wrappingTextBoxFlag xmlns:ma14="http://schemas.microsoft.com/office/mac/drawingml/2011/main" xmlns:a14="http://schemas.microsoft.com/office/drawing/2010/main" xmlns:m="http://schemas.openxmlformats.org/officeDocument/2006/math" xmlns="" val="1"/>
+                  <ma14:wrappingTextBoxFlag xmlns="" xmlns:m="http://schemas.openxmlformats.org/officeDocument/2006/math" xmlns:a14="http://schemas.microsoft.com/office/drawing/2010/main" xmlns:ma14="http://schemas.microsoft.com/office/mac/drawingml/2011/main" val="1"/>
                 </a:ext>
               </a:extLst>
             </p:spPr>
@@ -21682,7 +21683,7 @@
               <a:effectLst/>
               <a:extLst>
                 <a:ext uri="{C572A759-6A51-4108-AA02-DFA0A04FC94B}">
-                  <ma14:wrappingTextBoxFlag xmlns:ma14="http://schemas.microsoft.com/office/mac/drawingml/2011/main" xmlns:a14="http://schemas.microsoft.com/office/drawing/2010/main" xmlns:m="http://schemas.openxmlformats.org/officeDocument/2006/math" xmlns="" val="1"/>
+                  <ma14:wrappingTextBoxFlag xmlns="" xmlns:m="http://schemas.openxmlformats.org/officeDocument/2006/math" xmlns:a14="http://schemas.microsoft.com/office/drawing/2010/main" xmlns:ma14="http://schemas.microsoft.com/office/mac/drawingml/2011/main" val="1"/>
                 </a:ext>
               </a:extLst>
             </p:spPr>
@@ -21807,7 +21808,7 @@
               <a:effectLst/>
               <a:extLst>
                 <a:ext uri="{C572A759-6A51-4108-AA02-DFA0A04FC94B}">
-                  <ma14:wrappingTextBoxFlag xmlns:ma14="http://schemas.microsoft.com/office/mac/drawingml/2011/main" xmlns:a14="http://schemas.microsoft.com/office/drawing/2010/main" xmlns:m="http://schemas.openxmlformats.org/officeDocument/2006/math" xmlns="" val="1"/>
+                  <ma14:wrappingTextBoxFlag xmlns="" xmlns:m="http://schemas.openxmlformats.org/officeDocument/2006/math" xmlns:a14="http://schemas.microsoft.com/office/drawing/2010/main" xmlns:ma14="http://schemas.microsoft.com/office/mac/drawingml/2011/main" val="1"/>
                 </a:ext>
               </a:extLst>
             </p:spPr>
@@ -21964,7 +21965,7 @@
               <a:effectLst/>
               <a:extLst>
                 <a:ext uri="{C572A759-6A51-4108-AA02-DFA0A04FC94B}">
-                  <ma14:wrappingTextBoxFlag xmlns:ma14="http://schemas.microsoft.com/office/mac/drawingml/2011/main" xmlns:a14="http://schemas.microsoft.com/office/drawing/2010/main" xmlns:m="http://schemas.openxmlformats.org/officeDocument/2006/math" xmlns="" val="1"/>
+                  <ma14:wrappingTextBoxFlag xmlns="" xmlns:m="http://schemas.openxmlformats.org/officeDocument/2006/math" xmlns:a14="http://schemas.microsoft.com/office/drawing/2010/main" xmlns:ma14="http://schemas.microsoft.com/office/mac/drawingml/2011/main" val="1"/>
                 </a:ext>
               </a:extLst>
             </p:spPr>
@@ -22084,7 +22085,7 @@
               <a:effectLst/>
               <a:extLst>
                 <a:ext uri="{C572A759-6A51-4108-AA02-DFA0A04FC94B}">
-                  <ma14:wrappingTextBoxFlag xmlns:ma14="http://schemas.microsoft.com/office/mac/drawingml/2011/main" xmlns:a14="http://schemas.microsoft.com/office/drawing/2010/main" xmlns:m="http://schemas.openxmlformats.org/officeDocument/2006/math" xmlns="" val="1"/>
+                  <ma14:wrappingTextBoxFlag xmlns="" xmlns:m="http://schemas.openxmlformats.org/officeDocument/2006/math" xmlns:a14="http://schemas.microsoft.com/office/drawing/2010/main" xmlns:ma14="http://schemas.microsoft.com/office/mac/drawingml/2011/main" val="1"/>
                 </a:ext>
               </a:extLst>
             </p:spPr>
@@ -22212,7 +22213,7 @@
               <a:effectLst/>
               <a:extLst>
                 <a:ext uri="{C572A759-6A51-4108-AA02-DFA0A04FC94B}">
-                  <ma14:wrappingTextBoxFlag xmlns:ma14="http://schemas.microsoft.com/office/mac/drawingml/2011/main" xmlns:a14="http://schemas.microsoft.com/office/drawing/2010/main" xmlns:m="http://schemas.openxmlformats.org/officeDocument/2006/math" xmlns="" val="1"/>
+                  <ma14:wrappingTextBoxFlag xmlns="" xmlns:m="http://schemas.openxmlformats.org/officeDocument/2006/math" xmlns:a14="http://schemas.microsoft.com/office/drawing/2010/main" xmlns:ma14="http://schemas.microsoft.com/office/mac/drawingml/2011/main" val="1"/>
                 </a:ext>
               </a:extLst>
             </p:spPr>
@@ -22341,7 +22342,7 @@
               <a:effectLst/>
               <a:extLst>
                 <a:ext uri="{C572A759-6A51-4108-AA02-DFA0A04FC94B}">
-                  <ma14:wrappingTextBoxFlag xmlns:ma14="http://schemas.microsoft.com/office/mac/drawingml/2011/main" xmlns:a14="http://schemas.microsoft.com/office/drawing/2010/main" xmlns:m="http://schemas.openxmlformats.org/officeDocument/2006/math" xmlns="" val="1"/>
+                  <ma14:wrappingTextBoxFlag xmlns="" xmlns:m="http://schemas.openxmlformats.org/officeDocument/2006/math" xmlns:a14="http://schemas.microsoft.com/office/drawing/2010/main" xmlns:ma14="http://schemas.microsoft.com/office/mac/drawingml/2011/main" val="1"/>
                 </a:ext>
               </a:extLst>
             </p:spPr>
@@ -22518,7 +22519,7 @@
               <a:effectLst/>
               <a:extLst>
                 <a:ext uri="{C572A759-6A51-4108-AA02-DFA0A04FC94B}">
-                  <ma14:wrappingTextBoxFlag xmlns:ma14="http://schemas.microsoft.com/office/mac/drawingml/2011/main" xmlns:a14="http://schemas.microsoft.com/office/drawing/2010/main" xmlns:m="http://schemas.openxmlformats.org/officeDocument/2006/math" xmlns="" val="1"/>
+                  <ma14:wrappingTextBoxFlag xmlns="" xmlns:m="http://schemas.openxmlformats.org/officeDocument/2006/math" xmlns:a14="http://schemas.microsoft.com/office/drawing/2010/main" xmlns:ma14="http://schemas.microsoft.com/office/mac/drawingml/2011/main" val="1"/>
                 </a:ext>
               </a:extLst>
             </p:spPr>
@@ -22635,7 +22636,7 @@
               <a:effectLst/>
               <a:extLst>
                 <a:ext uri="{C572A759-6A51-4108-AA02-DFA0A04FC94B}">
-                  <ma14:wrappingTextBoxFlag xmlns:ma14="http://schemas.microsoft.com/office/mac/drawingml/2011/main" xmlns:a14="http://schemas.microsoft.com/office/drawing/2010/main" xmlns:m="http://schemas.openxmlformats.org/officeDocument/2006/math" xmlns="" val="1"/>
+                  <ma14:wrappingTextBoxFlag xmlns="" xmlns:m="http://schemas.openxmlformats.org/officeDocument/2006/math" xmlns:a14="http://schemas.microsoft.com/office/drawing/2010/main" xmlns:ma14="http://schemas.microsoft.com/office/mac/drawingml/2011/main" val="1"/>
                 </a:ext>
               </a:extLst>
             </p:spPr>
@@ -22764,7 +22765,7 @@
               <a:effectLst/>
               <a:extLst>
                 <a:ext uri="{C572A759-6A51-4108-AA02-DFA0A04FC94B}">
-                  <ma14:wrappingTextBoxFlag xmlns:ma14="http://schemas.microsoft.com/office/mac/drawingml/2011/main" xmlns:a14="http://schemas.microsoft.com/office/drawing/2010/main" xmlns:m="http://schemas.openxmlformats.org/officeDocument/2006/math" xmlns="" val="1"/>
+                  <ma14:wrappingTextBoxFlag xmlns="" xmlns:m="http://schemas.openxmlformats.org/officeDocument/2006/math" xmlns:a14="http://schemas.microsoft.com/office/drawing/2010/main" xmlns:ma14="http://schemas.microsoft.com/office/mac/drawingml/2011/main" val="1"/>
                 </a:ext>
               </a:extLst>
             </p:spPr>
@@ -22887,7 +22888,7 @@
               <a:effectLst/>
               <a:extLst>
                 <a:ext uri="{C572A759-6A51-4108-AA02-DFA0A04FC94B}">
-                  <ma14:wrappingTextBoxFlag xmlns:ma14="http://schemas.microsoft.com/office/mac/drawingml/2011/main" xmlns:a14="http://schemas.microsoft.com/office/drawing/2010/main" xmlns:m="http://schemas.openxmlformats.org/officeDocument/2006/math" xmlns="" val="1"/>
+                  <ma14:wrappingTextBoxFlag xmlns="" xmlns:m="http://schemas.openxmlformats.org/officeDocument/2006/math" xmlns:a14="http://schemas.microsoft.com/office/drawing/2010/main" xmlns:ma14="http://schemas.microsoft.com/office/mac/drawingml/2011/main" val="1"/>
                 </a:ext>
               </a:extLst>
             </p:spPr>
@@ -23494,7 +23495,7 @@
               <a:effectLst/>
               <a:extLst>
                 <a:ext uri="{C572A759-6A51-4108-AA02-DFA0A04FC94B}">
-                  <ma14:wrappingTextBoxFlag xmlns:ma14="http://schemas.microsoft.com/office/mac/drawingml/2011/main" xmlns:a14="http://schemas.microsoft.com/office/drawing/2010/main" xmlns:m="http://schemas.openxmlformats.org/officeDocument/2006/math" xmlns="" val="1"/>
+                  <ma14:wrappingTextBoxFlag xmlns="" xmlns:m="http://schemas.openxmlformats.org/officeDocument/2006/math" xmlns:a14="http://schemas.microsoft.com/office/drawing/2010/main" xmlns:ma14="http://schemas.microsoft.com/office/mac/drawingml/2011/main" val="1"/>
                 </a:ext>
               </a:extLst>
             </p:spPr>
@@ -23628,7 +23629,7 @@
               <a:effectLst/>
               <a:extLst>
                 <a:ext uri="{C572A759-6A51-4108-AA02-DFA0A04FC94B}">
-                  <ma14:wrappingTextBoxFlag xmlns:ma14="http://schemas.microsoft.com/office/mac/drawingml/2011/main" xmlns:a14="http://schemas.microsoft.com/office/drawing/2010/main" xmlns:m="http://schemas.openxmlformats.org/officeDocument/2006/math" xmlns="" val="1"/>
+                  <ma14:wrappingTextBoxFlag xmlns="" xmlns:m="http://schemas.openxmlformats.org/officeDocument/2006/math" xmlns:a14="http://schemas.microsoft.com/office/drawing/2010/main" xmlns:ma14="http://schemas.microsoft.com/office/mac/drawingml/2011/main" val="1"/>
                 </a:ext>
               </a:extLst>
             </p:spPr>
@@ -23745,7 +23746,7 @@
               <a:effectLst/>
               <a:extLst>
                 <a:ext uri="{C572A759-6A51-4108-AA02-DFA0A04FC94B}">
-                  <ma14:wrappingTextBoxFlag xmlns:ma14="http://schemas.microsoft.com/office/mac/drawingml/2011/main" xmlns:a14="http://schemas.microsoft.com/office/drawing/2010/main" xmlns:m="http://schemas.openxmlformats.org/officeDocument/2006/math" xmlns="" val="1"/>
+                  <ma14:wrappingTextBoxFlag xmlns="" xmlns:m="http://schemas.openxmlformats.org/officeDocument/2006/math" xmlns:a14="http://schemas.microsoft.com/office/drawing/2010/main" xmlns:ma14="http://schemas.microsoft.com/office/mac/drawingml/2011/main" val="1"/>
                 </a:ext>
               </a:extLst>
             </p:spPr>
@@ -23878,7 +23879,7 @@
               <a:effectLst/>
               <a:extLst>
                 <a:ext uri="{C572A759-6A51-4108-AA02-DFA0A04FC94B}">
-                  <ma14:wrappingTextBoxFlag xmlns:ma14="http://schemas.microsoft.com/office/mac/drawingml/2011/main" xmlns:a14="http://schemas.microsoft.com/office/drawing/2010/main" xmlns:m="http://schemas.openxmlformats.org/officeDocument/2006/math" xmlns="" val="1"/>
+                  <ma14:wrappingTextBoxFlag xmlns="" xmlns:m="http://schemas.openxmlformats.org/officeDocument/2006/math" xmlns:a14="http://schemas.microsoft.com/office/drawing/2010/main" xmlns:ma14="http://schemas.microsoft.com/office/mac/drawingml/2011/main" val="1"/>
                 </a:ext>
               </a:extLst>
             </p:spPr>
@@ -28526,18 +28527,18 @@
 </file>
 
 <file path=customXml/item1.xml><?xml version="1.0" encoding="utf-8"?>
+<p:properties xmlns:p="http://schemas.microsoft.com/office/2006/metadata/properties" xmlns:xsi="http://www.w3.org/2001/XMLSchema-instance" xmlns:pc="http://schemas.microsoft.com/office/infopath/2007/PartnerControls">
+  <documentManagement/>
+</p:properties>
+</file>
+
+<file path=customXml/item2.xml><?xml version="1.0" encoding="utf-8"?>
 <?mso-contentType ?>
 <FormTemplates xmlns="http://schemas.microsoft.com/sharepoint/v3/contenttype/forms">
   <Display>DocumentLibraryForm</Display>
   <Edit>DocumentLibraryForm</Edit>
   <New>DocumentLibraryForm</New>
 </FormTemplates>
-</file>
-
-<file path=customXml/item2.xml><?xml version="1.0" encoding="utf-8"?>
-<p:properties xmlns:p="http://schemas.microsoft.com/office/2006/metadata/properties" xmlns:xsi="http://www.w3.org/2001/XMLSchema-instance" xmlns:pc="http://schemas.microsoft.com/office/infopath/2007/PartnerControls">
-  <documentManagement/>
-</p:properties>
 </file>
 
 <file path=customXml/item3.xml><?xml version="1.0" encoding="utf-8"?>
@@ -28590,14 +28591,6 @@
 </file>
 
 <file path=customXml/itemProps1.xml><?xml version="1.0" encoding="utf-8"?>
-<ds:datastoreItem xmlns:ds="http://schemas.openxmlformats.org/officeDocument/2006/customXml" ds:itemID="{19E20559-B232-4371-8690-E3D8007EDB82}">
-  <ds:schemaRefs>
-    <ds:schemaRef ds:uri="http://schemas.microsoft.com/sharepoint/v3/contenttype/forms"/>
-  </ds:schemaRefs>
-</ds:datastoreItem>
-</file>
-
-<file path=customXml/itemProps2.xml><?xml version="1.0" encoding="utf-8"?>
 <ds:datastoreItem xmlns:ds="http://schemas.openxmlformats.org/officeDocument/2006/customXml" ds:itemID="{A50EC660-24D0-43A0-AE5E-E274115E726B}">
   <ds:schemaRefs>
     <ds:schemaRef ds:uri="http://purl.org/dc/elements/1.1/"/>
@@ -28608,6 +28601,14 @@
     <ds:schemaRef ds:uri="http://www.w3.org/XML/1998/namespace"/>
     <ds:schemaRef ds:uri="http://purl.org/dc/dcmitype/"/>
     <ds:schemaRef ds:uri="http://schemas.microsoft.com/office/infopath/2007/PartnerControls"/>
+  </ds:schemaRefs>
+</ds:datastoreItem>
+</file>
+
+<file path=customXml/itemProps2.xml><?xml version="1.0" encoding="utf-8"?>
+<ds:datastoreItem xmlns:ds="http://schemas.openxmlformats.org/officeDocument/2006/customXml" ds:itemID="{19E20559-B232-4371-8690-E3D8007EDB82}">
+  <ds:schemaRefs>
+    <ds:schemaRef ds:uri="http://schemas.microsoft.com/sharepoint/v3/contenttype/forms"/>
   </ds:schemaRefs>
 </ds:datastoreItem>
 </file>

</xml_diff>

<commit_message>
getting presentations ready for ISC
</commit_message>
<xml_diff>
--- a/design-a.pptx
+++ b/design-a.pptx
@@ -11,7 +11,7 @@
     <p:handoutMasterId r:id="rId36"/>
   </p:handoutMasterIdLst>
   <p:sldIdLst>
-    <p:sldId id="318" r:id="rId5"/>
+    <p:sldId id="617" r:id="rId5"/>
     <p:sldId id="320" r:id="rId6"/>
     <p:sldId id="5590" r:id="rId7"/>
     <p:sldId id="5577" r:id="rId8"/>
@@ -284,7 +284,7 @@
           <a:p>
             <a:fld id="{0B842F42-2CE9-4E35-95C1-410DC08A50B1}" type="datetimeFigureOut">
               <a:rPr lang="en-US" smtClean="0"/>
-              <a:t>11/11/2023</a:t>
+              <a:t>3/19/24</a:t>
             </a:fld>
             <a:endParaRPr lang="en-US"/>
           </a:p>
@@ -449,7 +449,7 @@
           <a:p>
             <a:fld id="{6F282904-F315-4730-8D91-37D99E141A6F}" type="datetimeFigureOut">
               <a:rPr lang="en-US" smtClean="0"/>
-              <a:t>11/11/2023</a:t>
+              <a:t>3/19/24</a:t>
             </a:fld>
             <a:endParaRPr lang="en-US"/>
           </a:p>
@@ -1096,17 +1096,14 @@
                 <a:spcPct val="90000"/>
               </a:lnSpc>
             </a:pPr>
-            <a:r>
-              <a:rPr lang="en-US" sz="1600" dirty="0">
-                <a:ln>
-                  <a:noFill/>
-                </a:ln>
-                <a:solidFill>
-                  <a:schemeClr val="bg1"/>
-                </a:solidFill>
-              </a:rPr>
-              <a:t>exascaleproject.org</a:t>
-            </a:r>
+            <a:endParaRPr lang="en-US" sz="1600" dirty="0">
+              <a:ln>
+                <a:noFill/>
+              </a:ln>
+              <a:solidFill>
+                <a:schemeClr val="bg1"/>
+              </a:solidFill>
+            </a:endParaRPr>
           </a:p>
         </p:txBody>
       </p:sp>
@@ -1333,7 +1330,7 @@
       </p:sp>
       <p:pic>
         <p:nvPicPr>
-          <p:cNvPr id="12" name="Picture 11"/>
+          <p:cNvPr id="16" name="Picture 15"/>
           <p:cNvPicPr>
             <a:picLocks noChangeAspect="1"/>
           </p:cNvPicPr>
@@ -1342,39 +1339,9 @@
         <p:blipFill>
           <a:blip r:embed="rId2" cstate="print">
             <a:extLst>
-              <a:ext uri="{28A0092B-C50C-407E-A947-70E740481C1C}">
-                <a14:useLocalDpi xmlns:a14="http://schemas.microsoft.com/office/drawing/2010/main" val="0"/>
-              </a:ext>
-            </a:extLst>
-          </a:blip>
-          <a:stretch>
-            <a:fillRect/>
-          </a:stretch>
-        </p:blipFill>
-        <p:spPr>
-          <a:xfrm>
-            <a:off x="360639" y="483164"/>
-            <a:ext cx="2050840" cy="935496"/>
-          </a:xfrm>
-          <a:prstGeom prst="rect">
-            <a:avLst/>
-          </a:prstGeom>
-        </p:spPr>
-      </p:pic>
-      <p:pic>
-        <p:nvPicPr>
-          <p:cNvPr id="16" name="Picture 15"/>
-          <p:cNvPicPr>
-            <a:picLocks noChangeAspect="1"/>
-          </p:cNvPicPr>
-          <p:nvPr userDrawn="1"/>
-        </p:nvPicPr>
-        <p:blipFill>
-          <a:blip r:embed="rId3" cstate="print">
-            <a:extLst>
               <a:ext uri="{BEBA8EAE-BF5A-486C-A8C5-ECC9F3942E4B}">
                 <a14:imgProps xmlns:a14="http://schemas.microsoft.com/office/drawing/2010/main">
-                  <a14:imgLayer r:embed="rId4">
+                  <a14:imgLayer r:embed="rId3">
                     <a14:imgEffect>
                       <a14:brightnessContrast bright="100000"/>
                     </a14:imgEffect>
@@ -1392,82 +1359,8 @@
         </p:blipFill>
         <p:spPr>
           <a:xfrm>
-            <a:off x="7289921" y="6322747"/>
+            <a:off x="9357260" y="6321694"/>
             <a:ext cx="2409477" cy="401008"/>
-          </a:xfrm>
-          <a:prstGeom prst="rect">
-            <a:avLst/>
-          </a:prstGeom>
-        </p:spPr>
-      </p:pic>
-      <p:pic>
-        <p:nvPicPr>
-          <p:cNvPr id="17" name="Picture 16"/>
-          <p:cNvPicPr>
-            <a:picLocks noChangeAspect="1"/>
-          </p:cNvPicPr>
-          <p:nvPr userDrawn="1"/>
-        </p:nvPicPr>
-        <p:blipFill rotWithShape="1">
-          <a:blip r:embed="rId5" cstate="print">
-            <a:extLst>
-              <a:ext uri="{BEBA8EAE-BF5A-486C-A8C5-ECC9F3942E4B}">
-                <a14:imgProps xmlns:a14="http://schemas.microsoft.com/office/drawing/2010/main">
-                  <a14:imgLayer r:embed="rId6">
-                    <a14:imgEffect>
-                      <a14:brightnessContrast bright="100000"/>
-                    </a14:imgEffect>
-                  </a14:imgLayer>
-                </a14:imgProps>
-              </a:ext>
-              <a:ext uri="{28A0092B-C50C-407E-A947-70E740481C1C}">
-                <a14:useLocalDpi xmlns:a14="http://schemas.microsoft.com/office/drawing/2010/main" val="0"/>
-              </a:ext>
-            </a:extLst>
-          </a:blip>
-          <a:srcRect b="70693"/>
-          <a:stretch/>
-        </p:blipFill>
-        <p:spPr>
-          <a:xfrm>
-            <a:off x="10204521" y="6307740"/>
-            <a:ext cx="1367541" cy="428915"/>
-          </a:xfrm>
-          <a:prstGeom prst="rect">
-            <a:avLst/>
-          </a:prstGeom>
-        </p:spPr>
-      </p:pic>
-      <p:pic>
-        <p:nvPicPr>
-          <p:cNvPr id="8" name="Picture 7" descr="A picture containing shape&#10;&#10;Description automatically generated">
-            <a:extLst>
-              <a:ext uri="{FF2B5EF4-FFF2-40B4-BE49-F238E27FC236}">
-                <a16:creationId xmlns:a16="http://schemas.microsoft.com/office/drawing/2014/main" id="{C432A180-7341-4E28-8C2B-73F9AB53D13F}"/>
-              </a:ext>
-            </a:extLst>
-          </p:cNvPr>
-          <p:cNvPicPr>
-            <a:picLocks noChangeAspect="1"/>
-          </p:cNvPicPr>
-          <p:nvPr userDrawn="1"/>
-        </p:nvPicPr>
-        <p:blipFill>
-          <a:blip r:embed="rId7">
-            <a:extLst>
-              <a:ext uri="{28A0092B-C50C-407E-A947-70E740481C1C}">
-                <a14:useLocalDpi xmlns:a14="http://schemas.microsoft.com/office/drawing/2010/main" val="0"/>
-              </a:ext>
-            </a:extLst>
-          </a:blip>
-          <a:stretch>
-            <a:fillRect/>
-          </a:stretch>
-        </p:blipFill>
-        <p:spPr>
-          <a:xfrm>
-            <a:off x="331810" y="1848659"/>
-            <a:ext cx="2108499" cy="914400"/>
           </a:xfrm>
           <a:prstGeom prst="rect">
             <a:avLst/>
@@ -1571,17 +1464,14 @@
                 <a:spcPct val="90000"/>
               </a:lnSpc>
             </a:pPr>
-            <a:r>
-              <a:rPr lang="en-US" sz="1600" dirty="0">
-                <a:ln>
-                  <a:noFill/>
-                </a:ln>
-                <a:solidFill>
-                  <a:schemeClr val="bg1"/>
-                </a:solidFill>
-              </a:rPr>
-              <a:t>exascaleproject.org</a:t>
-            </a:r>
+            <a:endParaRPr lang="en-US" sz="1600" dirty="0">
+              <a:ln>
+                <a:noFill/>
+              </a:ln>
+              <a:solidFill>
+                <a:schemeClr val="bg1"/>
+              </a:solidFill>
+            </a:endParaRPr>
           </a:p>
         </p:txBody>
       </p:sp>
@@ -1808,7 +1698,7 @@
       </p:sp>
       <p:pic>
         <p:nvPicPr>
-          <p:cNvPr id="12" name="Picture 11"/>
+          <p:cNvPr id="16" name="Picture 15"/>
           <p:cNvPicPr>
             <a:picLocks noChangeAspect="1"/>
           </p:cNvPicPr>
@@ -1817,39 +1707,9 @@
         <p:blipFill>
           <a:blip r:embed="rId2" cstate="print">
             <a:extLst>
-              <a:ext uri="{28A0092B-C50C-407E-A947-70E740481C1C}">
-                <a14:useLocalDpi xmlns:a14="http://schemas.microsoft.com/office/drawing/2010/main" val="0"/>
-              </a:ext>
-            </a:extLst>
-          </a:blip>
-          <a:stretch>
-            <a:fillRect/>
-          </a:stretch>
-        </p:blipFill>
-        <p:spPr>
-          <a:xfrm>
-            <a:off x="362749" y="483164"/>
-            <a:ext cx="2050840" cy="935496"/>
-          </a:xfrm>
-          <a:prstGeom prst="rect">
-            <a:avLst/>
-          </a:prstGeom>
-        </p:spPr>
-      </p:pic>
-      <p:pic>
-        <p:nvPicPr>
-          <p:cNvPr id="16" name="Picture 15"/>
-          <p:cNvPicPr>
-            <a:picLocks noChangeAspect="1"/>
-          </p:cNvPicPr>
-          <p:nvPr userDrawn="1"/>
-        </p:nvPicPr>
-        <p:blipFill>
-          <a:blip r:embed="rId3" cstate="print">
-            <a:extLst>
               <a:ext uri="{BEBA8EAE-BF5A-486C-A8C5-ECC9F3942E4B}">
                 <a14:imgProps xmlns:a14="http://schemas.microsoft.com/office/drawing/2010/main">
-                  <a14:imgLayer r:embed="rId4">
+                  <a14:imgLayer r:embed="rId3">
                     <a14:imgEffect>
                       <a14:brightnessContrast bright="100000"/>
                     </a14:imgEffect>
@@ -1867,82 +1727,8 @@
         </p:blipFill>
         <p:spPr>
           <a:xfrm>
-            <a:off x="7289921" y="6322747"/>
+            <a:off x="9536165" y="6321694"/>
             <a:ext cx="2409477" cy="401008"/>
-          </a:xfrm>
-          <a:prstGeom prst="rect">
-            <a:avLst/>
-          </a:prstGeom>
-        </p:spPr>
-      </p:pic>
-      <p:pic>
-        <p:nvPicPr>
-          <p:cNvPr id="17" name="Picture 16"/>
-          <p:cNvPicPr>
-            <a:picLocks noChangeAspect="1"/>
-          </p:cNvPicPr>
-          <p:nvPr userDrawn="1"/>
-        </p:nvPicPr>
-        <p:blipFill rotWithShape="1">
-          <a:blip r:embed="rId5" cstate="print">
-            <a:extLst>
-              <a:ext uri="{BEBA8EAE-BF5A-486C-A8C5-ECC9F3942E4B}">
-                <a14:imgProps xmlns:a14="http://schemas.microsoft.com/office/drawing/2010/main">
-                  <a14:imgLayer r:embed="rId6">
-                    <a14:imgEffect>
-                      <a14:brightnessContrast bright="100000"/>
-                    </a14:imgEffect>
-                  </a14:imgLayer>
-                </a14:imgProps>
-              </a:ext>
-              <a:ext uri="{28A0092B-C50C-407E-A947-70E740481C1C}">
-                <a14:useLocalDpi xmlns:a14="http://schemas.microsoft.com/office/drawing/2010/main" val="0"/>
-              </a:ext>
-            </a:extLst>
-          </a:blip>
-          <a:srcRect b="70693"/>
-          <a:stretch/>
-        </p:blipFill>
-        <p:spPr>
-          <a:xfrm>
-            <a:off x="10204521" y="6307740"/>
-            <a:ext cx="1367541" cy="428915"/>
-          </a:xfrm>
-          <a:prstGeom prst="rect">
-            <a:avLst/>
-          </a:prstGeom>
-        </p:spPr>
-      </p:pic>
-      <p:pic>
-        <p:nvPicPr>
-          <p:cNvPr id="8" name="Picture 7" descr="A picture containing shape&#10;&#10;Description automatically generated">
-            <a:extLst>
-              <a:ext uri="{FF2B5EF4-FFF2-40B4-BE49-F238E27FC236}">
-                <a16:creationId xmlns:a16="http://schemas.microsoft.com/office/drawing/2014/main" id="{C432A180-7341-4E28-8C2B-73F9AB53D13F}"/>
-              </a:ext>
-            </a:extLst>
-          </p:cNvPr>
-          <p:cNvPicPr>
-            <a:picLocks noChangeAspect="1"/>
-          </p:cNvPicPr>
-          <p:nvPr userDrawn="1"/>
-        </p:nvPicPr>
-        <p:blipFill>
-          <a:blip r:embed="rId7">
-            <a:extLst>
-              <a:ext uri="{28A0092B-C50C-407E-A947-70E740481C1C}">
-                <a14:useLocalDpi xmlns:a14="http://schemas.microsoft.com/office/drawing/2010/main" val="0"/>
-              </a:ext>
-            </a:extLst>
-          </a:blip>
-          <a:stretch>
-            <a:fillRect/>
-          </a:stretch>
-        </p:blipFill>
-        <p:spPr>
-          <a:xfrm>
-            <a:off x="333920" y="1848659"/>
-            <a:ext cx="2108499" cy="914400"/>
           </a:xfrm>
           <a:prstGeom prst="rect">
             <a:avLst/>
@@ -1964,7 +1750,7 @@
           <p:nvPr userDrawn="1"/>
         </p:nvPicPr>
         <p:blipFill>
-          <a:blip r:embed="rId8">
+          <a:blip r:embed="rId4">
             <a:extLst>
               <a:ext uri="{28A0092B-C50C-407E-A947-70E740481C1C}">
                 <a14:useLocalDpi xmlns:a14="http://schemas.microsoft.com/office/drawing/2010/main" val="0"/>
@@ -2051,7 +1837,7 @@
           <p:nvPr userDrawn="1"/>
         </p:nvPicPr>
         <p:blipFill>
-          <a:blip r:embed="rId9" cstate="print">
+          <a:blip r:embed="rId5" cstate="print">
             <a:extLst>
               <a:ext uri="{28A0092B-C50C-407E-A947-70E740481C1C}">
                 <a14:useLocalDpi xmlns:a14="http://schemas.microsoft.com/office/drawing/2010/main" val="0"/>
@@ -3769,7 +3555,7 @@
           <a:p>
             <a:fld id="{68F49DD1-DDB5-AB43-B311-7649AD474C82}" type="datetimeFigureOut">
               <a:rPr lang="en-US" smtClean="0"/>
-              <a:t>11/11/2023</a:t>
+              <a:t>3/19/24</a:t>
             </a:fld>
             <a:endParaRPr lang="en-US"/>
           </a:p>
@@ -3820,7 +3606,7 @@
     </p:spTree>
     <p:extLst>
       <p:ext uri="{BB962C8B-B14F-4D97-AF65-F5344CB8AC3E}">
-        <p14:creationId xmlns:p14="http://schemas.microsoft.com/office/powerpoint/2010/main" val="3054434457"/>
+        <p14:creationId xmlns:p14="http://schemas.microsoft.com/office/powerpoint/2010/main" val="4162327487"/>
       </p:ext>
     </p:extLst>
   </p:cSld>
@@ -3971,36 +3757,6 @@
           </a:p>
         </p:txBody>
       </p:sp>
-      <p:pic>
-        <p:nvPicPr>
-          <p:cNvPr id="13" name="Picture 12"/>
-          <p:cNvPicPr>
-            <a:picLocks noChangeAspect="1"/>
-          </p:cNvPicPr>
-          <p:nvPr userDrawn="1"/>
-        </p:nvPicPr>
-        <p:blipFill>
-          <a:blip r:embed="rId10" cstate="print">
-            <a:extLst>
-              <a:ext uri="{28A0092B-C50C-407E-A947-70E740481C1C}">
-                <a14:useLocalDpi xmlns:a14="http://schemas.microsoft.com/office/drawing/2010/main" val="0"/>
-              </a:ext>
-            </a:extLst>
-          </a:blip>
-          <a:stretch>
-            <a:fillRect/>
-          </a:stretch>
-        </p:blipFill>
-        <p:spPr>
-          <a:xfrm>
-            <a:off x="9741160" y="6185919"/>
-            <a:ext cx="1971212" cy="533060"/>
-          </a:xfrm>
-          <a:prstGeom prst="rect">
-            <a:avLst/>
-          </a:prstGeom>
-        </p:spPr>
-      </p:pic>
       <p:sp>
         <p:nvSpPr>
           <p:cNvPr id="8" name="Rectangle 256"/>
@@ -4104,42 +3860,6 @@
           </a:p>
         </p:txBody>
       </p:sp>
-      <p:pic>
-        <p:nvPicPr>
-          <p:cNvPr id="3" name="Picture 2" descr="A picture containing shape&#10;&#10;Description automatically generated">
-            <a:extLst>
-              <a:ext uri="{FF2B5EF4-FFF2-40B4-BE49-F238E27FC236}">
-                <a16:creationId xmlns:a16="http://schemas.microsoft.com/office/drawing/2014/main" id="{2A4943B8-0F89-4A94-B130-A128F45E57C4}"/>
-              </a:ext>
-            </a:extLst>
-          </p:cNvPr>
-          <p:cNvPicPr>
-            <a:picLocks noChangeAspect="1"/>
-          </p:cNvPicPr>
-          <p:nvPr userDrawn="1"/>
-        </p:nvPicPr>
-        <p:blipFill>
-          <a:blip r:embed="rId11">
-            <a:extLst>
-              <a:ext uri="{28A0092B-C50C-407E-A947-70E740481C1C}">
-                <a14:useLocalDpi xmlns:a14="http://schemas.microsoft.com/office/drawing/2010/main" val="0"/>
-              </a:ext>
-            </a:extLst>
-          </a:blip>
-          <a:stretch>
-            <a:fillRect/>
-          </a:stretch>
-        </p:blipFill>
-        <p:spPr>
-          <a:xfrm>
-            <a:off x="7806050" y="6114121"/>
-            <a:ext cx="1560289" cy="676656"/>
-          </a:xfrm>
-          <a:prstGeom prst="rect">
-            <a:avLst/>
-          </a:prstGeom>
-        </p:spPr>
-      </p:pic>
     </p:spTree>
     <p:extLst>
       <p:ext uri="{BB962C8B-B14F-4D97-AF65-F5344CB8AC3E}">
@@ -4617,10 +4337,77 @@
       </p:grpSpPr>
       <p:sp>
         <p:nvSpPr>
-          <p:cNvPr id="4" name="Title 3">
+          <p:cNvPr id="3" name="Subtitle 2">
             <a:extLst>
               <a:ext uri="{FF2B5EF4-FFF2-40B4-BE49-F238E27FC236}">
-                <a16:creationId xmlns:a16="http://schemas.microsoft.com/office/drawing/2014/main" id="{321A77B7-F99D-49EA-A49F-D263718C48D7}"/>
+                <a16:creationId xmlns:a16="http://schemas.microsoft.com/office/drawing/2014/main" id="{115D6CAC-8B77-472D-91BE-E47FFB7E8C7A}"/>
+              </a:ext>
+            </a:extLst>
+          </p:cNvPr>
+          <p:cNvSpPr>
+            <a:spLocks noGrp="1"/>
+          </p:cNvSpPr>
+          <p:nvPr>
+            <p:ph type="subTitle" idx="1"/>
+          </p:nvPr>
+        </p:nvSpPr>
+        <p:spPr>
+          <a:xfrm>
+            <a:off x="3177632" y="1959498"/>
+            <a:ext cx="7772308" cy="2855300"/>
+          </a:xfrm>
+        </p:spPr>
+        <p:txBody>
+          <a:bodyPr/>
+          <a:lstStyle/>
+          <a:p>
+            <a:r>
+              <a:rPr lang="en-US" dirty="0"/>
+              <a:t>Anshu Dubey</a:t>
+            </a:r>
+          </a:p>
+          <a:p>
+            <a:r>
+              <a:rPr lang="en-US" b="0" i="0" dirty="0">
+                <a:solidFill>
+                  <a:srgbClr val="111111"/>
+                </a:solidFill>
+                <a:effectLst/>
+                <a:latin typeface="-apple-system"/>
+              </a:rPr>
+              <a:t>Better Scientific Software Tutorial @ ISC24</a:t>
+            </a:r>
+          </a:p>
+          <a:p>
+            <a:endParaRPr lang="en-US" dirty="0">
+              <a:solidFill>
+                <a:srgbClr val="111111"/>
+              </a:solidFill>
+              <a:latin typeface="-apple-system"/>
+            </a:endParaRPr>
+          </a:p>
+          <a:p>
+            <a:r>
+              <a:rPr lang="en-US" sz="2000" dirty="0"/>
+              <a:t>Contributors: Anshu Dubey (ANL), Mark C. Miller (LLNL), David </a:t>
+            </a:r>
+            <a:r>
+              <a:rPr lang="en-US" sz="2000" dirty="0" err="1"/>
+              <a:t>Bernholdt</a:t>
+            </a:r>
+            <a:r>
+              <a:rPr lang="en-US" sz="2000" dirty="0"/>
+              <a:t> (ORNL) </a:t>
+            </a:r>
+          </a:p>
+        </p:txBody>
+      </p:sp>
+      <p:sp>
+        <p:nvSpPr>
+          <p:cNvPr id="7" name="Title 3">
+            <a:extLst>
+              <a:ext uri="{FF2B5EF4-FFF2-40B4-BE49-F238E27FC236}">
+                <a16:creationId xmlns:a16="http://schemas.microsoft.com/office/drawing/2014/main" id="{7C6EFC9D-D056-0758-BDF8-BAB7A5CB5554}"/>
               </a:ext>
             </a:extLst>
           </p:cNvPr>
@@ -4631,7 +4418,12 @@
             <p:ph type="ctrTitle"/>
           </p:nvPr>
         </p:nvSpPr>
-        <p:spPr/>
+        <p:spPr>
+          <a:xfrm>
+            <a:off x="3177633" y="503144"/>
+            <a:ext cx="8292316" cy="1030930"/>
+          </a:xfrm>
+        </p:spPr>
         <p:txBody>
           <a:bodyPr/>
           <a:lstStyle/>
@@ -4639,85 +4431,6 @@
             <a:r>
               <a:rPr lang="en-US" dirty="0"/>
               <a:t>Scientific Software Design</a:t>
-            </a:r>
-          </a:p>
-        </p:txBody>
-      </p:sp>
-      <p:sp>
-        <p:nvSpPr>
-          <p:cNvPr id="5" name="Subtitle 4">
-            <a:extLst>
-              <a:ext uri="{FF2B5EF4-FFF2-40B4-BE49-F238E27FC236}">
-                <a16:creationId xmlns:a16="http://schemas.microsoft.com/office/drawing/2014/main" id="{E9C36191-4CD4-4D95-BBB8-C25F2055F697}"/>
-              </a:ext>
-            </a:extLst>
-          </p:cNvPr>
-          <p:cNvSpPr>
-            <a:spLocks noGrp="1"/>
-          </p:cNvSpPr>
-          <p:nvPr>
-            <p:ph type="subTitle" idx="1"/>
-          </p:nvPr>
-        </p:nvSpPr>
-        <p:spPr/>
-        <p:txBody>
-          <a:bodyPr/>
-          <a:lstStyle/>
-          <a:p>
-            <a:r>
-              <a:rPr lang="en-US" u="sng" dirty="0"/>
-              <a:t>David M. Rogers</a:t>
-            </a:r>
-            <a:r>
-              <a:rPr lang="en-US" dirty="0"/>
-              <a:t> </a:t>
-            </a:r>
-            <a:r>
-              <a:rPr lang="en-US" sz="2000" dirty="0"/>
-              <a:t>(he/him)</a:t>
-            </a:r>
-            <a:br>
-              <a:rPr lang="en-US" sz="2000" dirty="0"/>
-            </a:br>
-            <a:r>
-              <a:rPr lang="en-US" sz="2000" dirty="0"/>
-              <a:t>Oak Ridge National Laboratory</a:t>
-            </a:r>
-          </a:p>
-          <a:p>
-            <a:endParaRPr lang="en-US" dirty="0"/>
-          </a:p>
-          <a:p>
-            <a:r>
-              <a:rPr lang="en-US" sz="2000" b="0" i="0" dirty="0">
-                <a:solidFill>
-                  <a:srgbClr val="111111"/>
-                </a:solidFill>
-                <a:effectLst/>
-                <a:latin typeface="+mn-lt"/>
-              </a:rPr>
-              <a:t>Better Software for Reproducible Science tutorial</a:t>
-            </a:r>
-            <a:r>
-              <a:rPr lang="en-US" sz="2000" dirty="0">
-                <a:latin typeface="+mn-lt"/>
-              </a:rPr>
-              <a:t> </a:t>
-            </a:r>
-            <a:r>
-              <a:rPr lang="en-US" sz="2000" dirty="0"/>
-              <a:t>@ SC23</a:t>
-            </a:r>
-          </a:p>
-          <a:p>
-            <a:pPr>
-              <a:spcBef>
-                <a:spcPts val="2800"/>
-              </a:spcBef>
-            </a:pPr>
-            <a:r>
-              <a:rPr lang="en-US" sz="2000" dirty="0"/>
-              <a:t>Contributors: Anshu Dubey (ANL), Mark C. Miller (LLNL), David Bernholdt (ORNL), David M. Rogers (ORNL)</a:t>
             </a:r>
           </a:p>
         </p:txBody>
@@ -4725,7 +4438,7 @@
     </p:spTree>
     <p:extLst>
       <p:ext uri="{BB962C8B-B14F-4D97-AF65-F5344CB8AC3E}">
-        <p14:creationId xmlns:p14="http://schemas.microsoft.com/office/powerpoint/2010/main" val="136510035"/>
+        <p14:creationId xmlns:p14="http://schemas.microsoft.com/office/powerpoint/2010/main" val="2146778437"/>
       </p:ext>
     </p:extLst>
   </p:cSld>
@@ -6525,7 +6238,7 @@
           <a:noFill/>
           <a:extLst>
             <a:ext uri="{909E8E84-426E-40dd-AFC4-6F175D3DCCD1}">
-              <a14:hiddenFill xmlns:a14="http://schemas.microsoft.com/office/drawing/2010/main" xmlns="">
+              <a14:hiddenFill xmlns="" xmlns:a14="http://schemas.microsoft.com/office/drawing/2010/main">
                 <a:solidFill>
                   <a:srgbClr val="FFFFFF"/>
                 </a:solidFill>
@@ -10620,8 +10333,8 @@
         </p:nvSpPr>
         <p:spPr>
           <a:xfrm>
-            <a:off x="409507" y="570111"/>
-            <a:ext cx="11369809" cy="4047778"/>
+            <a:off x="409507" y="879673"/>
+            <a:ext cx="11369809" cy="5293976"/>
           </a:xfrm>
         </p:spPr>
         <p:txBody>
@@ -10681,18 +10394,17 @@
                 <a:effectLst/>
                 <a:latin typeface="+mn-lt"/>
               </a:rPr>
-              <a:t>David E. Bernholdt, Patricia A. Grubel, David M. Rogers, and Gregory R. Watson, Better Software for Reproducible Science tutorial, in The International Conference for High-Performance Computing, Networking, Storage, and Analysis (SC23), Denver, Colorado, 2023. DOI: </a:t>
-            </a:r>
-            <a:r>
-              <a:rPr lang="en-US" sz="1600" b="0" i="0" u="none" strike="noStrike" dirty="0">
+              <a:t>Anshu Dubey, David E. </a:t>
+            </a:r>
+            <a:r>
+              <a:rPr lang="en-US" sz="1600" b="0" i="0" dirty="0" err="1">
                 <a:solidFill>
-                  <a:srgbClr val="2A7AE2"/>
+                  <a:srgbClr val="111111"/>
                 </a:solidFill>
                 <a:effectLst/>
                 <a:latin typeface="+mn-lt"/>
-                <a:hlinkClick r:id="rId4"/>
               </a:rPr>
-              <a:t>10.6084/m9.figshare.24226105</a:t>
+              <a:t>Bernholdt</a:t>
             </a:r>
             <a:r>
               <a:rPr lang="en-US" sz="1600" b="0" i="0" dirty="0">
@@ -10702,7 +10414,7 @@
                 <a:effectLst/>
                 <a:latin typeface="+mn-lt"/>
               </a:rPr>
-              <a:t>.</a:t>
+              <a:t>, Better Scientific Software tutorial, in ISC High Performance, Hamburg, Germany and online, 2024</a:t>
             </a:r>
           </a:p>
           <a:p>
@@ -10711,32 +10423,26 @@
                 <a:spcPts val="400"/>
               </a:spcBef>
             </a:pPr>
-            <a:r>
-              <a:rPr lang="en-US" sz="1600" dirty="0"/>
-              <a:t>Individual modules may be cited as </a:t>
-            </a:r>
-            <a:r>
-              <a:rPr lang="en-US" sz="1600" i="1" dirty="0"/>
-              <a:t>Speaker, Module Title</a:t>
-            </a:r>
-            <a:r>
-              <a:rPr lang="en-US" sz="1600" dirty="0"/>
-              <a:t>, in </a:t>
-            </a:r>
-            <a:r>
-              <a:rPr lang="en-US" sz="1600" b="0" i="1" dirty="0">
-                <a:solidFill>
-                  <a:srgbClr val="111111"/>
-                </a:solidFill>
-                <a:effectLst/>
-                <a:latin typeface="+mn-lt"/>
-              </a:rPr>
-              <a:t>Tutorial Title</a:t>
-            </a:r>
-            <a:r>
-              <a:rPr lang="en-US" sz="1600" dirty="0"/>
-              <a:t>, …</a:t>
-            </a:r>
+            <a:endParaRPr lang="en-US" sz="1600" dirty="0">
+              <a:solidFill>
+                <a:srgbClr val="111111"/>
+              </a:solidFill>
+              <a:latin typeface="+mn-lt"/>
+            </a:endParaRPr>
+          </a:p>
+          <a:p>
+            <a:pPr>
+              <a:spcBef>
+                <a:spcPts val="400"/>
+              </a:spcBef>
+            </a:pPr>
+            <a:endParaRPr lang="en-US" sz="1600" b="0" i="0" dirty="0">
+              <a:solidFill>
+                <a:srgbClr val="111111"/>
+              </a:solidFill>
+              <a:effectLst/>
+              <a:latin typeface="+mn-lt"/>
+            </a:endParaRPr>
           </a:p>
           <a:p>
             <a:pPr marL="0" indent="0">
@@ -10756,14 +10462,6 @@
                 <a:spcPts val="400"/>
               </a:spcBef>
             </a:pPr>
-            <a:r>
-              <a:rPr lang="en-US" sz="1400" dirty="0"/>
-              <a:t>This work was supported by the U.S. Department of Energy Office of Science, Office of Advanced Scientific Computing Research (ASCR), and by the Exascale Computing Project (17-SC-20-SC), a collaborative effort of the U.S. Department of Energy Office of Science and the National Nuclear Security Administration</a:t>
-            </a:r>
-            <a:r>
-              <a:rPr lang="en-US" sz="1400" i="1" dirty="0"/>
-              <a:t>.</a:t>
-            </a:r>
             <a:endParaRPr lang="en-US" sz="1400" dirty="0"/>
           </a:p>
           <a:p>
@@ -10774,8 +10472,13 @@
             </a:pPr>
             <a:r>
               <a:rPr lang="en-US" sz="1400" dirty="0"/>
-              <a:t>This work was performed in part at the Argonne National Laboratory, which is managed by UChicago Argonne, LLC for the U.S. Department of Energy under Contract No. DE-AC02-06CH11357.</a:t>
-            </a:r>
+              <a:t>Material included in these presentation is derived from work supported by the U.S. Department of Energy Office of Science, Office of Advanced Scientific Computing Research (ASCR), and by the Exascale Computing Project (17-SC-20-SC), a collaborative effort of the U.S. Department of Energy Office of Science and the National Nuclear Security Administration</a:t>
+            </a:r>
+            <a:r>
+              <a:rPr lang="en-US" sz="1400" i="1" dirty="0"/>
+              <a:t>.</a:t>
+            </a:r>
+            <a:endParaRPr lang="en-US" sz="1400" dirty="0"/>
           </a:p>
           <a:p>
             <a:pPr>
@@ -10783,10 +10486,7 @@
                 <a:spcPts val="400"/>
               </a:spcBef>
             </a:pPr>
-            <a:r>
-              <a:rPr lang="en-US" sz="1400" dirty="0"/>
-              <a:t>This work was performed in part at the Lawrence Livermore National Laboratory, which is managed by Lawrence Livermore National Security, LLC for the U.S. Department of Energy under Contract No. DE-AC52-07NA27344.</a:t>
-            </a:r>
+            <a:endParaRPr lang="en-US" sz="1400" dirty="0"/>
           </a:p>
           <a:p>
             <a:pPr>
@@ -10796,7 +10496,7 @@
             </a:pPr>
             <a:r>
               <a:rPr lang="en-US" sz="1400" dirty="0"/>
-              <a:t>This work was performed in part at the Los Alamos National Laboratory, which is managed by Triad National Security, LLC for the U.S. Department of Energy under Contract No.89233218CNA000001</a:t>
+              <a:t>This work was performed in part at the Argonne National Laboratory, which is managed by UChicago Argonne, LLC for the U.S. Department of Energy under Contract No. DE-AC02-06CH11357.</a:t>
             </a:r>
           </a:p>
           <a:p>
@@ -10805,10 +10505,7 @@
                 <a:spcPts val="400"/>
               </a:spcBef>
             </a:pPr>
-            <a:r>
-              <a:rPr lang="en-US" sz="1400" dirty="0"/>
-              <a:t>This work was performed in part at the Oak Ridge National Laboratory, which is managed by UT-Battelle, LLC for the U.S. Department of Energy under Contract No. DE-AC05-00OR22725.</a:t>
-            </a:r>
+            <a:endParaRPr lang="en-US" sz="1400" dirty="0"/>
           </a:p>
           <a:p>
             <a:pPr>
@@ -10818,8 +10515,24 @@
             </a:pPr>
             <a:r>
               <a:rPr lang="en-US" sz="1400" dirty="0"/>
-              <a:t>This work was performed in part at Sandia National Laboratories. Sandia National Laboratories is a multi-mission laboratory managed and operated by National Technology and Engineering Solutions of Sandia, LLC., a wholly owned subsidiary of Honeywell International, Inc., for the U.S. Department of Energy’s National Nuclear Security Administration under contract DE-NA0003525.</a:t>
-            </a:r>
+              <a:t>This work was performed in part at the Oak Ridge National Laboratory, which is managed by UT-Battelle, LLC for the U.S. Department of Energy under Contract No. DE-AC05-00OR22725.</a:t>
+            </a:r>
+          </a:p>
+          <a:p>
+            <a:pPr>
+              <a:spcBef>
+                <a:spcPts val="400"/>
+              </a:spcBef>
+            </a:pPr>
+            <a:endParaRPr lang="en-US" sz="1400" dirty="0"/>
+          </a:p>
+          <a:p>
+            <a:pPr>
+              <a:spcBef>
+                <a:spcPts val="400"/>
+              </a:spcBef>
+            </a:pPr>
+            <a:endParaRPr lang="en-US" sz="1400" dirty="0"/>
           </a:p>
         </p:txBody>
       </p:sp>
@@ -10838,7 +10551,7 @@
           <p:nvPr/>
         </p:nvPicPr>
         <p:blipFill>
-          <a:blip r:embed="rId5">
+          <a:blip r:embed="rId4">
             <a:extLst>
               <a:ext uri="{28A0092B-C50C-407E-A947-70E740481C1C}">
                 <a14:useLocalDpi xmlns:a14="http://schemas.microsoft.com/office/drawing/2010/main" val="0"/>
@@ -10873,7 +10586,7 @@
     </p:spTree>
     <p:extLst>
       <p:ext uri="{BB962C8B-B14F-4D97-AF65-F5344CB8AC3E}">
-        <p14:creationId xmlns:p14="http://schemas.microsoft.com/office/powerpoint/2010/main" val="978726433"/>
+        <p14:creationId xmlns:p14="http://schemas.microsoft.com/office/powerpoint/2010/main" val="300521932"/>
       </p:ext>
     </p:extLst>
   </p:cSld>
@@ -21436,7 +21149,7 @@
               <a:effectLst/>
               <a:extLst>
                 <a:ext uri="{C572A759-6A51-4108-AA02-DFA0A04FC94B}">
-                  <ma14:wrappingTextBoxFlag xmlns:ma14="http://schemas.microsoft.com/office/mac/drawingml/2011/main" xmlns:a14="http://schemas.microsoft.com/office/drawing/2010/main" xmlns:m="http://schemas.openxmlformats.org/officeDocument/2006/math" xmlns="" val="1"/>
+                  <ma14:wrappingTextBoxFlag xmlns="" xmlns:m="http://schemas.openxmlformats.org/officeDocument/2006/math" xmlns:a14="http://schemas.microsoft.com/office/drawing/2010/main" xmlns:ma14="http://schemas.microsoft.com/office/mac/drawingml/2011/main" val="1"/>
                 </a:ext>
               </a:extLst>
             </p:spPr>
@@ -21553,7 +21266,7 @@
               <a:effectLst/>
               <a:extLst>
                 <a:ext uri="{C572A759-6A51-4108-AA02-DFA0A04FC94B}">
-                  <ma14:wrappingTextBoxFlag xmlns:ma14="http://schemas.microsoft.com/office/mac/drawingml/2011/main" xmlns:a14="http://schemas.microsoft.com/office/drawing/2010/main" xmlns:m="http://schemas.openxmlformats.org/officeDocument/2006/math" xmlns="" val="1"/>
+                  <ma14:wrappingTextBoxFlag xmlns="" xmlns:m="http://schemas.openxmlformats.org/officeDocument/2006/math" xmlns:a14="http://schemas.microsoft.com/office/drawing/2010/main" xmlns:ma14="http://schemas.microsoft.com/office/mac/drawingml/2011/main" val="1"/>
                 </a:ext>
               </a:extLst>
             </p:spPr>
@@ -21683,7 +21396,7 @@
               <a:effectLst/>
               <a:extLst>
                 <a:ext uri="{C572A759-6A51-4108-AA02-DFA0A04FC94B}">
-                  <ma14:wrappingTextBoxFlag xmlns:ma14="http://schemas.microsoft.com/office/mac/drawingml/2011/main" xmlns:a14="http://schemas.microsoft.com/office/drawing/2010/main" xmlns:m="http://schemas.openxmlformats.org/officeDocument/2006/math" xmlns="" val="1"/>
+                  <ma14:wrappingTextBoxFlag xmlns="" xmlns:m="http://schemas.openxmlformats.org/officeDocument/2006/math" xmlns:a14="http://schemas.microsoft.com/office/drawing/2010/main" xmlns:ma14="http://schemas.microsoft.com/office/mac/drawingml/2011/main" val="1"/>
                 </a:ext>
               </a:extLst>
             </p:spPr>
@@ -21808,7 +21521,7 @@
               <a:effectLst/>
               <a:extLst>
                 <a:ext uri="{C572A759-6A51-4108-AA02-DFA0A04FC94B}">
-                  <ma14:wrappingTextBoxFlag xmlns:ma14="http://schemas.microsoft.com/office/mac/drawingml/2011/main" xmlns:a14="http://schemas.microsoft.com/office/drawing/2010/main" xmlns:m="http://schemas.openxmlformats.org/officeDocument/2006/math" xmlns="" val="1"/>
+                  <ma14:wrappingTextBoxFlag xmlns="" xmlns:m="http://schemas.openxmlformats.org/officeDocument/2006/math" xmlns:a14="http://schemas.microsoft.com/office/drawing/2010/main" xmlns:ma14="http://schemas.microsoft.com/office/mac/drawingml/2011/main" val="1"/>
                 </a:ext>
               </a:extLst>
             </p:spPr>
@@ -21965,7 +21678,7 @@
               <a:effectLst/>
               <a:extLst>
                 <a:ext uri="{C572A759-6A51-4108-AA02-DFA0A04FC94B}">
-                  <ma14:wrappingTextBoxFlag xmlns:ma14="http://schemas.microsoft.com/office/mac/drawingml/2011/main" xmlns:a14="http://schemas.microsoft.com/office/drawing/2010/main" xmlns:m="http://schemas.openxmlformats.org/officeDocument/2006/math" xmlns="" val="1"/>
+                  <ma14:wrappingTextBoxFlag xmlns="" xmlns:m="http://schemas.openxmlformats.org/officeDocument/2006/math" xmlns:a14="http://schemas.microsoft.com/office/drawing/2010/main" xmlns:ma14="http://schemas.microsoft.com/office/mac/drawingml/2011/main" val="1"/>
                 </a:ext>
               </a:extLst>
             </p:spPr>
@@ -22085,7 +21798,7 @@
               <a:effectLst/>
               <a:extLst>
                 <a:ext uri="{C572A759-6A51-4108-AA02-DFA0A04FC94B}">
-                  <ma14:wrappingTextBoxFlag xmlns:ma14="http://schemas.microsoft.com/office/mac/drawingml/2011/main" xmlns:a14="http://schemas.microsoft.com/office/drawing/2010/main" xmlns:m="http://schemas.openxmlformats.org/officeDocument/2006/math" xmlns="" val="1"/>
+                  <ma14:wrappingTextBoxFlag xmlns="" xmlns:m="http://schemas.openxmlformats.org/officeDocument/2006/math" xmlns:a14="http://schemas.microsoft.com/office/drawing/2010/main" xmlns:ma14="http://schemas.microsoft.com/office/mac/drawingml/2011/main" val="1"/>
                 </a:ext>
               </a:extLst>
             </p:spPr>
@@ -22213,7 +21926,7 @@
               <a:effectLst/>
               <a:extLst>
                 <a:ext uri="{C572A759-6A51-4108-AA02-DFA0A04FC94B}">
-                  <ma14:wrappingTextBoxFlag xmlns:ma14="http://schemas.microsoft.com/office/mac/drawingml/2011/main" xmlns:a14="http://schemas.microsoft.com/office/drawing/2010/main" xmlns:m="http://schemas.openxmlformats.org/officeDocument/2006/math" xmlns="" val="1"/>
+                  <ma14:wrappingTextBoxFlag xmlns="" xmlns:m="http://schemas.openxmlformats.org/officeDocument/2006/math" xmlns:a14="http://schemas.microsoft.com/office/drawing/2010/main" xmlns:ma14="http://schemas.microsoft.com/office/mac/drawingml/2011/main" val="1"/>
                 </a:ext>
               </a:extLst>
             </p:spPr>
@@ -22342,7 +22055,7 @@
               <a:effectLst/>
               <a:extLst>
                 <a:ext uri="{C572A759-6A51-4108-AA02-DFA0A04FC94B}">
-                  <ma14:wrappingTextBoxFlag xmlns:ma14="http://schemas.microsoft.com/office/mac/drawingml/2011/main" xmlns:a14="http://schemas.microsoft.com/office/drawing/2010/main" xmlns:m="http://schemas.openxmlformats.org/officeDocument/2006/math" xmlns="" val="1"/>
+                  <ma14:wrappingTextBoxFlag xmlns="" xmlns:m="http://schemas.openxmlformats.org/officeDocument/2006/math" xmlns:a14="http://schemas.microsoft.com/office/drawing/2010/main" xmlns:ma14="http://schemas.microsoft.com/office/mac/drawingml/2011/main" val="1"/>
                 </a:ext>
               </a:extLst>
             </p:spPr>
@@ -22519,7 +22232,7 @@
               <a:effectLst/>
               <a:extLst>
                 <a:ext uri="{C572A759-6A51-4108-AA02-DFA0A04FC94B}">
-                  <ma14:wrappingTextBoxFlag xmlns:ma14="http://schemas.microsoft.com/office/mac/drawingml/2011/main" xmlns:a14="http://schemas.microsoft.com/office/drawing/2010/main" xmlns:m="http://schemas.openxmlformats.org/officeDocument/2006/math" xmlns="" val="1"/>
+                  <ma14:wrappingTextBoxFlag xmlns="" xmlns:m="http://schemas.openxmlformats.org/officeDocument/2006/math" xmlns:a14="http://schemas.microsoft.com/office/drawing/2010/main" xmlns:ma14="http://schemas.microsoft.com/office/mac/drawingml/2011/main" val="1"/>
                 </a:ext>
               </a:extLst>
             </p:spPr>
@@ -22636,7 +22349,7 @@
               <a:effectLst/>
               <a:extLst>
                 <a:ext uri="{C572A759-6A51-4108-AA02-DFA0A04FC94B}">
-                  <ma14:wrappingTextBoxFlag xmlns:ma14="http://schemas.microsoft.com/office/mac/drawingml/2011/main" xmlns:a14="http://schemas.microsoft.com/office/drawing/2010/main" xmlns:m="http://schemas.openxmlformats.org/officeDocument/2006/math" xmlns="" val="1"/>
+                  <ma14:wrappingTextBoxFlag xmlns="" xmlns:m="http://schemas.openxmlformats.org/officeDocument/2006/math" xmlns:a14="http://schemas.microsoft.com/office/drawing/2010/main" xmlns:ma14="http://schemas.microsoft.com/office/mac/drawingml/2011/main" val="1"/>
                 </a:ext>
               </a:extLst>
             </p:spPr>
@@ -22765,7 +22478,7 @@
               <a:effectLst/>
               <a:extLst>
                 <a:ext uri="{C572A759-6A51-4108-AA02-DFA0A04FC94B}">
-                  <ma14:wrappingTextBoxFlag xmlns:ma14="http://schemas.microsoft.com/office/mac/drawingml/2011/main" xmlns:a14="http://schemas.microsoft.com/office/drawing/2010/main" xmlns:m="http://schemas.openxmlformats.org/officeDocument/2006/math" xmlns="" val="1"/>
+                  <ma14:wrappingTextBoxFlag xmlns="" xmlns:m="http://schemas.openxmlformats.org/officeDocument/2006/math" xmlns:a14="http://schemas.microsoft.com/office/drawing/2010/main" xmlns:ma14="http://schemas.microsoft.com/office/mac/drawingml/2011/main" val="1"/>
                 </a:ext>
               </a:extLst>
             </p:spPr>
@@ -22888,7 +22601,7 @@
               <a:effectLst/>
               <a:extLst>
                 <a:ext uri="{C572A759-6A51-4108-AA02-DFA0A04FC94B}">
-                  <ma14:wrappingTextBoxFlag xmlns:ma14="http://schemas.microsoft.com/office/mac/drawingml/2011/main" xmlns:a14="http://schemas.microsoft.com/office/drawing/2010/main" xmlns:m="http://schemas.openxmlformats.org/officeDocument/2006/math" xmlns="" val="1"/>
+                  <ma14:wrappingTextBoxFlag xmlns="" xmlns:m="http://schemas.openxmlformats.org/officeDocument/2006/math" xmlns:a14="http://schemas.microsoft.com/office/drawing/2010/main" xmlns:ma14="http://schemas.microsoft.com/office/mac/drawingml/2011/main" val="1"/>
                 </a:ext>
               </a:extLst>
             </p:spPr>
@@ -23495,7 +23208,7 @@
               <a:effectLst/>
               <a:extLst>
                 <a:ext uri="{C572A759-6A51-4108-AA02-DFA0A04FC94B}">
-                  <ma14:wrappingTextBoxFlag xmlns:ma14="http://schemas.microsoft.com/office/mac/drawingml/2011/main" xmlns:a14="http://schemas.microsoft.com/office/drawing/2010/main" xmlns:m="http://schemas.openxmlformats.org/officeDocument/2006/math" xmlns="" val="1"/>
+                  <ma14:wrappingTextBoxFlag xmlns="" xmlns:m="http://schemas.openxmlformats.org/officeDocument/2006/math" xmlns:a14="http://schemas.microsoft.com/office/drawing/2010/main" xmlns:ma14="http://schemas.microsoft.com/office/mac/drawingml/2011/main" val="1"/>
                 </a:ext>
               </a:extLst>
             </p:spPr>
@@ -23629,7 +23342,7 @@
               <a:effectLst/>
               <a:extLst>
                 <a:ext uri="{C572A759-6A51-4108-AA02-DFA0A04FC94B}">
-                  <ma14:wrappingTextBoxFlag xmlns:ma14="http://schemas.microsoft.com/office/mac/drawingml/2011/main" xmlns:a14="http://schemas.microsoft.com/office/drawing/2010/main" xmlns:m="http://schemas.openxmlformats.org/officeDocument/2006/math" xmlns="" val="1"/>
+                  <ma14:wrappingTextBoxFlag xmlns="" xmlns:m="http://schemas.openxmlformats.org/officeDocument/2006/math" xmlns:a14="http://schemas.microsoft.com/office/drawing/2010/main" xmlns:ma14="http://schemas.microsoft.com/office/mac/drawingml/2011/main" val="1"/>
                 </a:ext>
               </a:extLst>
             </p:spPr>
@@ -23746,7 +23459,7 @@
               <a:effectLst/>
               <a:extLst>
                 <a:ext uri="{C572A759-6A51-4108-AA02-DFA0A04FC94B}">
-                  <ma14:wrappingTextBoxFlag xmlns:ma14="http://schemas.microsoft.com/office/mac/drawingml/2011/main" xmlns:a14="http://schemas.microsoft.com/office/drawing/2010/main" xmlns:m="http://schemas.openxmlformats.org/officeDocument/2006/math" xmlns="" val="1"/>
+                  <ma14:wrappingTextBoxFlag xmlns="" xmlns:m="http://schemas.openxmlformats.org/officeDocument/2006/math" xmlns:a14="http://schemas.microsoft.com/office/drawing/2010/main" xmlns:ma14="http://schemas.microsoft.com/office/mac/drawingml/2011/main" val="1"/>
                 </a:ext>
               </a:extLst>
             </p:spPr>
@@ -23879,7 +23592,7 @@
               <a:effectLst/>
               <a:extLst>
                 <a:ext uri="{C572A759-6A51-4108-AA02-DFA0A04FC94B}">
-                  <ma14:wrappingTextBoxFlag xmlns:ma14="http://schemas.microsoft.com/office/mac/drawingml/2011/main" xmlns:a14="http://schemas.microsoft.com/office/drawing/2010/main" xmlns:m="http://schemas.openxmlformats.org/officeDocument/2006/math" xmlns="" val="1"/>
+                  <ma14:wrappingTextBoxFlag xmlns="" xmlns:m="http://schemas.openxmlformats.org/officeDocument/2006/math" xmlns:a14="http://schemas.microsoft.com/office/drawing/2010/main" xmlns:ma14="http://schemas.microsoft.com/office/mac/drawingml/2011/main" val="1"/>
                 </a:ext>
               </a:extLst>
             </p:spPr>
@@ -25498,55 +25211,104 @@
             </a:r>
           </a:p>
           <a:p>
+            <a:pPr>
+              <a:buClr>
+                <a:srgbClr val="C00000"/>
+              </a:buClr>
+              <a:buFont typeface="Wingdings" pitchFamily="2" charset="2"/>
+              <a:buChar char="q"/>
+            </a:pPr>
             <a:r>
               <a:rPr lang="en-US" dirty="0"/>
               <a:t>Several requirements can directly map to components – in this instance functions</a:t>
             </a:r>
           </a:p>
           <a:p>
-            <a:pPr lvl="1"/>
+            <a:pPr lvl="1">
+              <a:buClr>
+                <a:srgbClr val="C00000"/>
+              </a:buClr>
+              <a:buFont typeface="Wingdings" pitchFamily="2" charset="2"/>
+              <a:buChar char="q"/>
+            </a:pPr>
             <a:r>
               <a:rPr lang="en-US" dirty="0"/>
               <a:t>Driver</a:t>
             </a:r>
           </a:p>
           <a:p>
-            <a:pPr lvl="1"/>
+            <a:pPr lvl="1">
+              <a:buClr>
+                <a:srgbClr val="C00000"/>
+              </a:buClr>
+              <a:buFont typeface="Wingdings" pitchFamily="2" charset="2"/>
+              <a:buChar char="q"/>
+            </a:pPr>
             <a:r>
               <a:rPr lang="en-US" dirty="0"/>
               <a:t>Initialization – data containers</a:t>
             </a:r>
           </a:p>
           <a:p>
-            <a:pPr lvl="1"/>
+            <a:pPr lvl="1">
+              <a:buClr>
+                <a:srgbClr val="C00000"/>
+              </a:buClr>
+              <a:buFont typeface="Wingdings" pitchFamily="2" charset="2"/>
+              <a:buChar char="q"/>
+            </a:pPr>
             <a:r>
               <a:rPr lang="en-US" dirty="0"/>
               <a:t>Mesh initialization – applying initial conditions</a:t>
             </a:r>
           </a:p>
           <a:p>
-            <a:pPr lvl="1"/>
+            <a:pPr lvl="1">
+              <a:buClr>
+                <a:srgbClr val="C00000"/>
+              </a:buClr>
+              <a:buFont typeface="Wingdings" pitchFamily="2" charset="2"/>
+              <a:buChar char="q"/>
+            </a:pPr>
             <a:r>
               <a:rPr lang="en-US" dirty="0"/>
               <a:t>Integrator</a:t>
             </a:r>
           </a:p>
           <a:p>
-            <a:pPr lvl="1"/>
+            <a:pPr lvl="1">
+              <a:buClr>
+                <a:srgbClr val="C00000"/>
+              </a:buClr>
+              <a:buFont typeface="Wingdings" pitchFamily="2" charset="2"/>
+              <a:buChar char="q"/>
+            </a:pPr>
             <a:r>
               <a:rPr lang="en-US" dirty="0"/>
               <a:t>I/O</a:t>
             </a:r>
           </a:p>
           <a:p>
-            <a:pPr lvl="1"/>
+            <a:pPr lvl="1">
+              <a:buClr>
+                <a:srgbClr val="C00000"/>
+              </a:buClr>
+              <a:buFont typeface="Wingdings" pitchFamily="2" charset="2"/>
+              <a:buChar char="q"/>
+            </a:pPr>
             <a:r>
               <a:rPr lang="en-US" dirty="0"/>
               <a:t>Boundary conditions</a:t>
             </a:r>
           </a:p>
           <a:p>
-            <a:pPr lvl="1"/>
+            <a:pPr lvl="1">
+              <a:buClr>
+                <a:srgbClr val="C00000"/>
+              </a:buClr>
+              <a:buFont typeface="Wingdings" pitchFamily="2" charset="2"/>
+              <a:buChar char="q"/>
+            </a:pPr>
             <a:r>
               <a:rPr lang="en-US" dirty="0"/>
               <a:t>Comparison utility</a:t>
@@ -25577,7 +25339,7 @@
         </p:nvSpPr>
         <p:spPr bwMode="auto">
           <a:xfrm>
-            <a:off x="5044464" y="1325880"/>
+            <a:off x="5455004" y="1329856"/>
             <a:ext cx="6368061" cy="4709160"/>
           </a:xfrm>
           <a:prstGeom prst="rect">
@@ -28545,6 +28307,15 @@
 </file>
 
 <file path=customXml/item2.xml><?xml version="1.0" encoding="utf-8"?>
+<?mso-contentType ?>
+<FormTemplates xmlns="http://schemas.microsoft.com/sharepoint/v3/contenttype/forms">
+  <Display>DocumentLibraryForm</Display>
+  <Edit>DocumentLibraryForm</Edit>
+  <New>DocumentLibraryForm</New>
+</FormTemplates>
+</file>
+
+<file path=customXml/item3.xml><?xml version="1.0" encoding="utf-8"?>
 <ct:contentTypeSchema xmlns:ct="http://schemas.microsoft.com/office/2006/metadata/contentType" xmlns:ma="http://schemas.microsoft.com/office/2006/metadata/properties/metaAttributes" ct:_="" ma:_="" ma:contentTypeName="Document" ma:contentTypeID="0x010100565464437F680748A68B85EB6594EA7D" ma:contentTypeVersion="0" ma:contentTypeDescription="Create a new document." ma:contentTypeScope="" ma:versionID="fe3f4dd58d5914c51cfc6deaa8ad845c">
   <xsd:schema xmlns:xsd="http://www.w3.org/2001/XMLSchema" xmlns:p="http://schemas.microsoft.com/office/2006/metadata/properties" targetNamespace="http://schemas.microsoft.com/office/2006/metadata/properties" ma:root="true" ma:fieldsID="4aeb20c0e3442673af7ee10786458764">
     <xsd:element name="properties">
@@ -28593,15 +28364,6 @@
 </ct:contentTypeSchema>
 </file>
 
-<file path=customXml/item3.xml><?xml version="1.0" encoding="utf-8"?>
-<?mso-contentType ?>
-<FormTemplates xmlns="http://schemas.microsoft.com/sharepoint/v3/contenttype/forms">
-  <Display>DocumentLibraryForm</Display>
-  <Edit>DocumentLibraryForm</Edit>
-  <New>DocumentLibraryForm</New>
-</FormTemplates>
-</file>
-
 <file path=customXml/itemProps1.xml><?xml version="1.0" encoding="utf-8"?>
 <ds:datastoreItem xmlns:ds="http://schemas.openxmlformats.org/officeDocument/2006/customXml" ds:itemID="{A50EC660-24D0-43A0-AE5E-E274115E726B}">
   <ds:schemaRefs>
@@ -28618,6 +28380,14 @@
 </file>
 
 <file path=customXml/itemProps2.xml><?xml version="1.0" encoding="utf-8"?>
+<ds:datastoreItem xmlns:ds="http://schemas.openxmlformats.org/officeDocument/2006/customXml" ds:itemID="{19E20559-B232-4371-8690-E3D8007EDB82}">
+  <ds:schemaRefs>
+    <ds:schemaRef ds:uri="http://schemas.microsoft.com/sharepoint/v3/contenttype/forms"/>
+  </ds:schemaRefs>
+</ds:datastoreItem>
+</file>
+
+<file path=customXml/itemProps3.xml><?xml version="1.0" encoding="utf-8"?>
 <ds:datastoreItem xmlns:ds="http://schemas.openxmlformats.org/officeDocument/2006/customXml" ds:itemID="{E8DB7DEB-074E-4EE8-9B6E-FD277323109C}">
   <ds:schemaRefs>
     <ds:schemaRef ds:uri="http://schemas.microsoft.com/office/2006/metadata/contentType"/>
@@ -28630,12 +28400,4 @@
     <ds:schemaRef ds:uri="http://schemas.microsoft.com/office/internal/2005/internalDocumentation"/>
   </ds:schemaRefs>
 </ds:datastoreItem>
-</file>
-
-<file path=customXml/itemProps3.xml><?xml version="1.0" encoding="utf-8"?>
-<ds:datastoreItem xmlns:ds="http://schemas.openxmlformats.org/officeDocument/2006/customXml" ds:itemID="{19E20559-B232-4371-8690-E3D8007EDB82}">
-  <ds:schemaRefs>
-    <ds:schemaRef ds:uri="http://schemas.microsoft.com/sharepoint/v3/contenttype/forms"/>
-  </ds:schemaRefs>
-</ds:datastoreItem>
 </file>
</xml_diff>

<commit_message>
update ISC talks with logos of Fastmath and RAPIDS
</commit_message>
<xml_diff>
--- a/design-a.pptx
+++ b/design-a.pptx
@@ -284,7 +284,7 @@
           <a:p>
             <a:fld id="{0B842F42-2CE9-4E35-95C1-410DC08A50B1}" type="datetimeFigureOut">
               <a:rPr lang="en-US" smtClean="0"/>
-              <a:t>3/19/24</a:t>
+              <a:t>3/25/24</a:t>
             </a:fld>
             <a:endParaRPr lang="en-US"/>
           </a:p>
@@ -449,7 +449,7 @@
           <a:p>
             <a:fld id="{6F282904-F315-4730-8D91-37D99E141A6F}" type="datetimeFigureOut">
               <a:rPr lang="en-US" smtClean="0"/>
-              <a:t>3/19/24</a:t>
+              <a:t>3/25/24</a:t>
             </a:fld>
             <a:endParaRPr lang="en-US"/>
           </a:p>
@@ -1824,10 +1824,10 @@
       </p:sp>
       <p:pic>
         <p:nvPicPr>
-          <p:cNvPr id="15" name="Picture 14">
+          <p:cNvPr id="5" name="Picture 4">
             <a:extLst>
               <a:ext uri="{FF2B5EF4-FFF2-40B4-BE49-F238E27FC236}">
-                <a16:creationId xmlns:a16="http://schemas.microsoft.com/office/drawing/2014/main" id="{C554CDC7-44CF-4751-9869-0265C8E01840}"/>
+                <a16:creationId xmlns:a16="http://schemas.microsoft.com/office/drawing/2014/main" id="{AB2824F0-AD5E-8A72-0425-35DDE1536B93}"/>
               </a:ext>
             </a:extLst>
           </p:cNvPr>
@@ -1850,12 +1850,106 @@
         </p:blipFill>
         <p:spPr>
           <a:xfrm>
-            <a:off x="333211" y="3189686"/>
+            <a:off x="601269" y="1812348"/>
             <a:ext cx="2109916" cy="905256"/>
           </a:xfrm>
           <a:prstGeom prst="rect">
             <a:avLst/>
           </a:prstGeom>
+        </p:spPr>
+      </p:pic>
+      <p:pic>
+        <p:nvPicPr>
+          <p:cNvPr id="6" name="Picture 2">
+            <a:extLst>
+              <a:ext uri="{FF2B5EF4-FFF2-40B4-BE49-F238E27FC236}">
+                <a16:creationId xmlns:a16="http://schemas.microsoft.com/office/drawing/2014/main" id="{D51A66CB-CDD2-47E1-55FF-A008CC64EB97}"/>
+              </a:ext>
+            </a:extLst>
+          </p:cNvPr>
+          <p:cNvPicPr>
+            <a:picLocks noChangeAspect="1" noChangeArrowheads="1"/>
+          </p:cNvPicPr>
+          <p:nvPr userDrawn="1"/>
+        </p:nvPicPr>
+        <p:blipFill>
+          <a:blip r:embed="rId6">
+            <a:extLst>
+              <a:ext uri="{28A0092B-C50C-407E-A947-70E740481C1C}">
+                <a14:useLocalDpi xmlns:a14="http://schemas.microsoft.com/office/drawing/2010/main" val="0"/>
+              </a:ext>
+            </a:extLst>
+          </a:blip>
+          <a:srcRect/>
+          <a:stretch>
+            <a:fillRect/>
+          </a:stretch>
+        </p:blipFill>
+        <p:spPr bwMode="auto">
+          <a:xfrm>
+            <a:off x="240177" y="4159671"/>
+            <a:ext cx="2832100" cy="1003300"/>
+          </a:xfrm>
+          <a:prstGeom prst="rect">
+            <a:avLst/>
+          </a:prstGeom>
+          <a:noFill/>
+          <a:extLst>
+            <a:ext uri="{909E8E84-426E-40DD-AFC4-6F175D3DCCD1}">
+              <a14:hiddenFill xmlns:a14="http://schemas.microsoft.com/office/drawing/2010/main">
+                <a:solidFill>
+                  <a:srgbClr val="FFFFFF"/>
+                </a:solidFill>
+              </a14:hiddenFill>
+            </a:ext>
+          </a:extLst>
+        </p:spPr>
+      </p:pic>
+      <p:pic>
+        <p:nvPicPr>
+          <p:cNvPr id="7" name="Picture 4">
+            <a:extLst>
+              <a:ext uri="{FF2B5EF4-FFF2-40B4-BE49-F238E27FC236}">
+                <a16:creationId xmlns:a16="http://schemas.microsoft.com/office/drawing/2014/main" id="{645D436A-34FD-198F-9811-6F54983E5650}"/>
+              </a:ext>
+            </a:extLst>
+          </p:cNvPr>
+          <p:cNvPicPr>
+            <a:picLocks noChangeAspect="1" noChangeArrowheads="1"/>
+          </p:cNvPicPr>
+          <p:nvPr userDrawn="1"/>
+        </p:nvPicPr>
+        <p:blipFill>
+          <a:blip r:embed="rId7">
+            <a:extLst>
+              <a:ext uri="{28A0092B-C50C-407E-A947-70E740481C1C}">
+                <a14:useLocalDpi xmlns:a14="http://schemas.microsoft.com/office/drawing/2010/main" val="0"/>
+              </a:ext>
+            </a:extLst>
+          </a:blip>
+          <a:srcRect/>
+          <a:stretch>
+            <a:fillRect/>
+          </a:stretch>
+        </p:blipFill>
+        <p:spPr bwMode="auto">
+          <a:xfrm>
+            <a:off x="76990" y="3344480"/>
+            <a:ext cx="2937455" cy="682907"/>
+          </a:xfrm>
+          <a:prstGeom prst="rect">
+            <a:avLst/>
+          </a:prstGeom>
+          <a:noFill/>
+          <a:extLst>
+            <a:ext uri="{909E8E84-426E-40DD-AFC4-6F175D3DCCD1}">
+              <a14:hiddenFill xmlns:a14="http://schemas.microsoft.com/office/drawing/2010/main">
+                <a:solidFill>
+                  <a:srgbClr val="FFFFFF"/>
+                </a:solidFill>
+              </a14:hiddenFill>
+            </a:ext>
+          </a:extLst>
         </p:spPr>
       </p:pic>
     </p:spTree>
@@ -3555,7 +3649,7 @@
           <a:p>
             <a:fld id="{68F49DD1-DDB5-AB43-B311-7649AD474C82}" type="datetimeFigureOut">
               <a:rPr lang="en-US" smtClean="0"/>
-              <a:t>3/19/24</a:t>
+              <a:t>3/25/24</a:t>
             </a:fld>
             <a:endParaRPr lang="en-US"/>
           </a:p>
@@ -6238,7 +6332,7 @@
           <a:noFill/>
           <a:extLst>
             <a:ext uri="{909E8E84-426E-40dd-AFC4-6F175D3DCCD1}">
-              <a14:hiddenFill xmlns="" xmlns:a14="http://schemas.microsoft.com/office/drawing/2010/main">
+              <a14:hiddenFill xmlns:a14="http://schemas.microsoft.com/office/drawing/2010/main" xmlns="">
                 <a:solidFill>
                   <a:srgbClr val="FFFFFF"/>
                 </a:solidFill>
@@ -21149,7 +21243,7 @@
               <a:effectLst/>
               <a:extLst>
                 <a:ext uri="{C572A759-6A51-4108-AA02-DFA0A04FC94B}">
-                  <ma14:wrappingTextBoxFlag xmlns="" xmlns:m="http://schemas.openxmlformats.org/officeDocument/2006/math" xmlns:a14="http://schemas.microsoft.com/office/drawing/2010/main" xmlns:ma14="http://schemas.microsoft.com/office/mac/drawingml/2011/main" val="1"/>
+                  <ma14:wrappingTextBoxFlag xmlns:ma14="http://schemas.microsoft.com/office/mac/drawingml/2011/main" xmlns:a14="http://schemas.microsoft.com/office/drawing/2010/main" xmlns:m="http://schemas.openxmlformats.org/officeDocument/2006/math" xmlns="" val="1"/>
                 </a:ext>
               </a:extLst>
             </p:spPr>
@@ -21266,7 +21360,7 @@
               <a:effectLst/>
               <a:extLst>
                 <a:ext uri="{C572A759-6A51-4108-AA02-DFA0A04FC94B}">
-                  <ma14:wrappingTextBoxFlag xmlns="" xmlns:m="http://schemas.openxmlformats.org/officeDocument/2006/math" xmlns:a14="http://schemas.microsoft.com/office/drawing/2010/main" xmlns:ma14="http://schemas.microsoft.com/office/mac/drawingml/2011/main" val="1"/>
+                  <ma14:wrappingTextBoxFlag xmlns:ma14="http://schemas.microsoft.com/office/mac/drawingml/2011/main" xmlns:a14="http://schemas.microsoft.com/office/drawing/2010/main" xmlns:m="http://schemas.openxmlformats.org/officeDocument/2006/math" xmlns="" val="1"/>
                 </a:ext>
               </a:extLst>
             </p:spPr>
@@ -21396,7 +21490,7 @@
               <a:effectLst/>
               <a:extLst>
                 <a:ext uri="{C572A759-6A51-4108-AA02-DFA0A04FC94B}">
-                  <ma14:wrappingTextBoxFlag xmlns="" xmlns:m="http://schemas.openxmlformats.org/officeDocument/2006/math" xmlns:a14="http://schemas.microsoft.com/office/drawing/2010/main" xmlns:ma14="http://schemas.microsoft.com/office/mac/drawingml/2011/main" val="1"/>
+                  <ma14:wrappingTextBoxFlag xmlns:ma14="http://schemas.microsoft.com/office/mac/drawingml/2011/main" xmlns:a14="http://schemas.microsoft.com/office/drawing/2010/main" xmlns:m="http://schemas.openxmlformats.org/officeDocument/2006/math" xmlns="" val="1"/>
                 </a:ext>
               </a:extLst>
             </p:spPr>
@@ -21521,7 +21615,7 @@
               <a:effectLst/>
               <a:extLst>
                 <a:ext uri="{C572A759-6A51-4108-AA02-DFA0A04FC94B}">
-                  <ma14:wrappingTextBoxFlag xmlns="" xmlns:m="http://schemas.openxmlformats.org/officeDocument/2006/math" xmlns:a14="http://schemas.microsoft.com/office/drawing/2010/main" xmlns:ma14="http://schemas.microsoft.com/office/mac/drawingml/2011/main" val="1"/>
+                  <ma14:wrappingTextBoxFlag xmlns:ma14="http://schemas.microsoft.com/office/mac/drawingml/2011/main" xmlns:a14="http://schemas.microsoft.com/office/drawing/2010/main" xmlns:m="http://schemas.openxmlformats.org/officeDocument/2006/math" xmlns="" val="1"/>
                 </a:ext>
               </a:extLst>
             </p:spPr>
@@ -21678,7 +21772,7 @@
               <a:effectLst/>
               <a:extLst>
                 <a:ext uri="{C572A759-6A51-4108-AA02-DFA0A04FC94B}">
-                  <ma14:wrappingTextBoxFlag xmlns="" xmlns:m="http://schemas.openxmlformats.org/officeDocument/2006/math" xmlns:a14="http://schemas.microsoft.com/office/drawing/2010/main" xmlns:ma14="http://schemas.microsoft.com/office/mac/drawingml/2011/main" val="1"/>
+                  <ma14:wrappingTextBoxFlag xmlns:ma14="http://schemas.microsoft.com/office/mac/drawingml/2011/main" xmlns:a14="http://schemas.microsoft.com/office/drawing/2010/main" xmlns:m="http://schemas.openxmlformats.org/officeDocument/2006/math" xmlns="" val="1"/>
                 </a:ext>
               </a:extLst>
             </p:spPr>
@@ -21798,7 +21892,7 @@
               <a:effectLst/>
               <a:extLst>
                 <a:ext uri="{C572A759-6A51-4108-AA02-DFA0A04FC94B}">
-                  <ma14:wrappingTextBoxFlag xmlns="" xmlns:m="http://schemas.openxmlformats.org/officeDocument/2006/math" xmlns:a14="http://schemas.microsoft.com/office/drawing/2010/main" xmlns:ma14="http://schemas.microsoft.com/office/mac/drawingml/2011/main" val="1"/>
+                  <ma14:wrappingTextBoxFlag xmlns:ma14="http://schemas.microsoft.com/office/mac/drawingml/2011/main" xmlns:a14="http://schemas.microsoft.com/office/drawing/2010/main" xmlns:m="http://schemas.openxmlformats.org/officeDocument/2006/math" xmlns="" val="1"/>
                 </a:ext>
               </a:extLst>
             </p:spPr>
@@ -21926,7 +22020,7 @@
               <a:effectLst/>
               <a:extLst>
                 <a:ext uri="{C572A759-6A51-4108-AA02-DFA0A04FC94B}">
-                  <ma14:wrappingTextBoxFlag xmlns="" xmlns:m="http://schemas.openxmlformats.org/officeDocument/2006/math" xmlns:a14="http://schemas.microsoft.com/office/drawing/2010/main" xmlns:ma14="http://schemas.microsoft.com/office/mac/drawingml/2011/main" val="1"/>
+                  <ma14:wrappingTextBoxFlag xmlns:ma14="http://schemas.microsoft.com/office/mac/drawingml/2011/main" xmlns:a14="http://schemas.microsoft.com/office/drawing/2010/main" xmlns:m="http://schemas.openxmlformats.org/officeDocument/2006/math" xmlns="" val="1"/>
                 </a:ext>
               </a:extLst>
             </p:spPr>
@@ -22055,7 +22149,7 @@
               <a:effectLst/>
               <a:extLst>
                 <a:ext uri="{C572A759-6A51-4108-AA02-DFA0A04FC94B}">
-                  <ma14:wrappingTextBoxFlag xmlns="" xmlns:m="http://schemas.openxmlformats.org/officeDocument/2006/math" xmlns:a14="http://schemas.microsoft.com/office/drawing/2010/main" xmlns:ma14="http://schemas.microsoft.com/office/mac/drawingml/2011/main" val="1"/>
+                  <ma14:wrappingTextBoxFlag xmlns:ma14="http://schemas.microsoft.com/office/mac/drawingml/2011/main" xmlns:a14="http://schemas.microsoft.com/office/drawing/2010/main" xmlns:m="http://schemas.openxmlformats.org/officeDocument/2006/math" xmlns="" val="1"/>
                 </a:ext>
               </a:extLst>
             </p:spPr>
@@ -22232,7 +22326,7 @@
               <a:effectLst/>
               <a:extLst>
                 <a:ext uri="{C572A759-6A51-4108-AA02-DFA0A04FC94B}">
-                  <ma14:wrappingTextBoxFlag xmlns="" xmlns:m="http://schemas.openxmlformats.org/officeDocument/2006/math" xmlns:a14="http://schemas.microsoft.com/office/drawing/2010/main" xmlns:ma14="http://schemas.microsoft.com/office/mac/drawingml/2011/main" val="1"/>
+                  <ma14:wrappingTextBoxFlag xmlns:ma14="http://schemas.microsoft.com/office/mac/drawingml/2011/main" xmlns:a14="http://schemas.microsoft.com/office/drawing/2010/main" xmlns:m="http://schemas.openxmlformats.org/officeDocument/2006/math" xmlns="" val="1"/>
                 </a:ext>
               </a:extLst>
             </p:spPr>
@@ -22349,7 +22443,7 @@
               <a:effectLst/>
               <a:extLst>
                 <a:ext uri="{C572A759-6A51-4108-AA02-DFA0A04FC94B}">
-                  <ma14:wrappingTextBoxFlag xmlns="" xmlns:m="http://schemas.openxmlformats.org/officeDocument/2006/math" xmlns:a14="http://schemas.microsoft.com/office/drawing/2010/main" xmlns:ma14="http://schemas.microsoft.com/office/mac/drawingml/2011/main" val="1"/>
+                  <ma14:wrappingTextBoxFlag xmlns:ma14="http://schemas.microsoft.com/office/mac/drawingml/2011/main" xmlns:a14="http://schemas.microsoft.com/office/drawing/2010/main" xmlns:m="http://schemas.openxmlformats.org/officeDocument/2006/math" xmlns="" val="1"/>
                 </a:ext>
               </a:extLst>
             </p:spPr>
@@ -22478,7 +22572,7 @@
               <a:effectLst/>
               <a:extLst>
                 <a:ext uri="{C572A759-6A51-4108-AA02-DFA0A04FC94B}">
-                  <ma14:wrappingTextBoxFlag xmlns="" xmlns:m="http://schemas.openxmlformats.org/officeDocument/2006/math" xmlns:a14="http://schemas.microsoft.com/office/drawing/2010/main" xmlns:ma14="http://schemas.microsoft.com/office/mac/drawingml/2011/main" val="1"/>
+                  <ma14:wrappingTextBoxFlag xmlns:ma14="http://schemas.microsoft.com/office/mac/drawingml/2011/main" xmlns:a14="http://schemas.microsoft.com/office/drawing/2010/main" xmlns:m="http://schemas.openxmlformats.org/officeDocument/2006/math" xmlns="" val="1"/>
                 </a:ext>
               </a:extLst>
             </p:spPr>
@@ -22601,7 +22695,7 @@
               <a:effectLst/>
               <a:extLst>
                 <a:ext uri="{C572A759-6A51-4108-AA02-DFA0A04FC94B}">
-                  <ma14:wrappingTextBoxFlag xmlns="" xmlns:m="http://schemas.openxmlformats.org/officeDocument/2006/math" xmlns:a14="http://schemas.microsoft.com/office/drawing/2010/main" xmlns:ma14="http://schemas.microsoft.com/office/mac/drawingml/2011/main" val="1"/>
+                  <ma14:wrappingTextBoxFlag xmlns:ma14="http://schemas.microsoft.com/office/mac/drawingml/2011/main" xmlns:a14="http://schemas.microsoft.com/office/drawing/2010/main" xmlns:m="http://schemas.openxmlformats.org/officeDocument/2006/math" xmlns="" val="1"/>
                 </a:ext>
               </a:extLst>
             </p:spPr>
@@ -23208,7 +23302,7 @@
               <a:effectLst/>
               <a:extLst>
                 <a:ext uri="{C572A759-6A51-4108-AA02-DFA0A04FC94B}">
-                  <ma14:wrappingTextBoxFlag xmlns="" xmlns:m="http://schemas.openxmlformats.org/officeDocument/2006/math" xmlns:a14="http://schemas.microsoft.com/office/drawing/2010/main" xmlns:ma14="http://schemas.microsoft.com/office/mac/drawingml/2011/main" val="1"/>
+                  <ma14:wrappingTextBoxFlag xmlns:ma14="http://schemas.microsoft.com/office/mac/drawingml/2011/main" xmlns:a14="http://schemas.microsoft.com/office/drawing/2010/main" xmlns:m="http://schemas.openxmlformats.org/officeDocument/2006/math" xmlns="" val="1"/>
                 </a:ext>
               </a:extLst>
             </p:spPr>
@@ -23342,7 +23436,7 @@
               <a:effectLst/>
               <a:extLst>
                 <a:ext uri="{C572A759-6A51-4108-AA02-DFA0A04FC94B}">
-                  <ma14:wrappingTextBoxFlag xmlns="" xmlns:m="http://schemas.openxmlformats.org/officeDocument/2006/math" xmlns:a14="http://schemas.microsoft.com/office/drawing/2010/main" xmlns:ma14="http://schemas.microsoft.com/office/mac/drawingml/2011/main" val="1"/>
+                  <ma14:wrappingTextBoxFlag xmlns:ma14="http://schemas.microsoft.com/office/mac/drawingml/2011/main" xmlns:a14="http://schemas.microsoft.com/office/drawing/2010/main" xmlns:m="http://schemas.openxmlformats.org/officeDocument/2006/math" xmlns="" val="1"/>
                 </a:ext>
               </a:extLst>
             </p:spPr>
@@ -23459,7 +23553,7 @@
               <a:effectLst/>
               <a:extLst>
                 <a:ext uri="{C572A759-6A51-4108-AA02-DFA0A04FC94B}">
-                  <ma14:wrappingTextBoxFlag xmlns="" xmlns:m="http://schemas.openxmlformats.org/officeDocument/2006/math" xmlns:a14="http://schemas.microsoft.com/office/drawing/2010/main" xmlns:ma14="http://schemas.microsoft.com/office/mac/drawingml/2011/main" val="1"/>
+                  <ma14:wrappingTextBoxFlag xmlns:ma14="http://schemas.microsoft.com/office/mac/drawingml/2011/main" xmlns:a14="http://schemas.microsoft.com/office/drawing/2010/main" xmlns:m="http://schemas.openxmlformats.org/officeDocument/2006/math" xmlns="" val="1"/>
                 </a:ext>
               </a:extLst>
             </p:spPr>
@@ -23592,7 +23686,7 @@
               <a:effectLst/>
               <a:extLst>
                 <a:ext uri="{C572A759-6A51-4108-AA02-DFA0A04FC94B}">
-                  <ma14:wrappingTextBoxFlag xmlns="" xmlns:m="http://schemas.openxmlformats.org/officeDocument/2006/math" xmlns:a14="http://schemas.microsoft.com/office/drawing/2010/main" xmlns:ma14="http://schemas.microsoft.com/office/mac/drawingml/2011/main" val="1"/>
+                  <ma14:wrappingTextBoxFlag xmlns:ma14="http://schemas.microsoft.com/office/mac/drawingml/2011/main" xmlns:a14="http://schemas.microsoft.com/office/drawing/2010/main" xmlns:m="http://schemas.openxmlformats.org/officeDocument/2006/math" xmlns="" val="1"/>
                 </a:ext>
               </a:extLst>
             </p:spPr>
@@ -28301,18 +28395,18 @@
 </file>
 
 <file path=customXml/item1.xml><?xml version="1.0" encoding="utf-8"?>
-<p:properties xmlns:p="http://schemas.microsoft.com/office/2006/metadata/properties" xmlns:xsi="http://www.w3.org/2001/XMLSchema-instance" xmlns:pc="http://schemas.microsoft.com/office/infopath/2007/PartnerControls">
-  <documentManagement/>
-</p:properties>
-</file>
-
-<file path=customXml/item2.xml><?xml version="1.0" encoding="utf-8"?>
 <?mso-contentType ?>
 <FormTemplates xmlns="http://schemas.microsoft.com/sharepoint/v3/contenttype/forms">
   <Display>DocumentLibraryForm</Display>
   <Edit>DocumentLibraryForm</Edit>
   <New>DocumentLibraryForm</New>
 </FormTemplates>
+</file>
+
+<file path=customXml/item2.xml><?xml version="1.0" encoding="utf-8"?>
+<p:properties xmlns:p="http://schemas.microsoft.com/office/2006/metadata/properties" xmlns:xsi="http://www.w3.org/2001/XMLSchema-instance" xmlns:pc="http://schemas.microsoft.com/office/infopath/2007/PartnerControls">
+  <documentManagement/>
+</p:properties>
 </file>
 
 <file path=customXml/item3.xml><?xml version="1.0" encoding="utf-8"?>
@@ -28365,6 +28459,14 @@
 </file>
 
 <file path=customXml/itemProps1.xml><?xml version="1.0" encoding="utf-8"?>
+<ds:datastoreItem xmlns:ds="http://schemas.openxmlformats.org/officeDocument/2006/customXml" ds:itemID="{19E20559-B232-4371-8690-E3D8007EDB82}">
+  <ds:schemaRefs>
+    <ds:schemaRef ds:uri="http://schemas.microsoft.com/sharepoint/v3/contenttype/forms"/>
+  </ds:schemaRefs>
+</ds:datastoreItem>
+</file>
+
+<file path=customXml/itemProps2.xml><?xml version="1.0" encoding="utf-8"?>
 <ds:datastoreItem xmlns:ds="http://schemas.openxmlformats.org/officeDocument/2006/customXml" ds:itemID="{A50EC660-24D0-43A0-AE5E-E274115E726B}">
   <ds:schemaRefs>
     <ds:schemaRef ds:uri="http://purl.org/dc/elements/1.1/"/>
@@ -28375,14 +28477,6 @@
     <ds:schemaRef ds:uri="http://www.w3.org/XML/1998/namespace"/>
     <ds:schemaRef ds:uri="http://purl.org/dc/dcmitype/"/>
     <ds:schemaRef ds:uri="http://schemas.microsoft.com/office/infopath/2007/PartnerControls"/>
-  </ds:schemaRefs>
-</ds:datastoreItem>
-</file>
-
-<file path=customXml/itemProps2.xml><?xml version="1.0" encoding="utf-8"?>
-<ds:datastoreItem xmlns:ds="http://schemas.openxmlformats.org/officeDocument/2006/customXml" ds:itemID="{19E20559-B232-4371-8690-E3D8007EDB82}">
-  <ds:schemaRefs>
-    <ds:schemaRef ds:uri="http://schemas.microsoft.com/sharepoint/v3/contenttype/forms"/>
   </ds:schemaRefs>
 </ds:datastoreItem>
 </file>

</xml_diff>

<commit_message>
added STEP logo into the slides
</commit_message>
<xml_diff>
--- a/design-a.pptx
+++ b/design-a.pptx
@@ -284,7 +284,7 @@
           <a:p>
             <a:fld id="{0B842F42-2CE9-4E35-95C1-410DC08A50B1}" type="datetimeFigureOut">
               <a:rPr lang="en-US" smtClean="0"/>
-              <a:t>3/25/24</a:t>
+              <a:t>4/4/24</a:t>
             </a:fld>
             <a:endParaRPr lang="en-US"/>
           </a:p>
@@ -449,7 +449,7 @@
           <a:p>
             <a:fld id="{6F282904-F315-4730-8D91-37D99E141A6F}" type="datetimeFigureOut">
               <a:rPr lang="en-US" smtClean="0"/>
-              <a:t>3/25/24</a:t>
+              <a:t>4/4/24</a:t>
             </a:fld>
             <a:endParaRPr lang="en-US"/>
           </a:p>
@@ -1822,136 +1822,193 @@
           </a:p>
         </p:txBody>
       </p:sp>
-      <p:pic>
-        <p:nvPicPr>
-          <p:cNvPr id="5" name="Picture 4">
+      <p:grpSp>
+        <p:nvGrpSpPr>
+          <p:cNvPr id="8" name="Group 7">
             <a:extLst>
               <a:ext uri="{FF2B5EF4-FFF2-40B4-BE49-F238E27FC236}">
-                <a16:creationId xmlns:a16="http://schemas.microsoft.com/office/drawing/2014/main" id="{AB2824F0-AD5E-8A72-0425-35DDE1536B93}"/>
+                <a16:creationId xmlns:a16="http://schemas.microsoft.com/office/drawing/2014/main" id="{16AE459F-9FA5-0E78-ABD4-A524DF48B0F7}"/>
               </a:ext>
             </a:extLst>
           </p:cNvPr>
-          <p:cNvPicPr>
-            <a:picLocks noChangeAspect="1"/>
-          </p:cNvPicPr>
+          <p:cNvGrpSpPr/>
           <p:nvPr userDrawn="1"/>
-        </p:nvPicPr>
-        <p:blipFill>
-          <a:blip r:embed="rId5" cstate="print">
+        </p:nvGrpSpPr>
+        <p:grpSpPr>
+          <a:xfrm>
+            <a:off x="66198" y="214954"/>
+            <a:ext cx="2937455" cy="5079380"/>
+            <a:chOff x="-80559" y="113353"/>
+            <a:chExt cx="2937455" cy="5079380"/>
+          </a:xfrm>
+        </p:grpSpPr>
+        <p:pic>
+          <p:nvPicPr>
+            <p:cNvPr id="9" name="Picture 8">
+              <a:extLst>
+                <a:ext uri="{FF2B5EF4-FFF2-40B4-BE49-F238E27FC236}">
+                  <a16:creationId xmlns:a16="http://schemas.microsoft.com/office/drawing/2014/main" id="{008037DC-6D96-91D3-C102-55F1088D4B01}"/>
+                </a:ext>
+              </a:extLst>
+            </p:cNvPr>
+            <p:cNvPicPr>
+              <a:picLocks noChangeAspect="1"/>
+            </p:cNvPicPr>
+            <p:nvPr userDrawn="1"/>
+          </p:nvPicPr>
+          <p:blipFill>
+            <a:blip r:embed="rId5" cstate="print">
+              <a:extLst>
+                <a:ext uri="{28A0092B-C50C-407E-A947-70E740481C1C}">
+                  <a14:useLocalDpi xmlns:a14="http://schemas.microsoft.com/office/drawing/2010/main" val="0"/>
+                </a:ext>
+              </a:extLst>
+            </a:blip>
+            <a:stretch>
+              <a:fillRect/>
+            </a:stretch>
+          </p:blipFill>
+          <p:spPr>
+            <a:xfrm>
+              <a:off x="263939" y="113353"/>
+              <a:ext cx="2109916" cy="905256"/>
+            </a:xfrm>
+            <a:prstGeom prst="rect">
+              <a:avLst/>
+            </a:prstGeom>
+          </p:spPr>
+        </p:pic>
+        <p:pic>
+          <p:nvPicPr>
+            <p:cNvPr id="10" name="Picture 2">
+              <a:extLst>
+                <a:ext uri="{FF2B5EF4-FFF2-40B4-BE49-F238E27FC236}">
+                  <a16:creationId xmlns:a16="http://schemas.microsoft.com/office/drawing/2014/main" id="{8F23B3CE-D53E-5657-FC4E-99D232C66D6A}"/>
+                </a:ext>
+              </a:extLst>
+            </p:cNvPr>
+            <p:cNvPicPr>
+              <a:picLocks noChangeAspect="1" noChangeArrowheads="1"/>
+            </p:cNvPicPr>
+            <p:nvPr userDrawn="1"/>
+          </p:nvPicPr>
+          <p:blipFill>
+            <a:blip r:embed="rId6">
+              <a:extLst>
+                <a:ext uri="{28A0092B-C50C-407E-A947-70E740481C1C}">
+                  <a14:useLocalDpi xmlns:a14="http://schemas.microsoft.com/office/drawing/2010/main" val="0"/>
+                </a:ext>
+              </a:extLst>
+            </a:blip>
+            <a:srcRect/>
+            <a:stretch>
+              <a:fillRect/>
+            </a:stretch>
+          </p:blipFill>
+          <p:spPr bwMode="auto">
+            <a:xfrm>
+              <a:off x="24796" y="3155674"/>
+              <a:ext cx="2832100" cy="1003300"/>
+            </a:xfrm>
+            <a:prstGeom prst="rect">
+              <a:avLst/>
+            </a:prstGeom>
+            <a:noFill/>
             <a:extLst>
-              <a:ext uri="{28A0092B-C50C-407E-A947-70E740481C1C}">
-                <a14:useLocalDpi xmlns:a14="http://schemas.microsoft.com/office/drawing/2010/main" val="0"/>
+              <a:ext uri="{909E8E84-426E-40DD-AFC4-6F175D3DCCD1}">
+                <a14:hiddenFill xmlns:a14="http://schemas.microsoft.com/office/drawing/2010/main">
+                  <a:solidFill>
+                    <a:srgbClr val="FFFFFF"/>
+                  </a:solidFill>
+                </a14:hiddenFill>
               </a:ext>
             </a:extLst>
-          </a:blip>
-          <a:stretch>
-            <a:fillRect/>
-          </a:stretch>
-        </p:blipFill>
-        <p:spPr>
-          <a:xfrm>
-            <a:off x="601269" y="1812348"/>
-            <a:ext cx="2109916" cy="905256"/>
-          </a:xfrm>
-          <a:prstGeom prst="rect">
-            <a:avLst/>
-          </a:prstGeom>
-        </p:spPr>
-      </p:pic>
-      <p:pic>
-        <p:nvPicPr>
-          <p:cNvPr id="6" name="Picture 2">
+          </p:spPr>
+        </p:pic>
+        <p:pic>
+          <p:nvPicPr>
+            <p:cNvPr id="11" name="Picture 4">
+              <a:extLst>
+                <a:ext uri="{FF2B5EF4-FFF2-40B4-BE49-F238E27FC236}">
+                  <a16:creationId xmlns:a16="http://schemas.microsoft.com/office/drawing/2014/main" id="{6B53D4C1-59C3-6FC3-CD32-8A61AB26A527}"/>
+                </a:ext>
+              </a:extLst>
+            </p:cNvPr>
+            <p:cNvPicPr>
+              <a:picLocks noChangeAspect="1" noChangeArrowheads="1"/>
+            </p:cNvPicPr>
+            <p:nvPr userDrawn="1"/>
+          </p:nvPicPr>
+          <p:blipFill>
+            <a:blip r:embed="rId7">
+              <a:extLst>
+                <a:ext uri="{28A0092B-C50C-407E-A947-70E740481C1C}">
+                  <a14:useLocalDpi xmlns:a14="http://schemas.microsoft.com/office/drawing/2010/main" val="0"/>
+                </a:ext>
+              </a:extLst>
+            </a:blip>
+            <a:srcRect/>
+            <a:stretch>
+              <a:fillRect/>
+            </a:stretch>
+          </p:blipFill>
+          <p:spPr bwMode="auto">
+            <a:xfrm>
+              <a:off x="-80559" y="2517770"/>
+              <a:ext cx="2937455" cy="682907"/>
+            </a:xfrm>
+            <a:prstGeom prst="rect">
+              <a:avLst/>
+            </a:prstGeom>
+            <a:noFill/>
             <a:extLst>
-              <a:ext uri="{FF2B5EF4-FFF2-40B4-BE49-F238E27FC236}">
-                <a16:creationId xmlns:a16="http://schemas.microsoft.com/office/drawing/2014/main" id="{D51A66CB-CDD2-47E1-55FF-A008CC64EB97}"/>
+              <a:ext uri="{909E8E84-426E-40DD-AFC4-6F175D3DCCD1}">
+                <a14:hiddenFill xmlns:a14="http://schemas.microsoft.com/office/drawing/2010/main">
+                  <a:solidFill>
+                    <a:srgbClr val="FFFFFF"/>
+                  </a:solidFill>
+                </a14:hiddenFill>
               </a:ext>
             </a:extLst>
-          </p:cNvPr>
-          <p:cNvPicPr>
-            <a:picLocks noChangeAspect="1" noChangeArrowheads="1"/>
-          </p:cNvPicPr>
-          <p:nvPr userDrawn="1"/>
-        </p:nvPicPr>
-        <p:blipFill>
-          <a:blip r:embed="rId6">
-            <a:extLst>
-              <a:ext uri="{28A0092B-C50C-407E-A947-70E740481C1C}">
-                <a14:useLocalDpi xmlns:a14="http://schemas.microsoft.com/office/drawing/2010/main" val="0"/>
-              </a:ext>
-            </a:extLst>
-          </a:blip>
-          <a:srcRect/>
-          <a:stretch>
-            <a:fillRect/>
-          </a:stretch>
-        </p:blipFill>
-        <p:spPr bwMode="auto">
-          <a:xfrm>
-            <a:off x="240177" y="4159671"/>
-            <a:ext cx="2832100" cy="1003300"/>
-          </a:xfrm>
-          <a:prstGeom prst="rect">
-            <a:avLst/>
-          </a:prstGeom>
-          <a:noFill/>
-          <a:extLst>
-            <a:ext uri="{909E8E84-426E-40DD-AFC4-6F175D3DCCD1}">
-              <a14:hiddenFill xmlns:a14="http://schemas.microsoft.com/office/drawing/2010/main">
-                <a:solidFill>
-                  <a:srgbClr val="FFFFFF"/>
-                </a:solidFill>
-              </a14:hiddenFill>
-            </a:ext>
-          </a:extLst>
-        </p:spPr>
-      </p:pic>
-      <p:pic>
-        <p:nvPicPr>
-          <p:cNvPr id="7" name="Picture 4">
-            <a:extLst>
-              <a:ext uri="{FF2B5EF4-FFF2-40B4-BE49-F238E27FC236}">
-                <a16:creationId xmlns:a16="http://schemas.microsoft.com/office/drawing/2014/main" id="{645D436A-34FD-198F-9811-6F54983E5650}"/>
-              </a:ext>
-            </a:extLst>
-          </p:cNvPr>
-          <p:cNvPicPr>
-            <a:picLocks noChangeAspect="1" noChangeArrowheads="1"/>
-          </p:cNvPicPr>
-          <p:nvPr userDrawn="1"/>
-        </p:nvPicPr>
-        <p:blipFill>
-          <a:blip r:embed="rId7">
-            <a:extLst>
-              <a:ext uri="{28A0092B-C50C-407E-A947-70E740481C1C}">
-                <a14:useLocalDpi xmlns:a14="http://schemas.microsoft.com/office/drawing/2010/main" val="0"/>
-              </a:ext>
-            </a:extLst>
-          </a:blip>
-          <a:srcRect/>
-          <a:stretch>
-            <a:fillRect/>
-          </a:stretch>
-        </p:blipFill>
-        <p:spPr bwMode="auto">
-          <a:xfrm>
-            <a:off x="76990" y="3344480"/>
-            <a:ext cx="2937455" cy="682907"/>
-          </a:xfrm>
-          <a:prstGeom prst="rect">
-            <a:avLst/>
-          </a:prstGeom>
-          <a:noFill/>
-          <a:extLst>
-            <a:ext uri="{909E8E84-426E-40DD-AFC4-6F175D3DCCD1}">
-              <a14:hiddenFill xmlns:a14="http://schemas.microsoft.com/office/drawing/2010/main">
-                <a:solidFill>
-                  <a:srgbClr val="FFFFFF"/>
-                </a:solidFill>
-              </a14:hiddenFill>
-            </a:ext>
-          </a:extLst>
-        </p:spPr>
-      </p:pic>
+          </p:spPr>
+        </p:pic>
+        <p:pic>
+          <p:nvPicPr>
+            <p:cNvPr id="12" name="Picture 11" descr="A black and white sign with blue text&#10;&#10;Description automatically generated">
+              <a:extLst>
+                <a:ext uri="{FF2B5EF4-FFF2-40B4-BE49-F238E27FC236}">
+                  <a16:creationId xmlns:a16="http://schemas.microsoft.com/office/drawing/2014/main" id="{57547CB5-B70B-2ADD-668A-BE221DE80CFB}"/>
+                </a:ext>
+              </a:extLst>
+            </p:cNvPr>
+            <p:cNvPicPr>
+              <a:picLocks noChangeAspect="1"/>
+            </p:cNvPicPr>
+            <p:nvPr userDrawn="1"/>
+          </p:nvPicPr>
+          <p:blipFill>
+            <a:blip r:embed="rId8">
+              <a:extLst>
+                <a:ext uri="{28A0092B-C50C-407E-A947-70E740481C1C}">
+                  <a14:useLocalDpi xmlns:a14="http://schemas.microsoft.com/office/drawing/2010/main" val="0"/>
+                </a:ext>
+              </a:extLst>
+            </a:blip>
+            <a:stretch>
+              <a:fillRect/>
+            </a:stretch>
+          </p:blipFill>
+          <p:spPr>
+            <a:xfrm>
+              <a:off x="263939" y="4401022"/>
+              <a:ext cx="2455333" cy="791711"/>
+            </a:xfrm>
+            <a:prstGeom prst="rect">
+              <a:avLst/>
+            </a:prstGeom>
+          </p:spPr>
+        </p:pic>
+      </p:grpSp>
     </p:spTree>
     <p:extLst>
       <p:ext uri="{BB962C8B-B14F-4D97-AF65-F5344CB8AC3E}">
@@ -3649,7 +3706,7 @@
           <a:p>
             <a:fld id="{68F49DD1-DDB5-AB43-B311-7649AD474C82}" type="datetimeFigureOut">
               <a:rPr lang="en-US" smtClean="0"/>
-              <a:t>3/25/24</a:t>
+              <a:t>4/4/24</a:t>
             </a:fld>
             <a:endParaRPr lang="en-US"/>
           </a:p>
@@ -6332,7 +6389,7 @@
           <a:noFill/>
           <a:extLst>
             <a:ext uri="{909E8E84-426E-40dd-AFC4-6F175D3DCCD1}">
-              <a14:hiddenFill xmlns:a14="http://schemas.microsoft.com/office/drawing/2010/main" xmlns="">
+              <a14:hiddenFill xmlns="" xmlns:a14="http://schemas.microsoft.com/office/drawing/2010/main">
                 <a:solidFill>
                   <a:srgbClr val="FFFFFF"/>
                 </a:solidFill>
@@ -21243,7 +21300,7 @@
               <a:effectLst/>
               <a:extLst>
                 <a:ext uri="{C572A759-6A51-4108-AA02-DFA0A04FC94B}">
-                  <ma14:wrappingTextBoxFlag xmlns:ma14="http://schemas.microsoft.com/office/mac/drawingml/2011/main" xmlns:a14="http://schemas.microsoft.com/office/drawing/2010/main" xmlns:m="http://schemas.openxmlformats.org/officeDocument/2006/math" xmlns="" val="1"/>
+                  <ma14:wrappingTextBoxFlag xmlns="" xmlns:m="http://schemas.openxmlformats.org/officeDocument/2006/math" xmlns:a14="http://schemas.microsoft.com/office/drawing/2010/main" xmlns:ma14="http://schemas.microsoft.com/office/mac/drawingml/2011/main" val="1"/>
                 </a:ext>
               </a:extLst>
             </p:spPr>
@@ -21360,7 +21417,7 @@
               <a:effectLst/>
               <a:extLst>
                 <a:ext uri="{C572A759-6A51-4108-AA02-DFA0A04FC94B}">
-                  <ma14:wrappingTextBoxFlag xmlns:ma14="http://schemas.microsoft.com/office/mac/drawingml/2011/main" xmlns:a14="http://schemas.microsoft.com/office/drawing/2010/main" xmlns:m="http://schemas.openxmlformats.org/officeDocument/2006/math" xmlns="" val="1"/>
+                  <ma14:wrappingTextBoxFlag xmlns="" xmlns:m="http://schemas.openxmlformats.org/officeDocument/2006/math" xmlns:a14="http://schemas.microsoft.com/office/drawing/2010/main" xmlns:ma14="http://schemas.microsoft.com/office/mac/drawingml/2011/main" val="1"/>
                 </a:ext>
               </a:extLst>
             </p:spPr>
@@ -21490,7 +21547,7 @@
               <a:effectLst/>
               <a:extLst>
                 <a:ext uri="{C572A759-6A51-4108-AA02-DFA0A04FC94B}">
-                  <ma14:wrappingTextBoxFlag xmlns:ma14="http://schemas.microsoft.com/office/mac/drawingml/2011/main" xmlns:a14="http://schemas.microsoft.com/office/drawing/2010/main" xmlns:m="http://schemas.openxmlformats.org/officeDocument/2006/math" xmlns="" val="1"/>
+                  <ma14:wrappingTextBoxFlag xmlns="" xmlns:m="http://schemas.openxmlformats.org/officeDocument/2006/math" xmlns:a14="http://schemas.microsoft.com/office/drawing/2010/main" xmlns:ma14="http://schemas.microsoft.com/office/mac/drawingml/2011/main" val="1"/>
                 </a:ext>
               </a:extLst>
             </p:spPr>
@@ -21615,7 +21672,7 @@
               <a:effectLst/>
               <a:extLst>
                 <a:ext uri="{C572A759-6A51-4108-AA02-DFA0A04FC94B}">
-                  <ma14:wrappingTextBoxFlag xmlns:ma14="http://schemas.microsoft.com/office/mac/drawingml/2011/main" xmlns:a14="http://schemas.microsoft.com/office/drawing/2010/main" xmlns:m="http://schemas.openxmlformats.org/officeDocument/2006/math" xmlns="" val="1"/>
+                  <ma14:wrappingTextBoxFlag xmlns="" xmlns:m="http://schemas.openxmlformats.org/officeDocument/2006/math" xmlns:a14="http://schemas.microsoft.com/office/drawing/2010/main" xmlns:ma14="http://schemas.microsoft.com/office/mac/drawingml/2011/main" val="1"/>
                 </a:ext>
               </a:extLst>
             </p:spPr>
@@ -21772,7 +21829,7 @@
               <a:effectLst/>
               <a:extLst>
                 <a:ext uri="{C572A759-6A51-4108-AA02-DFA0A04FC94B}">
-                  <ma14:wrappingTextBoxFlag xmlns:ma14="http://schemas.microsoft.com/office/mac/drawingml/2011/main" xmlns:a14="http://schemas.microsoft.com/office/drawing/2010/main" xmlns:m="http://schemas.openxmlformats.org/officeDocument/2006/math" xmlns="" val="1"/>
+                  <ma14:wrappingTextBoxFlag xmlns="" xmlns:m="http://schemas.openxmlformats.org/officeDocument/2006/math" xmlns:a14="http://schemas.microsoft.com/office/drawing/2010/main" xmlns:ma14="http://schemas.microsoft.com/office/mac/drawingml/2011/main" val="1"/>
                 </a:ext>
               </a:extLst>
             </p:spPr>
@@ -21892,7 +21949,7 @@
               <a:effectLst/>
               <a:extLst>
                 <a:ext uri="{C572A759-6A51-4108-AA02-DFA0A04FC94B}">
-                  <ma14:wrappingTextBoxFlag xmlns:ma14="http://schemas.microsoft.com/office/mac/drawingml/2011/main" xmlns:a14="http://schemas.microsoft.com/office/drawing/2010/main" xmlns:m="http://schemas.openxmlformats.org/officeDocument/2006/math" xmlns="" val="1"/>
+                  <ma14:wrappingTextBoxFlag xmlns="" xmlns:m="http://schemas.openxmlformats.org/officeDocument/2006/math" xmlns:a14="http://schemas.microsoft.com/office/drawing/2010/main" xmlns:ma14="http://schemas.microsoft.com/office/mac/drawingml/2011/main" val="1"/>
                 </a:ext>
               </a:extLst>
             </p:spPr>
@@ -22020,7 +22077,7 @@
               <a:effectLst/>
               <a:extLst>
                 <a:ext uri="{C572A759-6A51-4108-AA02-DFA0A04FC94B}">
-                  <ma14:wrappingTextBoxFlag xmlns:ma14="http://schemas.microsoft.com/office/mac/drawingml/2011/main" xmlns:a14="http://schemas.microsoft.com/office/drawing/2010/main" xmlns:m="http://schemas.openxmlformats.org/officeDocument/2006/math" xmlns="" val="1"/>
+                  <ma14:wrappingTextBoxFlag xmlns="" xmlns:m="http://schemas.openxmlformats.org/officeDocument/2006/math" xmlns:a14="http://schemas.microsoft.com/office/drawing/2010/main" xmlns:ma14="http://schemas.microsoft.com/office/mac/drawingml/2011/main" val="1"/>
                 </a:ext>
               </a:extLst>
             </p:spPr>
@@ -22149,7 +22206,7 @@
               <a:effectLst/>
               <a:extLst>
                 <a:ext uri="{C572A759-6A51-4108-AA02-DFA0A04FC94B}">
-                  <ma14:wrappingTextBoxFlag xmlns:ma14="http://schemas.microsoft.com/office/mac/drawingml/2011/main" xmlns:a14="http://schemas.microsoft.com/office/drawing/2010/main" xmlns:m="http://schemas.openxmlformats.org/officeDocument/2006/math" xmlns="" val="1"/>
+                  <ma14:wrappingTextBoxFlag xmlns="" xmlns:m="http://schemas.openxmlformats.org/officeDocument/2006/math" xmlns:a14="http://schemas.microsoft.com/office/drawing/2010/main" xmlns:ma14="http://schemas.microsoft.com/office/mac/drawingml/2011/main" val="1"/>
                 </a:ext>
               </a:extLst>
             </p:spPr>
@@ -22326,7 +22383,7 @@
               <a:effectLst/>
               <a:extLst>
                 <a:ext uri="{C572A759-6A51-4108-AA02-DFA0A04FC94B}">
-                  <ma14:wrappingTextBoxFlag xmlns:ma14="http://schemas.microsoft.com/office/mac/drawingml/2011/main" xmlns:a14="http://schemas.microsoft.com/office/drawing/2010/main" xmlns:m="http://schemas.openxmlformats.org/officeDocument/2006/math" xmlns="" val="1"/>
+                  <ma14:wrappingTextBoxFlag xmlns="" xmlns:m="http://schemas.openxmlformats.org/officeDocument/2006/math" xmlns:a14="http://schemas.microsoft.com/office/drawing/2010/main" xmlns:ma14="http://schemas.microsoft.com/office/mac/drawingml/2011/main" val="1"/>
                 </a:ext>
               </a:extLst>
             </p:spPr>
@@ -22443,7 +22500,7 @@
               <a:effectLst/>
               <a:extLst>
                 <a:ext uri="{C572A759-6A51-4108-AA02-DFA0A04FC94B}">
-                  <ma14:wrappingTextBoxFlag xmlns:ma14="http://schemas.microsoft.com/office/mac/drawingml/2011/main" xmlns:a14="http://schemas.microsoft.com/office/drawing/2010/main" xmlns:m="http://schemas.openxmlformats.org/officeDocument/2006/math" xmlns="" val="1"/>
+                  <ma14:wrappingTextBoxFlag xmlns="" xmlns:m="http://schemas.openxmlformats.org/officeDocument/2006/math" xmlns:a14="http://schemas.microsoft.com/office/drawing/2010/main" xmlns:ma14="http://schemas.microsoft.com/office/mac/drawingml/2011/main" val="1"/>
                 </a:ext>
               </a:extLst>
             </p:spPr>
@@ -22572,7 +22629,7 @@
               <a:effectLst/>
               <a:extLst>
                 <a:ext uri="{C572A759-6A51-4108-AA02-DFA0A04FC94B}">
-                  <ma14:wrappingTextBoxFlag xmlns:ma14="http://schemas.microsoft.com/office/mac/drawingml/2011/main" xmlns:a14="http://schemas.microsoft.com/office/drawing/2010/main" xmlns:m="http://schemas.openxmlformats.org/officeDocument/2006/math" xmlns="" val="1"/>
+                  <ma14:wrappingTextBoxFlag xmlns="" xmlns:m="http://schemas.openxmlformats.org/officeDocument/2006/math" xmlns:a14="http://schemas.microsoft.com/office/drawing/2010/main" xmlns:ma14="http://schemas.microsoft.com/office/mac/drawingml/2011/main" val="1"/>
                 </a:ext>
               </a:extLst>
             </p:spPr>
@@ -22695,7 +22752,7 @@
               <a:effectLst/>
               <a:extLst>
                 <a:ext uri="{C572A759-6A51-4108-AA02-DFA0A04FC94B}">
-                  <ma14:wrappingTextBoxFlag xmlns:ma14="http://schemas.microsoft.com/office/mac/drawingml/2011/main" xmlns:a14="http://schemas.microsoft.com/office/drawing/2010/main" xmlns:m="http://schemas.openxmlformats.org/officeDocument/2006/math" xmlns="" val="1"/>
+                  <ma14:wrappingTextBoxFlag xmlns="" xmlns:m="http://schemas.openxmlformats.org/officeDocument/2006/math" xmlns:a14="http://schemas.microsoft.com/office/drawing/2010/main" xmlns:ma14="http://schemas.microsoft.com/office/mac/drawingml/2011/main" val="1"/>
                 </a:ext>
               </a:extLst>
             </p:spPr>
@@ -23302,7 +23359,7 @@
               <a:effectLst/>
               <a:extLst>
                 <a:ext uri="{C572A759-6A51-4108-AA02-DFA0A04FC94B}">
-                  <ma14:wrappingTextBoxFlag xmlns:ma14="http://schemas.microsoft.com/office/mac/drawingml/2011/main" xmlns:a14="http://schemas.microsoft.com/office/drawing/2010/main" xmlns:m="http://schemas.openxmlformats.org/officeDocument/2006/math" xmlns="" val="1"/>
+                  <ma14:wrappingTextBoxFlag xmlns="" xmlns:m="http://schemas.openxmlformats.org/officeDocument/2006/math" xmlns:a14="http://schemas.microsoft.com/office/drawing/2010/main" xmlns:ma14="http://schemas.microsoft.com/office/mac/drawingml/2011/main" val="1"/>
                 </a:ext>
               </a:extLst>
             </p:spPr>
@@ -23436,7 +23493,7 @@
               <a:effectLst/>
               <a:extLst>
                 <a:ext uri="{C572A759-6A51-4108-AA02-DFA0A04FC94B}">
-                  <ma14:wrappingTextBoxFlag xmlns:ma14="http://schemas.microsoft.com/office/mac/drawingml/2011/main" xmlns:a14="http://schemas.microsoft.com/office/drawing/2010/main" xmlns:m="http://schemas.openxmlformats.org/officeDocument/2006/math" xmlns="" val="1"/>
+                  <ma14:wrappingTextBoxFlag xmlns="" xmlns:m="http://schemas.openxmlformats.org/officeDocument/2006/math" xmlns:a14="http://schemas.microsoft.com/office/drawing/2010/main" xmlns:ma14="http://schemas.microsoft.com/office/mac/drawingml/2011/main" val="1"/>
                 </a:ext>
               </a:extLst>
             </p:spPr>
@@ -23553,7 +23610,7 @@
               <a:effectLst/>
               <a:extLst>
                 <a:ext uri="{C572A759-6A51-4108-AA02-DFA0A04FC94B}">
-                  <ma14:wrappingTextBoxFlag xmlns:ma14="http://schemas.microsoft.com/office/mac/drawingml/2011/main" xmlns:a14="http://schemas.microsoft.com/office/drawing/2010/main" xmlns:m="http://schemas.openxmlformats.org/officeDocument/2006/math" xmlns="" val="1"/>
+                  <ma14:wrappingTextBoxFlag xmlns="" xmlns:m="http://schemas.openxmlformats.org/officeDocument/2006/math" xmlns:a14="http://schemas.microsoft.com/office/drawing/2010/main" xmlns:ma14="http://schemas.microsoft.com/office/mac/drawingml/2011/main" val="1"/>
                 </a:ext>
               </a:extLst>
             </p:spPr>
@@ -23686,7 +23743,7 @@
               <a:effectLst/>
               <a:extLst>
                 <a:ext uri="{C572A759-6A51-4108-AA02-DFA0A04FC94B}">
-                  <ma14:wrappingTextBoxFlag xmlns:ma14="http://schemas.microsoft.com/office/mac/drawingml/2011/main" xmlns:a14="http://schemas.microsoft.com/office/drawing/2010/main" xmlns:m="http://schemas.openxmlformats.org/officeDocument/2006/math" xmlns="" val="1"/>
+                  <ma14:wrappingTextBoxFlag xmlns="" xmlns:m="http://schemas.openxmlformats.org/officeDocument/2006/math" xmlns:a14="http://schemas.microsoft.com/office/drawing/2010/main" xmlns:ma14="http://schemas.microsoft.com/office/mac/drawingml/2011/main" val="1"/>
                 </a:ext>
               </a:extLst>
             </p:spPr>
@@ -28395,18 +28452,18 @@
 </file>
 
 <file path=customXml/item1.xml><?xml version="1.0" encoding="utf-8"?>
+<p:properties xmlns:p="http://schemas.microsoft.com/office/2006/metadata/properties" xmlns:xsi="http://www.w3.org/2001/XMLSchema-instance" xmlns:pc="http://schemas.microsoft.com/office/infopath/2007/PartnerControls">
+  <documentManagement/>
+</p:properties>
+</file>
+
+<file path=customXml/item2.xml><?xml version="1.0" encoding="utf-8"?>
 <?mso-contentType ?>
 <FormTemplates xmlns="http://schemas.microsoft.com/sharepoint/v3/contenttype/forms">
   <Display>DocumentLibraryForm</Display>
   <Edit>DocumentLibraryForm</Edit>
   <New>DocumentLibraryForm</New>
 </FormTemplates>
-</file>
-
-<file path=customXml/item2.xml><?xml version="1.0" encoding="utf-8"?>
-<p:properties xmlns:p="http://schemas.microsoft.com/office/2006/metadata/properties" xmlns:xsi="http://www.w3.org/2001/XMLSchema-instance" xmlns:pc="http://schemas.microsoft.com/office/infopath/2007/PartnerControls">
-  <documentManagement/>
-</p:properties>
 </file>
 
 <file path=customXml/item3.xml><?xml version="1.0" encoding="utf-8"?>
@@ -28459,14 +28516,6 @@
 </file>
 
 <file path=customXml/itemProps1.xml><?xml version="1.0" encoding="utf-8"?>
-<ds:datastoreItem xmlns:ds="http://schemas.openxmlformats.org/officeDocument/2006/customXml" ds:itemID="{19E20559-B232-4371-8690-E3D8007EDB82}">
-  <ds:schemaRefs>
-    <ds:schemaRef ds:uri="http://schemas.microsoft.com/sharepoint/v3/contenttype/forms"/>
-  </ds:schemaRefs>
-</ds:datastoreItem>
-</file>
-
-<file path=customXml/itemProps2.xml><?xml version="1.0" encoding="utf-8"?>
 <ds:datastoreItem xmlns:ds="http://schemas.openxmlformats.org/officeDocument/2006/customXml" ds:itemID="{A50EC660-24D0-43A0-AE5E-E274115E726B}">
   <ds:schemaRefs>
     <ds:schemaRef ds:uri="http://purl.org/dc/elements/1.1/"/>
@@ -28477,6 +28526,14 @@
     <ds:schemaRef ds:uri="http://www.w3.org/XML/1998/namespace"/>
     <ds:schemaRef ds:uri="http://purl.org/dc/dcmitype/"/>
     <ds:schemaRef ds:uri="http://schemas.microsoft.com/office/infopath/2007/PartnerControls"/>
+  </ds:schemaRefs>
+</ds:datastoreItem>
+</file>
+
+<file path=customXml/itemProps2.xml><?xml version="1.0" encoding="utf-8"?>
+<ds:datastoreItem xmlns:ds="http://schemas.openxmlformats.org/officeDocument/2006/customXml" ds:itemID="{19E20559-B232-4371-8690-E3D8007EDB82}">
+  <ds:schemaRefs>
+    <ds:schemaRef ds:uri="http://schemas.microsoft.com/sharepoint/v3/contenttype/forms"/>
   </ds:schemaRefs>
 </ds:datastoreItem>
 </file>

</xml_diff>

<commit_message>
Minor content updates for ISC24 tutorial
</commit_message>
<xml_diff>
--- a/design-a.pptx
+++ b/design-a.pptx
@@ -284,7 +284,7 @@
           <a:p>
             <a:fld id="{0B842F42-2CE9-4E35-95C1-410DC08A50B1}" type="datetimeFigureOut">
               <a:rPr lang="en-US" smtClean="0"/>
-              <a:t>4/4/24</a:t>
+              <a:t>4/24/2024</a:t>
             </a:fld>
             <a:endParaRPr lang="en-US"/>
           </a:p>
@@ -449,7 +449,7 @@
           <a:p>
             <a:fld id="{6F282904-F315-4730-8D91-37D99E141A6F}" type="datetimeFigureOut">
               <a:rPr lang="en-US" smtClean="0"/>
-              <a:t>4/4/24</a:t>
+              <a:t>4/24/2024</a:t>
             </a:fld>
             <a:endParaRPr lang="en-US"/>
           </a:p>
@@ -1940,7 +1940,7 @@
             <p:nvPr userDrawn="1"/>
           </p:nvPicPr>
           <p:blipFill>
-            <a:blip r:embed="rId7">
+            <a:blip r:embed="rId7" cstate="print">
               <a:extLst>
                 <a:ext uri="{28A0092B-C50C-407E-A947-70E740481C1C}">
                   <a14:useLocalDpi xmlns:a14="http://schemas.microsoft.com/office/drawing/2010/main" val="0"/>
@@ -1987,7 +1987,7 @@
             <p:nvPr userDrawn="1"/>
           </p:nvPicPr>
           <p:blipFill>
-            <a:blip r:embed="rId8">
+            <a:blip r:embed="rId8" cstate="print">
               <a:extLst>
                 <a:ext uri="{28A0092B-C50C-407E-A947-70E740481C1C}">
                   <a14:useLocalDpi xmlns:a14="http://schemas.microsoft.com/office/drawing/2010/main" val="0"/>
@@ -3706,7 +3706,7 @@
           <a:p>
             <a:fld id="{68F49DD1-DDB5-AB43-B311-7649AD474C82}" type="datetimeFigureOut">
               <a:rPr lang="en-US" smtClean="0"/>
-              <a:t>4/4/24</a:t>
+              <a:t>4/24/2024</a:t>
             </a:fld>
             <a:endParaRPr lang="en-US"/>
           </a:p>
@@ -4504,8 +4504,8 @@
         </p:nvSpPr>
         <p:spPr>
           <a:xfrm>
-            <a:off x="3177632" y="1959498"/>
-            <a:ext cx="7772308" cy="2855300"/>
+            <a:off x="3177632" y="3239658"/>
+            <a:ext cx="7772308" cy="1781922"/>
           </a:xfrm>
         </p:spPr>
         <p:txBody>
@@ -4513,20 +4513,14 @@
           <a:lstStyle/>
           <a:p>
             <a:r>
-              <a:rPr lang="en-US" dirty="0"/>
-              <a:t>Anshu Dubey</a:t>
-            </a:r>
-          </a:p>
-          <a:p>
-            <a:r>
-              <a:rPr lang="en-US" b="0" i="0" dirty="0">
+              <a:rPr lang="en-US" sz="2000" b="0" i="0" dirty="0">
                 <a:solidFill>
                   <a:srgbClr val="111111"/>
                 </a:solidFill>
                 <a:effectLst/>
-                <a:latin typeface="-apple-system"/>
+                <a:latin typeface="+mn-lt"/>
               </a:rPr>
-              <a:t>Better Scientific Software Tutorial @ ISC24</a:t>
+              <a:t>Better Scientific Software tutorial @ ISC24</a:t>
             </a:r>
           </a:p>
           <a:p>
@@ -4534,20 +4528,26 @@
               <a:solidFill>
                 <a:srgbClr val="111111"/>
               </a:solidFill>
-              <a:latin typeface="-apple-system"/>
+              <a:latin typeface="+mn-lt"/>
             </a:endParaRPr>
           </a:p>
           <a:p>
             <a:r>
-              <a:rPr lang="en-US" sz="2000" dirty="0"/>
+              <a:rPr lang="en-US" sz="2000" dirty="0">
+                <a:latin typeface="+mn-lt"/>
+              </a:rPr>
               <a:t>Contributors: Anshu Dubey (ANL), Mark C. Miller (LLNL), David </a:t>
             </a:r>
             <a:r>
-              <a:rPr lang="en-US" sz="2000" dirty="0" err="1"/>
+              <a:rPr lang="en-US" sz="2000" dirty="0" err="1">
+                <a:latin typeface="+mn-lt"/>
+              </a:rPr>
               <a:t>Bernholdt</a:t>
             </a:r>
             <a:r>
-              <a:rPr lang="en-US" sz="2000" dirty="0"/>
+              <a:rPr lang="en-US" sz="2000" dirty="0">
+                <a:latin typeface="+mn-lt"/>
+              </a:rPr>
               <a:t> (ORNL) </a:t>
             </a:r>
           </a:p>
@@ -4582,6 +4582,660 @@
             <a:r>
               <a:rPr lang="en-US" dirty="0"/>
               <a:t>Scientific Software Design</a:t>
+            </a:r>
+          </a:p>
+        </p:txBody>
+      </p:sp>
+      <p:sp>
+        <p:nvSpPr>
+          <p:cNvPr id="2" name="Text Placeholder 3">
+            <a:extLst>
+              <a:ext uri="{FF2B5EF4-FFF2-40B4-BE49-F238E27FC236}">
+                <a16:creationId xmlns:a16="http://schemas.microsoft.com/office/drawing/2014/main" id="{1AB39271-1180-C491-5A65-8C09B3FC3A89}"/>
+              </a:ext>
+            </a:extLst>
+          </p:cNvPr>
+          <p:cNvSpPr txBox="1">
+            <a:spLocks/>
+          </p:cNvSpPr>
+          <p:nvPr/>
+        </p:nvSpPr>
+        <p:spPr>
+          <a:xfrm>
+            <a:off x="3176924" y="2085870"/>
+            <a:ext cx="2806987" cy="424732"/>
+          </a:xfrm>
+          <a:prstGeom prst="rect">
+            <a:avLst/>
+          </a:prstGeom>
+        </p:spPr>
+        <p:txBody>
+          <a:bodyPr/>
+          <a:lstStyle>
+            <a:lvl1pPr marL="230188" indent="-230188" algn="l" rtl="0" eaLnBrk="1" fontAlgn="base" hangingPunct="1">
+              <a:lnSpc>
+                <a:spcPct val="90000"/>
+              </a:lnSpc>
+              <a:spcBef>
+                <a:spcPts val="1400"/>
+              </a:spcBef>
+              <a:spcAft>
+                <a:spcPct val="0"/>
+              </a:spcAft>
+              <a:buClr>
+                <a:schemeClr val="tx1"/>
+              </a:buClr>
+              <a:buFont typeface="Arial" charset="0"/>
+              <a:buChar char="•"/>
+              <a:defRPr sz="2400" kern="1200">
+                <a:solidFill>
+                  <a:schemeClr val="tx1"/>
+                </a:solidFill>
+                <a:latin typeface="+mn-lt"/>
+                <a:ea typeface="+mn-ea"/>
+                <a:cs typeface="+mn-cs"/>
+              </a:defRPr>
+            </a:lvl1pPr>
+            <a:lvl2pPr marL="625475" indent="-279400" algn="l" rtl="0" eaLnBrk="1" fontAlgn="base" hangingPunct="1">
+              <a:lnSpc>
+                <a:spcPct val="90000"/>
+              </a:lnSpc>
+              <a:spcBef>
+                <a:spcPts val="800"/>
+              </a:spcBef>
+              <a:spcAft>
+                <a:spcPct val="0"/>
+              </a:spcAft>
+              <a:buClr>
+                <a:schemeClr val="tx1"/>
+              </a:buClr>
+              <a:buFont typeface="Arial" charset="0"/>
+              <a:buChar char="–"/>
+              <a:defRPr sz="2000" kern="1200">
+                <a:solidFill>
+                  <a:schemeClr val="tx1"/>
+                </a:solidFill>
+                <a:latin typeface="+mn-lt"/>
+                <a:ea typeface="+mn-ea"/>
+                <a:cs typeface="+mn-cs"/>
+              </a:defRPr>
+            </a:lvl2pPr>
+            <a:lvl3pPr marL="914400" indent="-230188" algn="l" rtl="0" eaLnBrk="1" fontAlgn="base" hangingPunct="1">
+              <a:lnSpc>
+                <a:spcPct val="90000"/>
+              </a:lnSpc>
+              <a:spcBef>
+                <a:spcPts val="800"/>
+              </a:spcBef>
+              <a:spcAft>
+                <a:spcPct val="0"/>
+              </a:spcAft>
+              <a:buClr>
+                <a:schemeClr val="tx1"/>
+              </a:buClr>
+              <a:buFont typeface="Arial" charset="0"/>
+              <a:buChar char="•"/>
+              <a:defRPr sz="1800" kern="1200">
+                <a:solidFill>
+                  <a:schemeClr val="tx1"/>
+                </a:solidFill>
+                <a:latin typeface="+mn-lt"/>
+                <a:ea typeface="+mn-ea"/>
+                <a:cs typeface="+mn-cs"/>
+              </a:defRPr>
+            </a:lvl3pPr>
+            <a:lvl4pPr marL="1144588" indent="-173038" algn="l" rtl="0" eaLnBrk="1" fontAlgn="base" hangingPunct="1">
+              <a:lnSpc>
+                <a:spcPct val="90000"/>
+              </a:lnSpc>
+              <a:spcBef>
+                <a:spcPts val="800"/>
+              </a:spcBef>
+              <a:spcAft>
+                <a:spcPct val="0"/>
+              </a:spcAft>
+              <a:buClr>
+                <a:schemeClr val="tx1"/>
+              </a:buClr>
+              <a:buFont typeface="Arial" charset="0"/>
+              <a:buChar char="–"/>
+              <a:defRPr sz="1600" kern="1200">
+                <a:solidFill>
+                  <a:schemeClr val="tx1"/>
+                </a:solidFill>
+                <a:latin typeface="+mn-lt"/>
+                <a:ea typeface="+mn-ea"/>
+                <a:cs typeface="+mn-cs"/>
+              </a:defRPr>
+            </a:lvl4pPr>
+            <a:lvl5pPr marL="1482725" indent="-222250" algn="l" rtl="0" eaLnBrk="1" fontAlgn="base" hangingPunct="1">
+              <a:lnSpc>
+                <a:spcPct val="90000"/>
+              </a:lnSpc>
+              <a:spcBef>
+                <a:spcPts val="600"/>
+              </a:spcBef>
+              <a:spcAft>
+                <a:spcPct val="0"/>
+              </a:spcAft>
+              <a:buClr>
+                <a:schemeClr val="tx1"/>
+              </a:buClr>
+              <a:buFont typeface="Arial" charset="0"/>
+              <a:buChar char="»"/>
+              <a:defRPr sz="1600" kern="1200">
+                <a:solidFill>
+                  <a:schemeClr val="tx1"/>
+                </a:solidFill>
+                <a:latin typeface="+mn-lt"/>
+                <a:ea typeface="+mn-ea"/>
+                <a:cs typeface="+mn-cs"/>
+              </a:defRPr>
+            </a:lvl5pPr>
+            <a:lvl6pPr marL="2514600" indent="-228600" algn="l" defTabSz="914400" rtl="0" eaLnBrk="1" latinLnBrk="0" hangingPunct="1">
+              <a:spcBef>
+                <a:spcPct val="20000"/>
+              </a:spcBef>
+              <a:buFont typeface="Arial" pitchFamily="34" charset="0"/>
+              <a:buChar char="•"/>
+              <a:defRPr sz="2000" kern="1200">
+                <a:solidFill>
+                  <a:schemeClr val="tx1"/>
+                </a:solidFill>
+                <a:latin typeface="+mn-lt"/>
+                <a:ea typeface="+mn-ea"/>
+                <a:cs typeface="+mn-cs"/>
+              </a:defRPr>
+            </a:lvl6pPr>
+            <a:lvl7pPr marL="2971800" indent="-228600" algn="l" defTabSz="914400" rtl="0" eaLnBrk="1" latinLnBrk="0" hangingPunct="1">
+              <a:spcBef>
+                <a:spcPct val="20000"/>
+              </a:spcBef>
+              <a:buFont typeface="Arial" pitchFamily="34" charset="0"/>
+              <a:buChar char="•"/>
+              <a:defRPr sz="2000" kern="1200">
+                <a:solidFill>
+                  <a:schemeClr val="tx1"/>
+                </a:solidFill>
+                <a:latin typeface="+mn-lt"/>
+                <a:ea typeface="+mn-ea"/>
+                <a:cs typeface="+mn-cs"/>
+              </a:defRPr>
+            </a:lvl7pPr>
+            <a:lvl8pPr marL="3429000" indent="-228600" algn="l" defTabSz="914400" rtl="0" eaLnBrk="1" latinLnBrk="0" hangingPunct="1">
+              <a:spcBef>
+                <a:spcPct val="20000"/>
+              </a:spcBef>
+              <a:buFont typeface="Arial" pitchFamily="34" charset="0"/>
+              <a:buChar char="•"/>
+              <a:defRPr sz="2000" kern="1200">
+                <a:solidFill>
+                  <a:schemeClr val="tx1"/>
+                </a:solidFill>
+                <a:latin typeface="+mn-lt"/>
+                <a:ea typeface="+mn-ea"/>
+                <a:cs typeface="+mn-cs"/>
+              </a:defRPr>
+            </a:lvl8pPr>
+            <a:lvl9pPr marL="3886200" indent="-228600" algn="l" defTabSz="914400" rtl="0" eaLnBrk="1" latinLnBrk="0" hangingPunct="1">
+              <a:spcBef>
+                <a:spcPct val="20000"/>
+              </a:spcBef>
+              <a:buFont typeface="Arial" pitchFamily="34" charset="0"/>
+              <a:buChar char="•"/>
+              <a:defRPr sz="2000" kern="1200">
+                <a:solidFill>
+                  <a:schemeClr val="tx1"/>
+                </a:solidFill>
+                <a:latin typeface="+mn-lt"/>
+                <a:ea typeface="+mn-ea"/>
+                <a:cs typeface="+mn-cs"/>
+              </a:defRPr>
+            </a:lvl9pPr>
+          </a:lstStyle>
+          <a:p>
+            <a:pPr marL="0" indent="0">
+              <a:buNone/>
+            </a:pPr>
+            <a:r>
+              <a:rPr lang="en-US" b="1" u="sng" dirty="0"/>
+              <a:t>Anshu Dubey</a:t>
+            </a:r>
+          </a:p>
+        </p:txBody>
+      </p:sp>
+      <p:sp>
+        <p:nvSpPr>
+          <p:cNvPr id="4" name="Text Placeholder 4">
+            <a:extLst>
+              <a:ext uri="{FF2B5EF4-FFF2-40B4-BE49-F238E27FC236}">
+                <a16:creationId xmlns:a16="http://schemas.microsoft.com/office/drawing/2014/main" id="{A6457CA2-EC79-7239-A61D-5F31A2015901}"/>
+              </a:ext>
+            </a:extLst>
+          </p:cNvPr>
+          <p:cNvSpPr txBox="1">
+            <a:spLocks/>
+          </p:cNvSpPr>
+          <p:nvPr/>
+        </p:nvSpPr>
+        <p:spPr>
+          <a:xfrm>
+            <a:off x="5290491" y="2140952"/>
+            <a:ext cx="1690167" cy="376085"/>
+          </a:xfrm>
+          <a:prstGeom prst="rect">
+            <a:avLst/>
+          </a:prstGeom>
+        </p:spPr>
+        <p:txBody>
+          <a:bodyPr/>
+          <a:lstStyle>
+            <a:lvl1pPr marL="230188" indent="-230188" algn="l" rtl="0" eaLnBrk="1" fontAlgn="base" hangingPunct="1">
+              <a:lnSpc>
+                <a:spcPct val="90000"/>
+              </a:lnSpc>
+              <a:spcBef>
+                <a:spcPts val="1400"/>
+              </a:spcBef>
+              <a:spcAft>
+                <a:spcPct val="0"/>
+              </a:spcAft>
+              <a:buClr>
+                <a:schemeClr val="tx1"/>
+              </a:buClr>
+              <a:buFont typeface="Arial" charset="0"/>
+              <a:buChar char="•"/>
+              <a:defRPr sz="2400" kern="1200">
+                <a:solidFill>
+                  <a:schemeClr val="tx1"/>
+                </a:solidFill>
+                <a:latin typeface="+mn-lt"/>
+                <a:ea typeface="+mn-ea"/>
+                <a:cs typeface="+mn-cs"/>
+              </a:defRPr>
+            </a:lvl1pPr>
+            <a:lvl2pPr marL="625475" indent="-279400" algn="l" rtl="0" eaLnBrk="1" fontAlgn="base" hangingPunct="1">
+              <a:lnSpc>
+                <a:spcPct val="90000"/>
+              </a:lnSpc>
+              <a:spcBef>
+                <a:spcPts val="800"/>
+              </a:spcBef>
+              <a:spcAft>
+                <a:spcPct val="0"/>
+              </a:spcAft>
+              <a:buClr>
+                <a:schemeClr val="tx1"/>
+              </a:buClr>
+              <a:buFont typeface="Arial" charset="0"/>
+              <a:buChar char="–"/>
+              <a:defRPr sz="2000" kern="1200">
+                <a:solidFill>
+                  <a:schemeClr val="tx1"/>
+                </a:solidFill>
+                <a:latin typeface="+mn-lt"/>
+                <a:ea typeface="+mn-ea"/>
+                <a:cs typeface="+mn-cs"/>
+              </a:defRPr>
+            </a:lvl2pPr>
+            <a:lvl3pPr marL="914400" indent="-230188" algn="l" rtl="0" eaLnBrk="1" fontAlgn="base" hangingPunct="1">
+              <a:lnSpc>
+                <a:spcPct val="90000"/>
+              </a:lnSpc>
+              <a:spcBef>
+                <a:spcPts val="800"/>
+              </a:spcBef>
+              <a:spcAft>
+                <a:spcPct val="0"/>
+              </a:spcAft>
+              <a:buClr>
+                <a:schemeClr val="tx1"/>
+              </a:buClr>
+              <a:buFont typeface="Arial" charset="0"/>
+              <a:buChar char="•"/>
+              <a:defRPr sz="1800" kern="1200">
+                <a:solidFill>
+                  <a:schemeClr val="tx1"/>
+                </a:solidFill>
+                <a:latin typeface="+mn-lt"/>
+                <a:ea typeface="+mn-ea"/>
+                <a:cs typeface="+mn-cs"/>
+              </a:defRPr>
+            </a:lvl3pPr>
+            <a:lvl4pPr marL="1144588" indent="-173038" algn="l" rtl="0" eaLnBrk="1" fontAlgn="base" hangingPunct="1">
+              <a:lnSpc>
+                <a:spcPct val="90000"/>
+              </a:lnSpc>
+              <a:spcBef>
+                <a:spcPts val="800"/>
+              </a:spcBef>
+              <a:spcAft>
+                <a:spcPct val="0"/>
+              </a:spcAft>
+              <a:buClr>
+                <a:schemeClr val="tx1"/>
+              </a:buClr>
+              <a:buFont typeface="Arial" charset="0"/>
+              <a:buChar char="–"/>
+              <a:defRPr sz="1600" kern="1200">
+                <a:solidFill>
+                  <a:schemeClr val="tx1"/>
+                </a:solidFill>
+                <a:latin typeface="+mn-lt"/>
+                <a:ea typeface="+mn-ea"/>
+                <a:cs typeface="+mn-cs"/>
+              </a:defRPr>
+            </a:lvl4pPr>
+            <a:lvl5pPr marL="1482725" indent="-222250" algn="l" rtl="0" eaLnBrk="1" fontAlgn="base" hangingPunct="1">
+              <a:lnSpc>
+                <a:spcPct val="90000"/>
+              </a:lnSpc>
+              <a:spcBef>
+                <a:spcPts val="600"/>
+              </a:spcBef>
+              <a:spcAft>
+                <a:spcPct val="0"/>
+              </a:spcAft>
+              <a:buClr>
+                <a:schemeClr val="tx1"/>
+              </a:buClr>
+              <a:buFont typeface="Arial" charset="0"/>
+              <a:buChar char="»"/>
+              <a:defRPr sz="1600" kern="1200">
+                <a:solidFill>
+                  <a:schemeClr val="tx1"/>
+                </a:solidFill>
+                <a:latin typeface="+mn-lt"/>
+                <a:ea typeface="+mn-ea"/>
+                <a:cs typeface="+mn-cs"/>
+              </a:defRPr>
+            </a:lvl5pPr>
+            <a:lvl6pPr marL="2514600" indent="-228600" algn="l" defTabSz="914400" rtl="0" eaLnBrk="1" latinLnBrk="0" hangingPunct="1">
+              <a:spcBef>
+                <a:spcPct val="20000"/>
+              </a:spcBef>
+              <a:buFont typeface="Arial" pitchFamily="34" charset="0"/>
+              <a:buChar char="•"/>
+              <a:defRPr sz="2000" kern="1200">
+                <a:solidFill>
+                  <a:schemeClr val="tx1"/>
+                </a:solidFill>
+                <a:latin typeface="+mn-lt"/>
+                <a:ea typeface="+mn-ea"/>
+                <a:cs typeface="+mn-cs"/>
+              </a:defRPr>
+            </a:lvl6pPr>
+            <a:lvl7pPr marL="2971800" indent="-228600" algn="l" defTabSz="914400" rtl="0" eaLnBrk="1" latinLnBrk="0" hangingPunct="1">
+              <a:spcBef>
+                <a:spcPct val="20000"/>
+              </a:spcBef>
+              <a:buFont typeface="Arial" pitchFamily="34" charset="0"/>
+              <a:buChar char="•"/>
+              <a:defRPr sz="2000" kern="1200">
+                <a:solidFill>
+                  <a:schemeClr val="tx1"/>
+                </a:solidFill>
+                <a:latin typeface="+mn-lt"/>
+                <a:ea typeface="+mn-ea"/>
+                <a:cs typeface="+mn-cs"/>
+              </a:defRPr>
+            </a:lvl7pPr>
+            <a:lvl8pPr marL="3429000" indent="-228600" algn="l" defTabSz="914400" rtl="0" eaLnBrk="1" latinLnBrk="0" hangingPunct="1">
+              <a:spcBef>
+                <a:spcPct val="20000"/>
+              </a:spcBef>
+              <a:buFont typeface="Arial" pitchFamily="34" charset="0"/>
+              <a:buChar char="•"/>
+              <a:defRPr sz="2000" kern="1200">
+                <a:solidFill>
+                  <a:schemeClr val="tx1"/>
+                </a:solidFill>
+                <a:latin typeface="+mn-lt"/>
+                <a:ea typeface="+mn-ea"/>
+                <a:cs typeface="+mn-cs"/>
+              </a:defRPr>
+            </a:lvl8pPr>
+            <a:lvl9pPr marL="3886200" indent="-228600" algn="l" defTabSz="914400" rtl="0" eaLnBrk="1" latinLnBrk="0" hangingPunct="1">
+              <a:spcBef>
+                <a:spcPct val="20000"/>
+              </a:spcBef>
+              <a:buFont typeface="Arial" pitchFamily="34" charset="0"/>
+              <a:buChar char="•"/>
+              <a:defRPr sz="2000" kern="1200">
+                <a:solidFill>
+                  <a:schemeClr val="tx1"/>
+                </a:solidFill>
+                <a:latin typeface="+mn-lt"/>
+                <a:ea typeface="+mn-ea"/>
+                <a:cs typeface="+mn-cs"/>
+              </a:defRPr>
+            </a:lvl9pPr>
+          </a:lstStyle>
+          <a:p>
+            <a:pPr marL="0" indent="0">
+              <a:buNone/>
+            </a:pPr>
+            <a:r>
+              <a:rPr lang="en-US" sz="2000" dirty="0"/>
+              <a:t>(she/her)</a:t>
+            </a:r>
+          </a:p>
+        </p:txBody>
+      </p:sp>
+      <p:sp>
+        <p:nvSpPr>
+          <p:cNvPr id="5" name="Text Placeholder 5">
+            <a:extLst>
+              <a:ext uri="{FF2B5EF4-FFF2-40B4-BE49-F238E27FC236}">
+                <a16:creationId xmlns:a16="http://schemas.microsoft.com/office/drawing/2014/main" id="{CF659F22-9FE4-CC84-D3C4-0F7F24393A0A}"/>
+              </a:ext>
+            </a:extLst>
+          </p:cNvPr>
+          <p:cNvSpPr txBox="1">
+            <a:spLocks/>
+          </p:cNvSpPr>
+          <p:nvPr/>
+        </p:nvSpPr>
+        <p:spPr>
+          <a:xfrm>
+            <a:off x="3176924" y="2459716"/>
+            <a:ext cx="8292315" cy="369332"/>
+          </a:xfrm>
+          <a:prstGeom prst="rect">
+            <a:avLst/>
+          </a:prstGeom>
+        </p:spPr>
+        <p:txBody>
+          <a:bodyPr/>
+          <a:lstStyle>
+            <a:lvl1pPr marL="230188" indent="-230188" algn="l" rtl="0" eaLnBrk="1" fontAlgn="base" hangingPunct="1">
+              <a:lnSpc>
+                <a:spcPct val="90000"/>
+              </a:lnSpc>
+              <a:spcBef>
+                <a:spcPts val="1400"/>
+              </a:spcBef>
+              <a:spcAft>
+                <a:spcPct val="0"/>
+              </a:spcAft>
+              <a:buClr>
+                <a:schemeClr val="tx1"/>
+              </a:buClr>
+              <a:buFont typeface="Arial" charset="0"/>
+              <a:buChar char="•"/>
+              <a:defRPr sz="2400" kern="1200">
+                <a:solidFill>
+                  <a:schemeClr val="tx1"/>
+                </a:solidFill>
+                <a:latin typeface="+mn-lt"/>
+                <a:ea typeface="+mn-ea"/>
+                <a:cs typeface="+mn-cs"/>
+              </a:defRPr>
+            </a:lvl1pPr>
+            <a:lvl2pPr marL="625475" indent="-279400" algn="l" rtl="0" eaLnBrk="1" fontAlgn="base" hangingPunct="1">
+              <a:lnSpc>
+                <a:spcPct val="90000"/>
+              </a:lnSpc>
+              <a:spcBef>
+                <a:spcPts val="800"/>
+              </a:spcBef>
+              <a:spcAft>
+                <a:spcPct val="0"/>
+              </a:spcAft>
+              <a:buClr>
+                <a:schemeClr val="tx1"/>
+              </a:buClr>
+              <a:buFont typeface="Arial" charset="0"/>
+              <a:buChar char="–"/>
+              <a:defRPr sz="2000" kern="1200">
+                <a:solidFill>
+                  <a:schemeClr val="tx1"/>
+                </a:solidFill>
+                <a:latin typeface="+mn-lt"/>
+                <a:ea typeface="+mn-ea"/>
+                <a:cs typeface="+mn-cs"/>
+              </a:defRPr>
+            </a:lvl2pPr>
+            <a:lvl3pPr marL="914400" indent="-230188" algn="l" rtl="0" eaLnBrk="1" fontAlgn="base" hangingPunct="1">
+              <a:lnSpc>
+                <a:spcPct val="90000"/>
+              </a:lnSpc>
+              <a:spcBef>
+                <a:spcPts val="800"/>
+              </a:spcBef>
+              <a:spcAft>
+                <a:spcPct val="0"/>
+              </a:spcAft>
+              <a:buClr>
+                <a:schemeClr val="tx1"/>
+              </a:buClr>
+              <a:buFont typeface="Arial" charset="0"/>
+              <a:buChar char="•"/>
+              <a:defRPr sz="1800" kern="1200">
+                <a:solidFill>
+                  <a:schemeClr val="tx1"/>
+                </a:solidFill>
+                <a:latin typeface="+mn-lt"/>
+                <a:ea typeface="+mn-ea"/>
+                <a:cs typeface="+mn-cs"/>
+              </a:defRPr>
+            </a:lvl3pPr>
+            <a:lvl4pPr marL="1144588" indent="-173038" algn="l" rtl="0" eaLnBrk="1" fontAlgn="base" hangingPunct="1">
+              <a:lnSpc>
+                <a:spcPct val="90000"/>
+              </a:lnSpc>
+              <a:spcBef>
+                <a:spcPts val="800"/>
+              </a:spcBef>
+              <a:spcAft>
+                <a:spcPct val="0"/>
+              </a:spcAft>
+              <a:buClr>
+                <a:schemeClr val="tx1"/>
+              </a:buClr>
+              <a:buFont typeface="Arial" charset="0"/>
+              <a:buChar char="–"/>
+              <a:defRPr sz="1600" kern="1200">
+                <a:solidFill>
+                  <a:schemeClr val="tx1"/>
+                </a:solidFill>
+                <a:latin typeface="+mn-lt"/>
+                <a:ea typeface="+mn-ea"/>
+                <a:cs typeface="+mn-cs"/>
+              </a:defRPr>
+            </a:lvl4pPr>
+            <a:lvl5pPr marL="1482725" indent="-222250" algn="l" rtl="0" eaLnBrk="1" fontAlgn="base" hangingPunct="1">
+              <a:lnSpc>
+                <a:spcPct val="90000"/>
+              </a:lnSpc>
+              <a:spcBef>
+                <a:spcPts val="600"/>
+              </a:spcBef>
+              <a:spcAft>
+                <a:spcPct val="0"/>
+              </a:spcAft>
+              <a:buClr>
+                <a:schemeClr val="tx1"/>
+              </a:buClr>
+              <a:buFont typeface="Arial" charset="0"/>
+              <a:buChar char="»"/>
+              <a:defRPr sz="1600" kern="1200">
+                <a:solidFill>
+                  <a:schemeClr val="tx1"/>
+                </a:solidFill>
+                <a:latin typeface="+mn-lt"/>
+                <a:ea typeface="+mn-ea"/>
+                <a:cs typeface="+mn-cs"/>
+              </a:defRPr>
+            </a:lvl5pPr>
+            <a:lvl6pPr marL="2514600" indent="-228600" algn="l" defTabSz="914400" rtl="0" eaLnBrk="1" latinLnBrk="0" hangingPunct="1">
+              <a:spcBef>
+                <a:spcPct val="20000"/>
+              </a:spcBef>
+              <a:buFont typeface="Arial" pitchFamily="34" charset="0"/>
+              <a:buChar char="•"/>
+              <a:defRPr sz="2000" kern="1200">
+                <a:solidFill>
+                  <a:schemeClr val="tx1"/>
+                </a:solidFill>
+                <a:latin typeface="+mn-lt"/>
+                <a:ea typeface="+mn-ea"/>
+                <a:cs typeface="+mn-cs"/>
+              </a:defRPr>
+            </a:lvl6pPr>
+            <a:lvl7pPr marL="2971800" indent="-228600" algn="l" defTabSz="914400" rtl="0" eaLnBrk="1" latinLnBrk="0" hangingPunct="1">
+              <a:spcBef>
+                <a:spcPct val="20000"/>
+              </a:spcBef>
+              <a:buFont typeface="Arial" pitchFamily="34" charset="0"/>
+              <a:buChar char="•"/>
+              <a:defRPr sz="2000" kern="1200">
+                <a:solidFill>
+                  <a:schemeClr val="tx1"/>
+                </a:solidFill>
+                <a:latin typeface="+mn-lt"/>
+                <a:ea typeface="+mn-ea"/>
+                <a:cs typeface="+mn-cs"/>
+              </a:defRPr>
+            </a:lvl7pPr>
+            <a:lvl8pPr marL="3429000" indent="-228600" algn="l" defTabSz="914400" rtl="0" eaLnBrk="1" latinLnBrk="0" hangingPunct="1">
+              <a:spcBef>
+                <a:spcPct val="20000"/>
+              </a:spcBef>
+              <a:buFont typeface="Arial" pitchFamily="34" charset="0"/>
+              <a:buChar char="•"/>
+              <a:defRPr sz="2000" kern="1200">
+                <a:solidFill>
+                  <a:schemeClr val="tx1"/>
+                </a:solidFill>
+                <a:latin typeface="+mn-lt"/>
+                <a:ea typeface="+mn-ea"/>
+                <a:cs typeface="+mn-cs"/>
+              </a:defRPr>
+            </a:lvl8pPr>
+            <a:lvl9pPr marL="3886200" indent="-228600" algn="l" defTabSz="914400" rtl="0" eaLnBrk="1" latinLnBrk="0" hangingPunct="1">
+              <a:spcBef>
+                <a:spcPct val="20000"/>
+              </a:spcBef>
+              <a:buFont typeface="Arial" pitchFamily="34" charset="0"/>
+              <a:buChar char="•"/>
+              <a:defRPr sz="2000" kern="1200">
+                <a:solidFill>
+                  <a:schemeClr val="tx1"/>
+                </a:solidFill>
+                <a:latin typeface="+mn-lt"/>
+                <a:ea typeface="+mn-ea"/>
+                <a:cs typeface="+mn-cs"/>
+              </a:defRPr>
+            </a:lvl9pPr>
+          </a:lstStyle>
+          <a:p>
+            <a:pPr marL="0" indent="0">
+              <a:buNone/>
+            </a:pPr>
+            <a:r>
+              <a:rPr lang="en-US" sz="2000" dirty="0"/>
+              <a:t>Argonne National Laboratory</a:t>
             </a:r>
           </a:p>
         </p:txBody>
@@ -6389,7 +7043,7 @@
           <a:noFill/>
           <a:extLst>
             <a:ext uri="{909E8E84-426E-40dd-AFC4-6F175D3DCCD1}">
-              <a14:hiddenFill xmlns="" xmlns:a14="http://schemas.microsoft.com/office/drawing/2010/main">
+              <a14:hiddenFill xmlns:a14="http://schemas.microsoft.com/office/drawing/2010/main" xmlns="">
                 <a:solidFill>
                   <a:srgbClr val="FFFFFF"/>
                 </a:solidFill>
@@ -6677,7 +7331,17 @@
           <a:p>
             <a:r>
               <a:rPr lang="en-US" dirty="0"/>
-              <a:t>Adaptive mesh refinement =&gt; divide domain into blocks</a:t>
+              <a:t>Adaptive mesh refinement </a:t>
+            </a:r>
+            <a:r>
+              <a:rPr lang="en-US" dirty="0">
+                <a:sym typeface="Wingdings" panose="05000000000000000000" pitchFamily="2" charset="2"/>
+              </a:rPr>
+              <a:t></a:t>
+            </a:r>
+            <a:r>
+              <a:rPr lang="en-US" dirty="0"/>
+              <a:t> divide domain into blocks</a:t>
             </a:r>
           </a:p>
           <a:p>
@@ -10545,27 +11209,7 @@
                 <a:effectLst/>
                 <a:latin typeface="+mn-lt"/>
               </a:rPr>
-              <a:t>Anshu Dubey, David E. </a:t>
-            </a:r>
-            <a:r>
-              <a:rPr lang="en-US" sz="1600" b="0" i="0" dirty="0" err="1">
-                <a:solidFill>
-                  <a:srgbClr val="111111"/>
-                </a:solidFill>
-                <a:effectLst/>
-                <a:latin typeface="+mn-lt"/>
-              </a:rPr>
-              <a:t>Bernholdt</a:t>
-            </a:r>
-            <a:r>
-              <a:rPr lang="en-US" sz="1600" b="0" i="0" dirty="0">
-                <a:solidFill>
-                  <a:srgbClr val="111111"/>
-                </a:solidFill>
-                <a:effectLst/>
-                <a:latin typeface="+mn-lt"/>
-              </a:rPr>
-              <a:t>, Better Scientific Software tutorial, in ISC High Performance, Hamburg, Germany and online, 2024</a:t>
+              <a:t>Anshu Dubey, Better Scientific Software tutorial, in ISC High Performance, Hamburg, Germany and online, 2024</a:t>
             </a:r>
           </a:p>
           <a:p>
@@ -21300,7 +21944,7 @@
               <a:effectLst/>
               <a:extLst>
                 <a:ext uri="{C572A759-6A51-4108-AA02-DFA0A04FC94B}">
-                  <ma14:wrappingTextBoxFlag xmlns="" xmlns:m="http://schemas.openxmlformats.org/officeDocument/2006/math" xmlns:a14="http://schemas.microsoft.com/office/drawing/2010/main" xmlns:ma14="http://schemas.microsoft.com/office/mac/drawingml/2011/main" val="1"/>
+                  <ma14:wrappingTextBoxFlag xmlns:ma14="http://schemas.microsoft.com/office/mac/drawingml/2011/main" xmlns:a14="http://schemas.microsoft.com/office/drawing/2010/main" xmlns:m="http://schemas.openxmlformats.org/officeDocument/2006/math" xmlns="" val="1"/>
                 </a:ext>
               </a:extLst>
             </p:spPr>
@@ -21417,7 +22061,7 @@
               <a:effectLst/>
               <a:extLst>
                 <a:ext uri="{C572A759-6A51-4108-AA02-DFA0A04FC94B}">
-                  <ma14:wrappingTextBoxFlag xmlns="" xmlns:m="http://schemas.openxmlformats.org/officeDocument/2006/math" xmlns:a14="http://schemas.microsoft.com/office/drawing/2010/main" xmlns:ma14="http://schemas.microsoft.com/office/mac/drawingml/2011/main" val="1"/>
+                  <ma14:wrappingTextBoxFlag xmlns:ma14="http://schemas.microsoft.com/office/mac/drawingml/2011/main" xmlns:a14="http://schemas.microsoft.com/office/drawing/2010/main" xmlns:m="http://schemas.openxmlformats.org/officeDocument/2006/math" xmlns="" val="1"/>
                 </a:ext>
               </a:extLst>
             </p:spPr>
@@ -21547,7 +22191,7 @@
               <a:effectLst/>
               <a:extLst>
                 <a:ext uri="{C572A759-6A51-4108-AA02-DFA0A04FC94B}">
-                  <ma14:wrappingTextBoxFlag xmlns="" xmlns:m="http://schemas.openxmlformats.org/officeDocument/2006/math" xmlns:a14="http://schemas.microsoft.com/office/drawing/2010/main" xmlns:ma14="http://schemas.microsoft.com/office/mac/drawingml/2011/main" val="1"/>
+                  <ma14:wrappingTextBoxFlag xmlns:ma14="http://schemas.microsoft.com/office/mac/drawingml/2011/main" xmlns:a14="http://schemas.microsoft.com/office/drawing/2010/main" xmlns:m="http://schemas.openxmlformats.org/officeDocument/2006/math" xmlns="" val="1"/>
                 </a:ext>
               </a:extLst>
             </p:spPr>
@@ -21672,7 +22316,7 @@
               <a:effectLst/>
               <a:extLst>
                 <a:ext uri="{C572A759-6A51-4108-AA02-DFA0A04FC94B}">
-                  <ma14:wrappingTextBoxFlag xmlns="" xmlns:m="http://schemas.openxmlformats.org/officeDocument/2006/math" xmlns:a14="http://schemas.microsoft.com/office/drawing/2010/main" xmlns:ma14="http://schemas.microsoft.com/office/mac/drawingml/2011/main" val="1"/>
+                  <ma14:wrappingTextBoxFlag xmlns:ma14="http://schemas.microsoft.com/office/mac/drawingml/2011/main" xmlns:a14="http://schemas.microsoft.com/office/drawing/2010/main" xmlns:m="http://schemas.openxmlformats.org/officeDocument/2006/math" xmlns="" val="1"/>
                 </a:ext>
               </a:extLst>
             </p:spPr>
@@ -21829,7 +22473,7 @@
               <a:effectLst/>
               <a:extLst>
                 <a:ext uri="{C572A759-6A51-4108-AA02-DFA0A04FC94B}">
-                  <ma14:wrappingTextBoxFlag xmlns="" xmlns:m="http://schemas.openxmlformats.org/officeDocument/2006/math" xmlns:a14="http://schemas.microsoft.com/office/drawing/2010/main" xmlns:ma14="http://schemas.microsoft.com/office/mac/drawingml/2011/main" val="1"/>
+                  <ma14:wrappingTextBoxFlag xmlns:ma14="http://schemas.microsoft.com/office/mac/drawingml/2011/main" xmlns:a14="http://schemas.microsoft.com/office/drawing/2010/main" xmlns:m="http://schemas.openxmlformats.org/officeDocument/2006/math" xmlns="" val="1"/>
                 </a:ext>
               </a:extLst>
             </p:spPr>
@@ -21949,7 +22593,7 @@
               <a:effectLst/>
               <a:extLst>
                 <a:ext uri="{C572A759-6A51-4108-AA02-DFA0A04FC94B}">
-                  <ma14:wrappingTextBoxFlag xmlns="" xmlns:m="http://schemas.openxmlformats.org/officeDocument/2006/math" xmlns:a14="http://schemas.microsoft.com/office/drawing/2010/main" xmlns:ma14="http://schemas.microsoft.com/office/mac/drawingml/2011/main" val="1"/>
+                  <ma14:wrappingTextBoxFlag xmlns:ma14="http://schemas.microsoft.com/office/mac/drawingml/2011/main" xmlns:a14="http://schemas.microsoft.com/office/drawing/2010/main" xmlns:m="http://schemas.openxmlformats.org/officeDocument/2006/math" xmlns="" val="1"/>
                 </a:ext>
               </a:extLst>
             </p:spPr>
@@ -22077,7 +22721,7 @@
               <a:effectLst/>
               <a:extLst>
                 <a:ext uri="{C572A759-6A51-4108-AA02-DFA0A04FC94B}">
-                  <ma14:wrappingTextBoxFlag xmlns="" xmlns:m="http://schemas.openxmlformats.org/officeDocument/2006/math" xmlns:a14="http://schemas.microsoft.com/office/drawing/2010/main" xmlns:ma14="http://schemas.microsoft.com/office/mac/drawingml/2011/main" val="1"/>
+                  <ma14:wrappingTextBoxFlag xmlns:ma14="http://schemas.microsoft.com/office/mac/drawingml/2011/main" xmlns:a14="http://schemas.microsoft.com/office/drawing/2010/main" xmlns:m="http://schemas.openxmlformats.org/officeDocument/2006/math" xmlns="" val="1"/>
                 </a:ext>
               </a:extLst>
             </p:spPr>
@@ -22206,7 +22850,7 @@
               <a:effectLst/>
               <a:extLst>
                 <a:ext uri="{C572A759-6A51-4108-AA02-DFA0A04FC94B}">
-                  <ma14:wrappingTextBoxFlag xmlns="" xmlns:m="http://schemas.openxmlformats.org/officeDocument/2006/math" xmlns:a14="http://schemas.microsoft.com/office/drawing/2010/main" xmlns:ma14="http://schemas.microsoft.com/office/mac/drawingml/2011/main" val="1"/>
+                  <ma14:wrappingTextBoxFlag xmlns:ma14="http://schemas.microsoft.com/office/mac/drawingml/2011/main" xmlns:a14="http://schemas.microsoft.com/office/drawing/2010/main" xmlns:m="http://schemas.openxmlformats.org/officeDocument/2006/math" xmlns="" val="1"/>
                 </a:ext>
               </a:extLst>
             </p:spPr>
@@ -22383,7 +23027,7 @@
               <a:effectLst/>
               <a:extLst>
                 <a:ext uri="{C572A759-6A51-4108-AA02-DFA0A04FC94B}">
-                  <ma14:wrappingTextBoxFlag xmlns="" xmlns:m="http://schemas.openxmlformats.org/officeDocument/2006/math" xmlns:a14="http://schemas.microsoft.com/office/drawing/2010/main" xmlns:ma14="http://schemas.microsoft.com/office/mac/drawingml/2011/main" val="1"/>
+                  <ma14:wrappingTextBoxFlag xmlns:ma14="http://schemas.microsoft.com/office/mac/drawingml/2011/main" xmlns:a14="http://schemas.microsoft.com/office/drawing/2010/main" xmlns:m="http://schemas.openxmlformats.org/officeDocument/2006/math" xmlns="" val="1"/>
                 </a:ext>
               </a:extLst>
             </p:spPr>
@@ -22500,7 +23144,7 @@
               <a:effectLst/>
               <a:extLst>
                 <a:ext uri="{C572A759-6A51-4108-AA02-DFA0A04FC94B}">
-                  <ma14:wrappingTextBoxFlag xmlns="" xmlns:m="http://schemas.openxmlformats.org/officeDocument/2006/math" xmlns:a14="http://schemas.microsoft.com/office/drawing/2010/main" xmlns:ma14="http://schemas.microsoft.com/office/mac/drawingml/2011/main" val="1"/>
+                  <ma14:wrappingTextBoxFlag xmlns:ma14="http://schemas.microsoft.com/office/mac/drawingml/2011/main" xmlns:a14="http://schemas.microsoft.com/office/drawing/2010/main" xmlns:m="http://schemas.openxmlformats.org/officeDocument/2006/math" xmlns="" val="1"/>
                 </a:ext>
               </a:extLst>
             </p:spPr>
@@ -22629,7 +23273,7 @@
               <a:effectLst/>
               <a:extLst>
                 <a:ext uri="{C572A759-6A51-4108-AA02-DFA0A04FC94B}">
-                  <ma14:wrappingTextBoxFlag xmlns="" xmlns:m="http://schemas.openxmlformats.org/officeDocument/2006/math" xmlns:a14="http://schemas.microsoft.com/office/drawing/2010/main" xmlns:ma14="http://schemas.microsoft.com/office/mac/drawingml/2011/main" val="1"/>
+                  <ma14:wrappingTextBoxFlag xmlns:ma14="http://schemas.microsoft.com/office/mac/drawingml/2011/main" xmlns:a14="http://schemas.microsoft.com/office/drawing/2010/main" xmlns:m="http://schemas.openxmlformats.org/officeDocument/2006/math" xmlns="" val="1"/>
                 </a:ext>
               </a:extLst>
             </p:spPr>
@@ -22752,7 +23396,7 @@
               <a:effectLst/>
               <a:extLst>
                 <a:ext uri="{C572A759-6A51-4108-AA02-DFA0A04FC94B}">
-                  <ma14:wrappingTextBoxFlag xmlns="" xmlns:m="http://schemas.openxmlformats.org/officeDocument/2006/math" xmlns:a14="http://schemas.microsoft.com/office/drawing/2010/main" xmlns:ma14="http://schemas.microsoft.com/office/mac/drawingml/2011/main" val="1"/>
+                  <ma14:wrappingTextBoxFlag xmlns:ma14="http://schemas.microsoft.com/office/mac/drawingml/2011/main" xmlns:a14="http://schemas.microsoft.com/office/drawing/2010/main" xmlns:m="http://schemas.openxmlformats.org/officeDocument/2006/math" xmlns="" val="1"/>
                 </a:ext>
               </a:extLst>
             </p:spPr>
@@ -23359,7 +24003,7 @@
               <a:effectLst/>
               <a:extLst>
                 <a:ext uri="{C572A759-6A51-4108-AA02-DFA0A04FC94B}">
-                  <ma14:wrappingTextBoxFlag xmlns="" xmlns:m="http://schemas.openxmlformats.org/officeDocument/2006/math" xmlns:a14="http://schemas.microsoft.com/office/drawing/2010/main" xmlns:ma14="http://schemas.microsoft.com/office/mac/drawingml/2011/main" val="1"/>
+                  <ma14:wrappingTextBoxFlag xmlns:ma14="http://schemas.microsoft.com/office/mac/drawingml/2011/main" xmlns:a14="http://schemas.microsoft.com/office/drawing/2010/main" xmlns:m="http://schemas.openxmlformats.org/officeDocument/2006/math" xmlns="" val="1"/>
                 </a:ext>
               </a:extLst>
             </p:spPr>
@@ -23493,7 +24137,7 @@
               <a:effectLst/>
               <a:extLst>
                 <a:ext uri="{C572A759-6A51-4108-AA02-DFA0A04FC94B}">
-                  <ma14:wrappingTextBoxFlag xmlns="" xmlns:m="http://schemas.openxmlformats.org/officeDocument/2006/math" xmlns:a14="http://schemas.microsoft.com/office/drawing/2010/main" xmlns:ma14="http://schemas.microsoft.com/office/mac/drawingml/2011/main" val="1"/>
+                  <ma14:wrappingTextBoxFlag xmlns:ma14="http://schemas.microsoft.com/office/mac/drawingml/2011/main" xmlns:a14="http://schemas.microsoft.com/office/drawing/2010/main" xmlns:m="http://schemas.openxmlformats.org/officeDocument/2006/math" xmlns="" val="1"/>
                 </a:ext>
               </a:extLst>
             </p:spPr>
@@ -23610,7 +24254,7 @@
               <a:effectLst/>
               <a:extLst>
                 <a:ext uri="{C572A759-6A51-4108-AA02-DFA0A04FC94B}">
-                  <ma14:wrappingTextBoxFlag xmlns="" xmlns:m="http://schemas.openxmlformats.org/officeDocument/2006/math" xmlns:a14="http://schemas.microsoft.com/office/drawing/2010/main" xmlns:ma14="http://schemas.microsoft.com/office/mac/drawingml/2011/main" val="1"/>
+                  <ma14:wrappingTextBoxFlag xmlns:ma14="http://schemas.microsoft.com/office/mac/drawingml/2011/main" xmlns:a14="http://schemas.microsoft.com/office/drawing/2010/main" xmlns:m="http://schemas.openxmlformats.org/officeDocument/2006/math" xmlns="" val="1"/>
                 </a:ext>
               </a:extLst>
             </p:spPr>
@@ -23743,7 +24387,7 @@
               <a:effectLst/>
               <a:extLst>
                 <a:ext uri="{C572A759-6A51-4108-AA02-DFA0A04FC94B}">
-                  <ma14:wrappingTextBoxFlag xmlns="" xmlns:m="http://schemas.openxmlformats.org/officeDocument/2006/math" xmlns:a14="http://schemas.microsoft.com/office/drawing/2010/main" xmlns:ma14="http://schemas.microsoft.com/office/mac/drawingml/2011/main" val="1"/>
+                  <ma14:wrappingTextBoxFlag xmlns:ma14="http://schemas.microsoft.com/office/mac/drawingml/2011/main" xmlns:a14="http://schemas.microsoft.com/office/drawing/2010/main" xmlns:m="http://schemas.openxmlformats.org/officeDocument/2006/math" xmlns="" val="1"/>
                 </a:ext>
               </a:extLst>
             </p:spPr>
@@ -28452,18 +29096,18 @@
 </file>
 
 <file path=customXml/item1.xml><?xml version="1.0" encoding="utf-8"?>
-<p:properties xmlns:p="http://schemas.microsoft.com/office/2006/metadata/properties" xmlns:xsi="http://www.w3.org/2001/XMLSchema-instance" xmlns:pc="http://schemas.microsoft.com/office/infopath/2007/PartnerControls">
-  <documentManagement/>
-</p:properties>
-</file>
-
-<file path=customXml/item2.xml><?xml version="1.0" encoding="utf-8"?>
 <?mso-contentType ?>
 <FormTemplates xmlns="http://schemas.microsoft.com/sharepoint/v3/contenttype/forms">
   <Display>DocumentLibraryForm</Display>
   <Edit>DocumentLibraryForm</Edit>
   <New>DocumentLibraryForm</New>
 </FormTemplates>
+</file>
+
+<file path=customXml/item2.xml><?xml version="1.0" encoding="utf-8"?>
+<p:properties xmlns:p="http://schemas.microsoft.com/office/2006/metadata/properties" xmlns:xsi="http://www.w3.org/2001/XMLSchema-instance" xmlns:pc="http://schemas.microsoft.com/office/infopath/2007/PartnerControls">
+  <documentManagement/>
+</p:properties>
 </file>
 
 <file path=customXml/item3.xml><?xml version="1.0" encoding="utf-8"?>
@@ -28516,6 +29160,14 @@
 </file>
 
 <file path=customXml/itemProps1.xml><?xml version="1.0" encoding="utf-8"?>
+<ds:datastoreItem xmlns:ds="http://schemas.openxmlformats.org/officeDocument/2006/customXml" ds:itemID="{19E20559-B232-4371-8690-E3D8007EDB82}">
+  <ds:schemaRefs>
+    <ds:schemaRef ds:uri="http://schemas.microsoft.com/sharepoint/v3/contenttype/forms"/>
+  </ds:schemaRefs>
+</ds:datastoreItem>
+</file>
+
+<file path=customXml/itemProps2.xml><?xml version="1.0" encoding="utf-8"?>
 <ds:datastoreItem xmlns:ds="http://schemas.openxmlformats.org/officeDocument/2006/customXml" ds:itemID="{A50EC660-24D0-43A0-AE5E-E274115E726B}">
   <ds:schemaRefs>
     <ds:schemaRef ds:uri="http://purl.org/dc/elements/1.1/"/>
@@ -28526,14 +29178,6 @@
     <ds:schemaRef ds:uri="http://www.w3.org/XML/1998/namespace"/>
     <ds:schemaRef ds:uri="http://purl.org/dc/dcmitype/"/>
     <ds:schemaRef ds:uri="http://schemas.microsoft.com/office/infopath/2007/PartnerControls"/>
-  </ds:schemaRefs>
-</ds:datastoreItem>
-</file>
-
-<file path=customXml/itemProps2.xml><?xml version="1.0" encoding="utf-8"?>
-<ds:datastoreItem xmlns:ds="http://schemas.openxmlformats.org/officeDocument/2006/customXml" ds:itemID="{19E20559-B232-4371-8690-E3D8007EDB82}">
-  <ds:schemaRefs>
-    <ds:schemaRef ds:uri="http://schemas.microsoft.com/sharepoint/v3/contenttype/forms"/>
   </ds:schemaRefs>
 </ds:datastoreItem>
 </file>

</xml_diff>

<commit_message>
Updates to template and license slide
Template change for title page
</commit_message>
<xml_diff>
--- a/design-a.pptx
+++ b/design-a.pptx
@@ -11,8 +11,8 @@
     <p:handoutMasterId r:id="rId36"/>
   </p:handoutMasterIdLst>
   <p:sldIdLst>
-    <p:sldId id="617" r:id="rId5"/>
-    <p:sldId id="320" r:id="rId6"/>
+    <p:sldId id="5601" r:id="rId5"/>
+    <p:sldId id="5602" r:id="rId6"/>
     <p:sldId id="5590" r:id="rId7"/>
     <p:sldId id="5577" r:id="rId8"/>
     <p:sldId id="5591" r:id="rId9"/>
@@ -284,7 +284,7 @@
           <a:p>
             <a:fld id="{0B842F42-2CE9-4E35-95C1-410DC08A50B1}" type="datetimeFigureOut">
               <a:rPr lang="en-US" smtClean="0"/>
-              <a:t>4/24/2024</a:t>
+              <a:t>4/28/2024</a:t>
             </a:fld>
             <a:endParaRPr lang="en-US"/>
           </a:p>
@@ -449,7 +449,7 @@
           <a:p>
             <a:fld id="{6F282904-F315-4730-8D91-37D99E141A6F}" type="datetimeFigureOut">
               <a:rPr lang="en-US" smtClean="0"/>
-              <a:t>4/24/2024</a:t>
+              <a:t>4/28/2024</a:t>
             </a:fld>
             <a:endParaRPr lang="en-US"/>
           </a:p>
@@ -1014,7 +1014,7 @@
 
 <file path=ppt/slideLayouts/slideLayout1.xml><?xml version="1.0" encoding="utf-8"?>
 <p:sldLayout xmlns:a="http://schemas.openxmlformats.org/drawingml/2006/main" xmlns:r="http://schemas.openxmlformats.org/officeDocument/2006/relationships" xmlns:p="http://schemas.openxmlformats.org/presentationml/2006/main" showMasterSp="0" preserve="1" userDrawn="1">
-  <p:cSld name="7_Title Slide">
+  <p:cSld name="9_Title Slide">
     <p:spTree>
       <p:nvGrpSpPr>
         <p:cNvPr id="1" name=""/>
@@ -1202,146 +1202,807 @@
           </a:lstStyle>
           <a:p>
             <a:r>
-              <a:rPr lang="en-US"/>
+              <a:rPr lang="en-US" dirty="0"/>
               <a:t>Click to edit Master title style</a:t>
             </a:r>
-            <a:endParaRPr lang="en-US" dirty="0"/>
+          </a:p>
+        </p:txBody>
+      </p:sp>
+      <p:pic>
+        <p:nvPicPr>
+          <p:cNvPr id="13" name="Picture 2" descr="https://licensebuttons.net/l/by/4.0/88x31.png">
+            <a:extLst>
+              <a:ext uri="{FF2B5EF4-FFF2-40B4-BE49-F238E27FC236}">
+                <a16:creationId xmlns:a16="http://schemas.microsoft.com/office/drawing/2014/main" id="{FAFD7D99-41CA-4FD0-9396-9C5659F22045}"/>
+              </a:ext>
+            </a:extLst>
+          </p:cNvPr>
+          <p:cNvPicPr>
+            <a:picLocks noChangeAspect="1" noChangeArrowheads="1"/>
+          </p:cNvPicPr>
+          <p:nvPr userDrawn="1"/>
+        </p:nvPicPr>
+        <p:blipFill>
+          <a:blip r:embed="rId2">
+            <a:extLst>
+              <a:ext uri="{28A0092B-C50C-407E-A947-70E740481C1C}">
+                <a14:useLocalDpi xmlns:a14="http://schemas.microsoft.com/office/drawing/2010/main" val="0"/>
+              </a:ext>
+            </a:extLst>
+          </a:blip>
+          <a:srcRect/>
+          <a:stretch>
+            <a:fillRect/>
+          </a:stretch>
+        </p:blipFill>
+        <p:spPr bwMode="auto">
+          <a:xfrm>
+            <a:off x="969069" y="5841262"/>
+            <a:ext cx="838200" cy="295275"/>
+          </a:xfrm>
+          <a:prstGeom prst="rect">
+            <a:avLst/>
+          </a:prstGeom>
+          <a:noFill/>
+          <a:extLst>
+            <a:ext uri="{909E8E84-426E-40DD-AFC4-6F175D3DCCD1}">
+              <a14:hiddenFill xmlns:a14="http://schemas.microsoft.com/office/drawing/2010/main">
+                <a:solidFill>
+                  <a:srgbClr val="FFFFFF"/>
+                </a:solidFill>
+              </a14:hiddenFill>
+            </a:ext>
+          </a:extLst>
+        </p:spPr>
+      </p:pic>
+      <p:sp>
+        <p:nvSpPr>
+          <p:cNvPr id="14" name="TextBox 13">
+            <a:extLst>
+              <a:ext uri="{FF2B5EF4-FFF2-40B4-BE49-F238E27FC236}">
+                <a16:creationId xmlns:a16="http://schemas.microsoft.com/office/drawing/2014/main" id="{9D022D1C-99FF-490C-8690-D8081D33C0AF}"/>
+              </a:ext>
+            </a:extLst>
+          </p:cNvPr>
+          <p:cNvSpPr txBox="1"/>
+          <p:nvPr userDrawn="1"/>
+        </p:nvSpPr>
+        <p:spPr>
+          <a:xfrm>
+            <a:off x="1810964" y="5776533"/>
+            <a:ext cx="1171114" cy="424732"/>
+          </a:xfrm>
+          <a:prstGeom prst="rect">
+            <a:avLst/>
+          </a:prstGeom>
+          <a:noFill/>
+        </p:spPr>
+        <p:txBody>
+          <a:bodyPr wrap="square" rtlCol="0">
+            <a:spAutoFit/>
+          </a:bodyPr>
+          <a:lstStyle/>
+          <a:p>
+            <a:pPr algn="ctr">
+              <a:lnSpc>
+                <a:spcPct val="90000"/>
+              </a:lnSpc>
+            </a:pPr>
+            <a:r>
+              <a:rPr lang="en-US" sz="1200" dirty="0"/>
+              <a:t>See slide 2 for license details</a:t>
+            </a:r>
           </a:p>
         </p:txBody>
       </p:sp>
       <p:sp>
         <p:nvSpPr>
-          <p:cNvPr id="3" name="Subtitle 2"/>
+          <p:cNvPr id="6" name="Text Placeholder 5">
+            <a:extLst>
+              <a:ext uri="{FF2B5EF4-FFF2-40B4-BE49-F238E27FC236}">
+                <a16:creationId xmlns:a16="http://schemas.microsoft.com/office/drawing/2014/main" id="{516372F2-F09E-4139-B638-4F1B290B77B9}"/>
+              </a:ext>
+            </a:extLst>
+          </p:cNvPr>
           <p:cNvSpPr>
             <a:spLocks noGrp="1"/>
           </p:cNvSpPr>
-          <p:nvPr userDrawn="1">
-            <p:ph type="subTitle" idx="1"/>
+          <p:nvPr>
+            <p:ph type="body" sz="quarter" idx="10" hasCustomPrompt="1"/>
           </p:nvPr>
         </p:nvSpPr>
         <p:spPr>
           <a:xfrm>
-            <a:off x="3177632" y="2085962"/>
-            <a:ext cx="8292317" cy="2855300"/>
+            <a:off x="9335896" y="5913283"/>
+            <a:ext cx="2852929" cy="262814"/>
           </a:xfrm>
         </p:spPr>
         <p:txBody>
-          <a:bodyPr lIns="109728"/>
+          <a:bodyPr/>
           <a:lstStyle>
-            <a:lvl1pPr marL="0" indent="0" algn="l">
+            <a:lvl1pPr marL="0" indent="0" algn="r">
               <a:buNone/>
-              <a:defRPr sz="2400">
-                <a:solidFill>
-                  <a:schemeClr val="tx1"/>
-                </a:solidFill>
-                <a:latin typeface="Arial" panose="020B0604020202020204" pitchFamily="34" charset="0"/>
-                <a:cs typeface="Arial" panose="020B0604020202020204" pitchFamily="34" charset="0"/>
-              </a:defRPr>
+              <a:defRPr sz="1200"/>
             </a:lvl1pPr>
-            <a:lvl2pPr marL="457200" indent="0" algn="ctr">
+          </a:lstStyle>
+          <a:p>
+            <a:pPr lvl="0"/>
+            <a:r>
+              <a:rPr lang="en-US" dirty="0"/>
+              <a:t>R&amp;R number (if required)</a:t>
+            </a:r>
+          </a:p>
+        </p:txBody>
+      </p:sp>
+      <p:sp>
+        <p:nvSpPr>
+          <p:cNvPr id="9" name="Text Placeholder 8">
+            <a:extLst>
+              <a:ext uri="{FF2B5EF4-FFF2-40B4-BE49-F238E27FC236}">
+                <a16:creationId xmlns:a16="http://schemas.microsoft.com/office/drawing/2014/main" id="{7A08ED72-5D36-44C1-A3D6-C72E158E1FA6}"/>
+              </a:ext>
+            </a:extLst>
+          </p:cNvPr>
+          <p:cNvSpPr>
+            <a:spLocks noGrp="1"/>
+          </p:cNvSpPr>
+          <p:nvPr>
+            <p:ph type="body" sz="quarter" idx="11" hasCustomPrompt="1"/>
+          </p:nvPr>
+        </p:nvSpPr>
+        <p:spPr>
+          <a:xfrm>
+            <a:off x="3176924" y="2085870"/>
+            <a:ext cx="2427268" cy="424732"/>
+          </a:xfrm>
+        </p:spPr>
+        <p:txBody>
+          <a:bodyPr wrap="none">
+            <a:spAutoFit/>
+          </a:bodyPr>
+          <a:lstStyle>
+            <a:lvl1pPr marL="0" indent="0">
               <a:buNone/>
-              <a:defRPr>
-                <a:solidFill>
-                  <a:schemeClr val="tx1">
-                    <a:tint val="75000"/>
-                  </a:schemeClr>
-                </a:solidFill>
-              </a:defRPr>
-            </a:lvl2pPr>
-            <a:lvl3pPr marL="914400" indent="0" algn="ctr">
+              <a:defRPr u="sng"/>
+            </a:lvl1pPr>
+          </a:lstStyle>
+          <a:p>
+            <a:pPr lvl="0"/>
+            <a:r>
+              <a:rPr lang="en-US" dirty="0"/>
+              <a:t>Presenter Name</a:t>
+            </a:r>
+          </a:p>
+        </p:txBody>
+      </p:sp>
+      <p:sp>
+        <p:nvSpPr>
+          <p:cNvPr id="11" name="Text Placeholder 10">
+            <a:extLst>
+              <a:ext uri="{FF2B5EF4-FFF2-40B4-BE49-F238E27FC236}">
+                <a16:creationId xmlns:a16="http://schemas.microsoft.com/office/drawing/2014/main" id="{07C2C5E0-3F9A-4B6C-82C6-FEE7176DA8DC}"/>
+              </a:ext>
+            </a:extLst>
+          </p:cNvPr>
+          <p:cNvSpPr>
+            <a:spLocks noGrp="1"/>
+          </p:cNvSpPr>
+          <p:nvPr>
+            <p:ph type="body" sz="quarter" idx="12" hasCustomPrompt="1"/>
+          </p:nvPr>
+        </p:nvSpPr>
+        <p:spPr>
+          <a:xfrm>
+            <a:off x="5667411" y="2134517"/>
+            <a:ext cx="1690167" cy="376085"/>
+          </a:xfrm>
+        </p:spPr>
+        <p:txBody>
+          <a:bodyPr>
+            <a:spAutoFit/>
+          </a:bodyPr>
+          <a:lstStyle>
+            <a:lvl1pPr marL="0" indent="0">
               <a:buNone/>
-              <a:defRPr>
-                <a:solidFill>
-                  <a:schemeClr val="tx1">
-                    <a:tint val="75000"/>
-                  </a:schemeClr>
-                </a:solidFill>
-              </a:defRPr>
-            </a:lvl3pPr>
-            <a:lvl4pPr marL="1371600" indent="0" algn="ctr">
+              <a:defRPr sz="2000"/>
+            </a:lvl1pPr>
+          </a:lstStyle>
+          <a:p>
+            <a:pPr lvl="0"/>
+            <a:r>
+              <a:rPr lang="en-US" dirty="0"/>
+              <a:t>(pronouns)</a:t>
+            </a:r>
+          </a:p>
+        </p:txBody>
+      </p:sp>
+      <p:sp>
+        <p:nvSpPr>
+          <p:cNvPr id="20" name="Text Placeholder 10">
+            <a:extLst>
+              <a:ext uri="{FF2B5EF4-FFF2-40B4-BE49-F238E27FC236}">
+                <a16:creationId xmlns:a16="http://schemas.microsoft.com/office/drawing/2014/main" id="{6EE16D41-009C-4DB1-A6DF-FEBADC8C343B}"/>
+              </a:ext>
+            </a:extLst>
+          </p:cNvPr>
+          <p:cNvSpPr>
+            <a:spLocks noGrp="1"/>
+          </p:cNvSpPr>
+          <p:nvPr>
+            <p:ph type="body" sz="quarter" idx="13" hasCustomPrompt="1"/>
+          </p:nvPr>
+        </p:nvSpPr>
+        <p:spPr>
+          <a:xfrm>
+            <a:off x="3176924" y="2459716"/>
+            <a:ext cx="8292315" cy="369332"/>
+          </a:xfrm>
+        </p:spPr>
+        <p:txBody>
+          <a:bodyPr wrap="square">
+            <a:spAutoFit/>
+          </a:bodyPr>
+          <a:lstStyle>
+            <a:lvl1pPr marL="0" indent="0">
               <a:buNone/>
-              <a:defRPr>
-                <a:solidFill>
-                  <a:schemeClr val="tx1">
-                    <a:tint val="75000"/>
-                  </a:schemeClr>
-                </a:solidFill>
-              </a:defRPr>
-            </a:lvl4pPr>
-            <a:lvl5pPr marL="1828800" indent="0" algn="ctr">
+              <a:defRPr sz="2000"/>
+            </a:lvl1pPr>
+          </a:lstStyle>
+          <a:p>
+            <a:pPr lvl="0"/>
+            <a:r>
+              <a:rPr lang="en-US" dirty="0"/>
+              <a:t>Long affiliation</a:t>
+            </a:r>
+          </a:p>
+        </p:txBody>
+      </p:sp>
+      <p:sp>
+        <p:nvSpPr>
+          <p:cNvPr id="21" name="Text Placeholder 10">
+            <a:extLst>
+              <a:ext uri="{FF2B5EF4-FFF2-40B4-BE49-F238E27FC236}">
+                <a16:creationId xmlns:a16="http://schemas.microsoft.com/office/drawing/2014/main" id="{8E791C6E-DB06-44D1-AB4E-AA0EF8215FBB}"/>
+              </a:ext>
+            </a:extLst>
+          </p:cNvPr>
+          <p:cNvSpPr>
+            <a:spLocks noGrp="1"/>
+          </p:cNvSpPr>
+          <p:nvPr>
+            <p:ph type="body" sz="quarter" idx="14" hasCustomPrompt="1"/>
+          </p:nvPr>
+        </p:nvSpPr>
+        <p:spPr>
+          <a:xfrm>
+            <a:off x="3176925" y="3161813"/>
+            <a:ext cx="8292316" cy="369332"/>
+          </a:xfrm>
+        </p:spPr>
+        <p:txBody>
+          <a:bodyPr wrap="square">
+            <a:spAutoFit/>
+          </a:bodyPr>
+          <a:lstStyle>
+            <a:lvl1pPr marL="0" indent="0">
               <a:buNone/>
-              <a:defRPr>
-                <a:solidFill>
-                  <a:schemeClr val="tx1">
-                    <a:tint val="75000"/>
-                  </a:schemeClr>
-                </a:solidFill>
-              </a:defRPr>
-            </a:lvl5pPr>
-            <a:lvl6pPr marL="2286000" indent="0" algn="ctr">
+              <a:defRPr sz="2000"/>
+            </a:lvl1pPr>
+          </a:lstStyle>
+          <a:p>
+            <a:pPr lvl="0"/>
+            <a:r>
+              <a:rPr lang="en-US" dirty="0"/>
+              <a:t>Tutorial title @ Venue</a:t>
+            </a:r>
+          </a:p>
+        </p:txBody>
+      </p:sp>
+      <p:sp>
+        <p:nvSpPr>
+          <p:cNvPr id="23" name="Text Placeholder 10">
+            <a:extLst>
+              <a:ext uri="{FF2B5EF4-FFF2-40B4-BE49-F238E27FC236}">
+                <a16:creationId xmlns:a16="http://schemas.microsoft.com/office/drawing/2014/main" id="{AA4CD3CE-55B5-4132-9AC3-B94506768C36}"/>
+              </a:ext>
+            </a:extLst>
+          </p:cNvPr>
+          <p:cNvSpPr>
+            <a:spLocks noGrp="1"/>
+          </p:cNvSpPr>
+          <p:nvPr>
+            <p:ph type="body" sz="quarter" idx="15" hasCustomPrompt="1"/>
+          </p:nvPr>
+        </p:nvSpPr>
+        <p:spPr>
+          <a:xfrm>
+            <a:off x="3176924" y="3792588"/>
+            <a:ext cx="8292316" cy="646331"/>
+          </a:xfrm>
+        </p:spPr>
+        <p:txBody>
+          <a:bodyPr wrap="square">
+            <a:spAutoFit/>
+          </a:bodyPr>
+          <a:lstStyle>
+            <a:lvl1pPr marL="0" indent="0">
               <a:buNone/>
-              <a:defRPr>
-                <a:solidFill>
-                  <a:schemeClr val="tx1">
-                    <a:tint val="75000"/>
-                  </a:schemeClr>
-                </a:solidFill>
-              </a:defRPr>
-            </a:lvl6pPr>
-            <a:lvl7pPr marL="2743200" indent="0" algn="ctr">
-              <a:buNone/>
-              <a:defRPr>
-                <a:solidFill>
-                  <a:schemeClr val="tx1">
-                    <a:tint val="75000"/>
-                  </a:schemeClr>
-                </a:solidFill>
-              </a:defRPr>
-            </a:lvl7pPr>
-            <a:lvl8pPr marL="3200400" indent="0" algn="ctr">
-              <a:buNone/>
-              <a:defRPr>
-                <a:solidFill>
-                  <a:schemeClr val="tx1">
-                    <a:tint val="75000"/>
-                  </a:schemeClr>
-                </a:solidFill>
-              </a:defRPr>
-            </a:lvl8pPr>
-            <a:lvl9pPr marL="3657600" indent="0" algn="ctr">
-              <a:buNone/>
-              <a:defRPr>
-                <a:solidFill>
-                  <a:schemeClr val="tx1">
-                    <a:tint val="75000"/>
-                  </a:schemeClr>
-                </a:solidFill>
-              </a:defRPr>
-            </a:lvl9pPr>
+              <a:defRPr sz="2000"/>
+            </a:lvl1pPr>
           </a:lstStyle>
           <a:p>
-            <a:r>
-              <a:rPr lang="en-US"/>
-              <a:t>Click to edit Master subtitle style</a:t>
-            </a:r>
-            <a:endParaRPr lang="en-US" dirty="0"/>
+            <a:pPr>
+              <a:spcBef>
+                <a:spcPts val="2800"/>
+              </a:spcBef>
+            </a:pPr>
+            <a:r>
+              <a:rPr lang="en-US" sz="2000" dirty="0"/>
+              <a:t>Contributors: Contributor Name (short affiliation), … in alphabetical order</a:t>
+            </a:r>
           </a:p>
         </p:txBody>
       </p:sp>
       <p:pic>
         <p:nvPicPr>
-          <p:cNvPr id="16" name="Picture 15"/>
+          <p:cNvPr id="3" name="Picture 2">
+            <a:extLst>
+              <a:ext uri="{FF2B5EF4-FFF2-40B4-BE49-F238E27FC236}">
+                <a16:creationId xmlns:a16="http://schemas.microsoft.com/office/drawing/2014/main" id="{E5A81C43-A5B9-D933-9CA0-B9EBBA5B6295}"/>
+              </a:ext>
+            </a:extLst>
+          </p:cNvPr>
           <p:cNvPicPr>
             <a:picLocks noChangeAspect="1"/>
           </p:cNvPicPr>
           <p:nvPr userDrawn="1"/>
         </p:nvPicPr>
         <p:blipFill>
-          <a:blip r:embed="rId2" cstate="print">
+          <a:blip r:embed="rId3" cstate="print">
+            <a:extLst>
+              <a:ext uri="{28A0092B-C50C-407E-A947-70E740481C1C}">
+                <a14:useLocalDpi xmlns:a14="http://schemas.microsoft.com/office/drawing/2010/main" val="0"/>
+              </a:ext>
+            </a:extLst>
+          </a:blip>
+          <a:stretch>
+            <a:fillRect/>
+          </a:stretch>
+        </p:blipFill>
+        <p:spPr>
+          <a:xfrm>
+            <a:off x="418659" y="158509"/>
+            <a:ext cx="2109916" cy="905256"/>
+          </a:xfrm>
+          <a:prstGeom prst="rect">
+            <a:avLst/>
+          </a:prstGeom>
+        </p:spPr>
+      </p:pic>
+      <p:grpSp>
+        <p:nvGrpSpPr>
+          <p:cNvPr id="5" name="Group 4">
+            <a:extLst>
+              <a:ext uri="{FF2B5EF4-FFF2-40B4-BE49-F238E27FC236}">
+                <a16:creationId xmlns:a16="http://schemas.microsoft.com/office/drawing/2014/main" id="{2211A969-E7EA-13C3-D014-C029084F4EFB}"/>
+              </a:ext>
+            </a:extLst>
+          </p:cNvPr>
+          <p:cNvGrpSpPr/>
+          <p:nvPr userDrawn="1"/>
+        </p:nvGrpSpPr>
+        <p:grpSpPr>
+          <a:xfrm>
+            <a:off x="366259" y="3655396"/>
+            <a:ext cx="2214716" cy="356329"/>
+            <a:chOff x="341278" y="3628835"/>
+            <a:chExt cx="2214716" cy="356329"/>
+          </a:xfrm>
+        </p:grpSpPr>
+        <p:pic>
+          <p:nvPicPr>
+            <p:cNvPr id="7" name="Picture 2">
+              <a:extLst>
+                <a:ext uri="{FF2B5EF4-FFF2-40B4-BE49-F238E27FC236}">
+                  <a16:creationId xmlns:a16="http://schemas.microsoft.com/office/drawing/2014/main" id="{D16A6A85-AECD-6121-D004-ECB79BC13076}"/>
+                </a:ext>
+              </a:extLst>
+            </p:cNvPr>
+            <p:cNvPicPr>
+              <a:picLocks noChangeAspect="1" noChangeArrowheads="1"/>
+            </p:cNvPicPr>
+            <p:nvPr userDrawn="1"/>
+          </p:nvPicPr>
+          <p:blipFill>
+            <a:blip r:embed="rId4">
+              <a:extLst>
+                <a:ext uri="{28A0092B-C50C-407E-A947-70E740481C1C}">
+                  <a14:useLocalDpi xmlns:a14="http://schemas.microsoft.com/office/drawing/2010/main" val="0"/>
+                </a:ext>
+              </a:extLst>
+            </a:blip>
+            <a:srcRect/>
+            <a:stretch>
+              <a:fillRect/>
+            </a:stretch>
+          </p:blipFill>
+          <p:spPr bwMode="auto">
+            <a:xfrm>
+              <a:off x="341278" y="3628835"/>
+              <a:ext cx="1005840" cy="356329"/>
+            </a:xfrm>
+            <a:prstGeom prst="rect">
+              <a:avLst/>
+            </a:prstGeom>
+            <a:noFill/>
+            <a:extLst>
+              <a:ext uri="{909E8E84-426E-40DD-AFC4-6F175D3DCCD1}">
+                <a14:hiddenFill xmlns:a14="http://schemas.microsoft.com/office/drawing/2010/main">
+                  <a:solidFill>
+                    <a:srgbClr val="FFFFFF"/>
+                  </a:solidFill>
+                </a14:hiddenFill>
+              </a:ext>
+            </a:extLst>
+          </p:spPr>
+        </p:pic>
+        <p:pic>
+          <p:nvPicPr>
+            <p:cNvPr id="10" name="Picture 4">
+              <a:extLst>
+                <a:ext uri="{FF2B5EF4-FFF2-40B4-BE49-F238E27FC236}">
+                  <a16:creationId xmlns:a16="http://schemas.microsoft.com/office/drawing/2014/main" id="{87D2793C-01C6-B180-3495-5A2067445539}"/>
+                </a:ext>
+              </a:extLst>
+            </p:cNvPr>
+            <p:cNvPicPr>
+              <a:picLocks noChangeAspect="1" noChangeArrowheads="1"/>
+            </p:cNvPicPr>
+            <p:nvPr userDrawn="1"/>
+          </p:nvPicPr>
+          <p:blipFill>
+            <a:blip r:embed="rId5" cstate="print">
+              <a:extLst>
+                <a:ext uri="{28A0092B-C50C-407E-A947-70E740481C1C}">
+                  <a14:useLocalDpi xmlns:a14="http://schemas.microsoft.com/office/drawing/2010/main" val="0"/>
+                </a:ext>
+              </a:extLst>
+            </a:blip>
+            <a:srcRect/>
+            <a:stretch>
+              <a:fillRect/>
+            </a:stretch>
+          </p:blipFill>
+          <p:spPr bwMode="auto">
+            <a:xfrm>
+              <a:off x="1550154" y="3690079"/>
+              <a:ext cx="1005840" cy="233840"/>
+            </a:xfrm>
+            <a:prstGeom prst="rect">
+              <a:avLst/>
+            </a:prstGeom>
+            <a:noFill/>
+            <a:extLst>
+              <a:ext uri="{909E8E84-426E-40DD-AFC4-6F175D3DCCD1}">
+                <a14:hiddenFill xmlns:a14="http://schemas.microsoft.com/office/drawing/2010/main">
+                  <a:solidFill>
+                    <a:srgbClr val="FFFFFF"/>
+                  </a:solidFill>
+                </a14:hiddenFill>
+              </a:ext>
+            </a:extLst>
+          </p:spPr>
+        </p:pic>
+      </p:grpSp>
+      <p:pic>
+        <p:nvPicPr>
+          <p:cNvPr id="18" name="Picture 17" descr="A black and white sign with blue text&#10;&#10;Description automatically generated">
+            <a:extLst>
+              <a:ext uri="{FF2B5EF4-FFF2-40B4-BE49-F238E27FC236}">
+                <a16:creationId xmlns:a16="http://schemas.microsoft.com/office/drawing/2014/main" id="{90ECFB80-075A-EDC0-363D-3CE459F436D1}"/>
+              </a:ext>
+            </a:extLst>
+          </p:cNvPr>
+          <p:cNvPicPr>
+            <a:picLocks noChangeAspect="1"/>
+          </p:cNvPicPr>
+          <p:nvPr userDrawn="1"/>
+        </p:nvPicPr>
+        <p:blipFill>
+          <a:blip r:embed="rId6" cstate="print">
+            <a:extLst>
+              <a:ext uri="{28A0092B-C50C-407E-A947-70E740481C1C}">
+                <a14:useLocalDpi xmlns:a14="http://schemas.microsoft.com/office/drawing/2010/main" val="0"/>
+              </a:ext>
+            </a:extLst>
+          </a:blip>
+          <a:stretch>
+            <a:fillRect/>
+          </a:stretch>
+        </p:blipFill>
+        <p:spPr>
+          <a:xfrm>
+            <a:off x="970697" y="4125123"/>
+            <a:ext cx="1005840" cy="324328"/>
+          </a:xfrm>
+          <a:prstGeom prst="rect">
+            <a:avLst/>
+          </a:prstGeom>
+        </p:spPr>
+      </p:pic>
+      <p:sp>
+        <p:nvSpPr>
+          <p:cNvPr id="19" name="TextBox 18">
+            <a:extLst>
+              <a:ext uri="{FF2B5EF4-FFF2-40B4-BE49-F238E27FC236}">
+                <a16:creationId xmlns:a16="http://schemas.microsoft.com/office/drawing/2014/main" id="{23984D22-2BE9-C684-93D1-920B201DC418}"/>
+              </a:ext>
+            </a:extLst>
+          </p:cNvPr>
+          <p:cNvSpPr txBox="1"/>
+          <p:nvPr userDrawn="1"/>
+        </p:nvSpPr>
+        <p:spPr>
+          <a:xfrm>
+            <a:off x="901538" y="1776974"/>
+            <a:ext cx="1144159" cy="350865"/>
+          </a:xfrm>
+          <a:prstGeom prst="rect">
+            <a:avLst/>
+          </a:prstGeom>
+          <a:noFill/>
+        </p:spPr>
+        <p:txBody>
+          <a:bodyPr wrap="none" lIns="118872" tIns="91440" rIns="118872" bIns="91440" rtlCol="0" anchor="ctr" anchorCtr="0">
+            <a:spAutoFit/>
+          </a:bodyPr>
+          <a:lstStyle/>
+          <a:p>
+            <a:pPr algn="l">
+              <a:lnSpc>
+                <a:spcPct val="90000"/>
+              </a:lnSpc>
+            </a:pPr>
+            <a:r>
+              <a:rPr lang="en-US" sz="1200" i="1" dirty="0"/>
+              <a:t>Presented by</a:t>
+            </a:r>
+          </a:p>
+        </p:txBody>
+      </p:sp>
+      <p:sp>
+        <p:nvSpPr>
+          <p:cNvPr id="24" name="TextBox 23">
+            <a:extLst>
+              <a:ext uri="{FF2B5EF4-FFF2-40B4-BE49-F238E27FC236}">
+                <a16:creationId xmlns:a16="http://schemas.microsoft.com/office/drawing/2014/main" id="{9EA65A86-1694-D0BE-3C46-045E2B00D094}"/>
+              </a:ext>
+            </a:extLst>
+          </p:cNvPr>
+          <p:cNvSpPr txBox="1"/>
+          <p:nvPr userDrawn="1"/>
+        </p:nvSpPr>
+        <p:spPr>
+          <a:xfrm>
+            <a:off x="28657" y="2079048"/>
+            <a:ext cx="2889921" cy="932563"/>
+          </a:xfrm>
+          <a:prstGeom prst="rect">
+            <a:avLst/>
+          </a:prstGeom>
+          <a:noFill/>
+        </p:spPr>
+        <p:txBody>
+          <a:bodyPr wrap="square" lIns="118872" tIns="91440" rIns="118872" bIns="91440" rtlCol="0" anchor="ctr" anchorCtr="0">
+            <a:spAutoFit/>
+          </a:bodyPr>
+          <a:lstStyle/>
+          <a:p>
+            <a:pPr algn="l">
+              <a:lnSpc>
+                <a:spcPct val="90000"/>
+              </a:lnSpc>
+            </a:pPr>
+            <a:r>
+              <a:rPr lang="en-US" b="1" dirty="0"/>
+              <a:t>COLABS: Collaboration for Better Software for Science</a:t>
+            </a:r>
+          </a:p>
+        </p:txBody>
+      </p:sp>
+      <p:sp>
+        <p:nvSpPr>
+          <p:cNvPr id="25" name="TextBox 24">
+            <a:extLst>
+              <a:ext uri="{FF2B5EF4-FFF2-40B4-BE49-F238E27FC236}">
+                <a16:creationId xmlns:a16="http://schemas.microsoft.com/office/drawing/2014/main" id="{7C98D32A-D229-5172-E298-9AF976ACE627}"/>
+              </a:ext>
+            </a:extLst>
+          </p:cNvPr>
+          <p:cNvSpPr txBox="1"/>
+          <p:nvPr userDrawn="1"/>
+        </p:nvSpPr>
+        <p:spPr>
+          <a:xfrm>
+            <a:off x="676315" y="3191133"/>
+            <a:ext cx="1594604" cy="350865"/>
+          </a:xfrm>
+          <a:prstGeom prst="rect">
+            <a:avLst/>
+          </a:prstGeom>
+          <a:noFill/>
+        </p:spPr>
+        <p:txBody>
+          <a:bodyPr wrap="none" lIns="118872" tIns="91440" rIns="118872" bIns="91440" rtlCol="0" anchor="ctr" anchorCtr="0">
+            <a:spAutoFit/>
+          </a:bodyPr>
+          <a:lstStyle/>
+          <a:p>
+            <a:pPr algn="l">
+              <a:lnSpc>
+                <a:spcPct val="90000"/>
+              </a:lnSpc>
+            </a:pPr>
+            <a:r>
+              <a:rPr lang="en-US" sz="1200" i="1" dirty="0"/>
+              <a:t>In collaboration with</a:t>
+            </a:r>
+          </a:p>
+        </p:txBody>
+      </p:sp>
+      <p:sp>
+        <p:nvSpPr>
+          <p:cNvPr id="26" name="TextBox 25">
+            <a:extLst>
+              <a:ext uri="{FF2B5EF4-FFF2-40B4-BE49-F238E27FC236}">
+                <a16:creationId xmlns:a16="http://schemas.microsoft.com/office/drawing/2014/main" id="{64D46951-9F99-A303-D249-27B751A562DB}"/>
+              </a:ext>
+            </a:extLst>
+          </p:cNvPr>
+          <p:cNvSpPr txBox="1"/>
+          <p:nvPr userDrawn="1"/>
+        </p:nvSpPr>
+        <p:spPr>
+          <a:xfrm>
+            <a:off x="572120" y="4562849"/>
+            <a:ext cx="1802994" cy="350865"/>
+          </a:xfrm>
+          <a:prstGeom prst="rect">
+            <a:avLst/>
+          </a:prstGeom>
+          <a:noFill/>
+        </p:spPr>
+        <p:txBody>
+          <a:bodyPr wrap="none" lIns="118872" tIns="91440" rIns="118872" bIns="91440" rtlCol="0" anchor="ctr" anchorCtr="0">
+            <a:spAutoFit/>
+          </a:bodyPr>
+          <a:lstStyle/>
+          <a:p>
+            <a:pPr algn="l">
+              <a:lnSpc>
+                <a:spcPct val="90000"/>
+              </a:lnSpc>
+            </a:pPr>
+            <a:r>
+              <a:rPr lang="en-US" sz="1200" i="1" dirty="0"/>
+              <a:t>With prior support from</a:t>
+            </a:r>
+          </a:p>
+        </p:txBody>
+      </p:sp>
+      <p:grpSp>
+        <p:nvGrpSpPr>
+          <p:cNvPr id="27" name="Group 26">
+            <a:extLst>
+              <a:ext uri="{FF2B5EF4-FFF2-40B4-BE49-F238E27FC236}">
+                <a16:creationId xmlns:a16="http://schemas.microsoft.com/office/drawing/2014/main" id="{CC665AB1-818C-15F6-A435-7A7C14109262}"/>
+              </a:ext>
+            </a:extLst>
+          </p:cNvPr>
+          <p:cNvGrpSpPr/>
+          <p:nvPr userDrawn="1"/>
+        </p:nvGrpSpPr>
+        <p:grpSpPr>
+          <a:xfrm>
+            <a:off x="355043" y="5027111"/>
+            <a:ext cx="2237149" cy="457200"/>
+            <a:chOff x="343050" y="5128711"/>
+            <a:chExt cx="2237149" cy="457200"/>
+          </a:xfrm>
+        </p:grpSpPr>
+        <p:pic>
+          <p:nvPicPr>
+            <p:cNvPr id="28" name="Picture 27">
+              <a:extLst>
+                <a:ext uri="{FF2B5EF4-FFF2-40B4-BE49-F238E27FC236}">
+                  <a16:creationId xmlns:a16="http://schemas.microsoft.com/office/drawing/2014/main" id="{D8D4DA06-93FC-7C79-22C0-69CD6E71946F}"/>
+                </a:ext>
+              </a:extLst>
+            </p:cNvPr>
+            <p:cNvPicPr>
+              <a:picLocks noChangeAspect="1"/>
+            </p:cNvPicPr>
+            <p:nvPr userDrawn="1"/>
+          </p:nvPicPr>
+          <p:blipFill>
+            <a:blip r:embed="rId7" cstate="print">
+              <a:extLst>
+                <a:ext uri="{28A0092B-C50C-407E-A947-70E740481C1C}">
+                  <a14:useLocalDpi xmlns:a14="http://schemas.microsoft.com/office/drawing/2010/main" val="0"/>
+                </a:ext>
+              </a:extLst>
+            </a:blip>
+            <a:stretch>
+              <a:fillRect/>
+            </a:stretch>
+          </p:blipFill>
+          <p:spPr>
+            <a:xfrm>
+              <a:off x="343050" y="5128711"/>
+              <a:ext cx="1002296" cy="457200"/>
+            </a:xfrm>
+            <a:prstGeom prst="rect">
+              <a:avLst/>
+            </a:prstGeom>
+          </p:spPr>
+        </p:pic>
+        <p:pic>
+          <p:nvPicPr>
+            <p:cNvPr id="29" name="Picture 28" descr="A picture containing shape&#10;&#10;Description automatically generated">
+              <a:extLst>
+                <a:ext uri="{FF2B5EF4-FFF2-40B4-BE49-F238E27FC236}">
+                  <a16:creationId xmlns:a16="http://schemas.microsoft.com/office/drawing/2014/main" id="{3A576A20-C17C-D6D5-507F-A7C5D2EE03B7}"/>
+                </a:ext>
+              </a:extLst>
+            </p:cNvPr>
+            <p:cNvPicPr>
+              <a:picLocks noChangeAspect="1"/>
+            </p:cNvPicPr>
+            <p:nvPr userDrawn="1"/>
+          </p:nvPicPr>
+          <p:blipFill>
+            <a:blip r:embed="rId8">
+              <a:extLst>
+                <a:ext uri="{28A0092B-C50C-407E-A947-70E740481C1C}">
+                  <a14:useLocalDpi xmlns:a14="http://schemas.microsoft.com/office/drawing/2010/main" val="0"/>
+                </a:ext>
+              </a:extLst>
+            </a:blip>
+            <a:stretch>
+              <a:fillRect/>
+            </a:stretch>
+          </p:blipFill>
+          <p:spPr>
+            <a:xfrm>
+              <a:off x="1525950" y="5128711"/>
+              <a:ext cx="1054249" cy="457200"/>
+            </a:xfrm>
+            <a:prstGeom prst="rect">
+              <a:avLst/>
+            </a:prstGeom>
+          </p:spPr>
+        </p:pic>
+      </p:grpSp>
+      <p:pic>
+        <p:nvPicPr>
+          <p:cNvPr id="8" name="Picture 7">
+            <a:extLst>
+              <a:ext uri="{FF2B5EF4-FFF2-40B4-BE49-F238E27FC236}">
+                <a16:creationId xmlns:a16="http://schemas.microsoft.com/office/drawing/2014/main" id="{74B4BBC9-1119-9703-C1C0-7A18791767C0}"/>
+              </a:ext>
+            </a:extLst>
+          </p:cNvPr>
+          <p:cNvPicPr>
+            <a:picLocks noChangeAspect="1"/>
+          </p:cNvPicPr>
+          <p:nvPr userDrawn="1"/>
+        </p:nvPicPr>
+        <p:blipFill>
+          <a:blip r:embed="rId9" cstate="print">
             <a:extLst>
               <a:ext uri="{BEBA8EAE-BF5A-486C-A8C5-ECC9F3942E4B}">
                 <a14:imgProps xmlns:a14="http://schemas.microsoft.com/office/drawing/2010/main">
-                  <a14:imgLayer r:embed="rId3">
+                  <a14:imgLayer r:embed="rId10">
                     <a14:imgEffect>
                       <a14:brightnessContrast bright="100000"/>
                     </a14:imgEffect>
@@ -1359,7 +2020,7 @@
         </p:blipFill>
         <p:spPr>
           <a:xfrm>
-            <a:off x="9357260" y="6321694"/>
+            <a:off x="9536165" y="6321694"/>
             <a:ext cx="2409477" cy="401008"/>
           </a:xfrm>
           <a:prstGeom prst="rect">
@@ -1370,7 +2031,7 @@
     </p:spTree>
     <p:extLst>
       <p:ext uri="{BB962C8B-B14F-4D97-AF65-F5344CB8AC3E}">
-        <p14:creationId xmlns:p14="http://schemas.microsoft.com/office/powerpoint/2010/main" val="324926385"/>
+        <p14:creationId xmlns:p14="http://schemas.microsoft.com/office/powerpoint/2010/main" val="480410655"/>
       </p:ext>
     </p:extLst>
   </p:cSld>
@@ -1382,7 +2043,7 @@
 
 <file path=ppt/slideLayouts/slideLayout2.xml><?xml version="1.0" encoding="utf-8"?>
 <p:sldLayout xmlns:a="http://schemas.openxmlformats.org/drawingml/2006/main" xmlns:r="http://schemas.openxmlformats.org/officeDocument/2006/relationships" xmlns:p="http://schemas.openxmlformats.org/presentationml/2006/main" showMasterSp="0" preserve="1" userDrawn="1">
-  <p:cSld name="8_Title Slide">
+  <p:cSld name="10_Title Slide">
     <p:spTree>
       <p:nvGrpSpPr>
         <p:cNvPr id="1" name=""/>
@@ -1822,12 +2483,48 @@
           </a:p>
         </p:txBody>
       </p:sp>
+      <p:pic>
+        <p:nvPicPr>
+          <p:cNvPr id="5" name="Picture 4">
+            <a:extLst>
+              <a:ext uri="{FF2B5EF4-FFF2-40B4-BE49-F238E27FC236}">
+                <a16:creationId xmlns:a16="http://schemas.microsoft.com/office/drawing/2014/main" id="{39A0B7EC-D4C0-0A37-EF93-54309C1E7E8C}"/>
+              </a:ext>
+            </a:extLst>
+          </p:cNvPr>
+          <p:cNvPicPr>
+            <a:picLocks noChangeAspect="1"/>
+          </p:cNvPicPr>
+          <p:nvPr userDrawn="1"/>
+        </p:nvPicPr>
+        <p:blipFill>
+          <a:blip r:embed="rId5" cstate="print">
+            <a:extLst>
+              <a:ext uri="{28A0092B-C50C-407E-A947-70E740481C1C}">
+                <a14:useLocalDpi xmlns:a14="http://schemas.microsoft.com/office/drawing/2010/main" val="0"/>
+              </a:ext>
+            </a:extLst>
+          </a:blip>
+          <a:stretch>
+            <a:fillRect/>
+          </a:stretch>
+        </p:blipFill>
+        <p:spPr>
+          <a:xfrm>
+            <a:off x="418659" y="158509"/>
+            <a:ext cx="2109916" cy="905256"/>
+          </a:xfrm>
+          <a:prstGeom prst="rect">
+            <a:avLst/>
+          </a:prstGeom>
+        </p:spPr>
+      </p:pic>
       <p:grpSp>
         <p:nvGrpSpPr>
-          <p:cNvPr id="8" name="Group 7">
+          <p:cNvPr id="21" name="Group 20">
             <a:extLst>
               <a:ext uri="{FF2B5EF4-FFF2-40B4-BE49-F238E27FC236}">
-                <a16:creationId xmlns:a16="http://schemas.microsoft.com/office/drawing/2014/main" id="{16AE459F-9FA5-0E78-ABD4-A524DF48B0F7}"/>
+                <a16:creationId xmlns:a16="http://schemas.microsoft.com/office/drawing/2014/main" id="{23F39736-1AFA-8528-C9E3-41B55EABEDCA}"/>
               </a:ext>
             </a:extLst>
           </p:cNvPr>
@@ -1836,54 +2533,18 @@
         </p:nvGrpSpPr>
         <p:grpSpPr>
           <a:xfrm>
-            <a:off x="66198" y="214954"/>
-            <a:ext cx="2937455" cy="5079380"/>
-            <a:chOff x="-80559" y="113353"/>
-            <a:chExt cx="2937455" cy="5079380"/>
+            <a:off x="366259" y="3655396"/>
+            <a:ext cx="2214716" cy="356329"/>
+            <a:chOff x="341278" y="3628835"/>
+            <a:chExt cx="2214716" cy="356329"/>
           </a:xfrm>
         </p:grpSpPr>
         <p:pic>
           <p:nvPicPr>
-            <p:cNvPr id="9" name="Picture 8">
+            <p:cNvPr id="6" name="Picture 2">
               <a:extLst>
                 <a:ext uri="{FF2B5EF4-FFF2-40B4-BE49-F238E27FC236}">
-                  <a16:creationId xmlns:a16="http://schemas.microsoft.com/office/drawing/2014/main" id="{008037DC-6D96-91D3-C102-55F1088D4B01}"/>
-                </a:ext>
-              </a:extLst>
-            </p:cNvPr>
-            <p:cNvPicPr>
-              <a:picLocks noChangeAspect="1"/>
-            </p:cNvPicPr>
-            <p:nvPr userDrawn="1"/>
-          </p:nvPicPr>
-          <p:blipFill>
-            <a:blip r:embed="rId5" cstate="print">
-              <a:extLst>
-                <a:ext uri="{28A0092B-C50C-407E-A947-70E740481C1C}">
-                  <a14:useLocalDpi xmlns:a14="http://schemas.microsoft.com/office/drawing/2010/main" val="0"/>
-                </a:ext>
-              </a:extLst>
-            </a:blip>
-            <a:stretch>
-              <a:fillRect/>
-            </a:stretch>
-          </p:blipFill>
-          <p:spPr>
-            <a:xfrm>
-              <a:off x="263939" y="113353"/>
-              <a:ext cx="2109916" cy="905256"/>
-            </a:xfrm>
-            <a:prstGeom prst="rect">
-              <a:avLst/>
-            </a:prstGeom>
-          </p:spPr>
-        </p:pic>
-        <p:pic>
-          <p:nvPicPr>
-            <p:cNvPr id="10" name="Picture 2">
-              <a:extLst>
-                <a:ext uri="{FF2B5EF4-FFF2-40B4-BE49-F238E27FC236}">
-                  <a16:creationId xmlns:a16="http://schemas.microsoft.com/office/drawing/2014/main" id="{8F23B3CE-D53E-5657-FC4E-99D232C66D6A}"/>
+                  <a16:creationId xmlns:a16="http://schemas.microsoft.com/office/drawing/2014/main" id="{EF0692E1-7D85-78AD-9CB9-EDC5C0A1CD96}"/>
                 </a:ext>
               </a:extLst>
             </p:cNvPr>
@@ -1907,8 +2568,8 @@
           </p:blipFill>
           <p:spPr bwMode="auto">
             <a:xfrm>
-              <a:off x="24796" y="3155674"/>
-              <a:ext cx="2832100" cy="1003300"/>
+              <a:off x="341278" y="3628835"/>
+              <a:ext cx="1005840" cy="356329"/>
             </a:xfrm>
             <a:prstGeom prst="rect">
               <a:avLst/>
@@ -1927,10 +2588,10 @@
         </p:pic>
         <p:pic>
           <p:nvPicPr>
-            <p:cNvPr id="11" name="Picture 4">
+            <p:cNvPr id="7" name="Picture 4">
               <a:extLst>
                 <a:ext uri="{FF2B5EF4-FFF2-40B4-BE49-F238E27FC236}">
-                  <a16:creationId xmlns:a16="http://schemas.microsoft.com/office/drawing/2014/main" id="{6B53D4C1-59C3-6FC3-CD32-8A61AB26A527}"/>
+                  <a16:creationId xmlns:a16="http://schemas.microsoft.com/office/drawing/2014/main" id="{05CDAB3D-B8D6-9AC9-8507-6F95230AEE45}"/>
                 </a:ext>
               </a:extLst>
             </p:cNvPr>
@@ -1954,8 +2615,8 @@
           </p:blipFill>
           <p:spPr bwMode="auto">
             <a:xfrm>
-              <a:off x="-80559" y="2517770"/>
-              <a:ext cx="2937455" cy="682907"/>
+              <a:off x="1550154" y="3690079"/>
+              <a:ext cx="1005840" cy="233840"/>
             </a:xfrm>
             <a:prstGeom prst="rect">
               <a:avLst/>
@@ -1972,12 +2633,229 @@
             </a:extLst>
           </p:spPr>
         </p:pic>
+      </p:grpSp>
+      <p:pic>
+        <p:nvPicPr>
+          <p:cNvPr id="11" name="Picture 10" descr="A black and white sign with blue text&#10;&#10;Description automatically generated">
+            <a:extLst>
+              <a:ext uri="{FF2B5EF4-FFF2-40B4-BE49-F238E27FC236}">
+                <a16:creationId xmlns:a16="http://schemas.microsoft.com/office/drawing/2014/main" id="{A50B83FE-88FB-1C61-17CC-A58C0BE092BF}"/>
+              </a:ext>
+            </a:extLst>
+          </p:cNvPr>
+          <p:cNvPicPr>
+            <a:picLocks noChangeAspect="1"/>
+          </p:cNvPicPr>
+          <p:nvPr userDrawn="1"/>
+        </p:nvPicPr>
+        <p:blipFill>
+          <a:blip r:embed="rId8" cstate="print">
+            <a:extLst>
+              <a:ext uri="{28A0092B-C50C-407E-A947-70E740481C1C}">
+                <a14:useLocalDpi xmlns:a14="http://schemas.microsoft.com/office/drawing/2010/main" val="0"/>
+              </a:ext>
+            </a:extLst>
+          </a:blip>
+          <a:stretch>
+            <a:fillRect/>
+          </a:stretch>
+        </p:blipFill>
+        <p:spPr>
+          <a:xfrm>
+            <a:off x="970697" y="4125123"/>
+            <a:ext cx="1005840" cy="324328"/>
+          </a:xfrm>
+          <a:prstGeom prst="rect">
+            <a:avLst/>
+          </a:prstGeom>
+        </p:spPr>
+      </p:pic>
+      <p:sp>
+        <p:nvSpPr>
+          <p:cNvPr id="8" name="TextBox 7">
+            <a:extLst>
+              <a:ext uri="{FF2B5EF4-FFF2-40B4-BE49-F238E27FC236}">
+                <a16:creationId xmlns:a16="http://schemas.microsoft.com/office/drawing/2014/main" id="{DBDB4EA8-7E00-EB97-386F-806F04EDC41A}"/>
+              </a:ext>
+            </a:extLst>
+          </p:cNvPr>
+          <p:cNvSpPr txBox="1"/>
+          <p:nvPr userDrawn="1"/>
+        </p:nvSpPr>
+        <p:spPr>
+          <a:xfrm>
+            <a:off x="901538" y="1776974"/>
+            <a:ext cx="1144159" cy="350865"/>
+          </a:xfrm>
+          <a:prstGeom prst="rect">
+            <a:avLst/>
+          </a:prstGeom>
+          <a:noFill/>
+        </p:spPr>
+        <p:txBody>
+          <a:bodyPr wrap="none" lIns="118872" tIns="91440" rIns="118872" bIns="91440" rtlCol="0" anchor="ctr" anchorCtr="0">
+            <a:spAutoFit/>
+          </a:bodyPr>
+          <a:lstStyle/>
+          <a:p>
+            <a:pPr algn="l">
+              <a:lnSpc>
+                <a:spcPct val="90000"/>
+              </a:lnSpc>
+            </a:pPr>
+            <a:r>
+              <a:rPr lang="en-US" sz="1200" i="1" dirty="0"/>
+              <a:t>Presented by</a:t>
+            </a:r>
+          </a:p>
+        </p:txBody>
+      </p:sp>
+      <p:sp>
+        <p:nvSpPr>
+          <p:cNvPr id="9" name="TextBox 8">
+            <a:extLst>
+              <a:ext uri="{FF2B5EF4-FFF2-40B4-BE49-F238E27FC236}">
+                <a16:creationId xmlns:a16="http://schemas.microsoft.com/office/drawing/2014/main" id="{9C6AA8F1-3D17-46A7-8926-BC4892D4C51C}"/>
+              </a:ext>
+            </a:extLst>
+          </p:cNvPr>
+          <p:cNvSpPr txBox="1"/>
+          <p:nvPr userDrawn="1"/>
+        </p:nvSpPr>
+        <p:spPr>
+          <a:xfrm>
+            <a:off x="28657" y="2079048"/>
+            <a:ext cx="2889921" cy="932563"/>
+          </a:xfrm>
+          <a:prstGeom prst="rect">
+            <a:avLst/>
+          </a:prstGeom>
+          <a:noFill/>
+        </p:spPr>
+        <p:txBody>
+          <a:bodyPr wrap="square" lIns="118872" tIns="91440" rIns="118872" bIns="91440" rtlCol="0" anchor="ctr" anchorCtr="0">
+            <a:spAutoFit/>
+          </a:bodyPr>
+          <a:lstStyle/>
+          <a:p>
+            <a:pPr algn="l">
+              <a:lnSpc>
+                <a:spcPct val="90000"/>
+              </a:lnSpc>
+            </a:pPr>
+            <a:r>
+              <a:rPr lang="en-US" b="1" dirty="0"/>
+              <a:t>COLABS: Collaboration for Better Software for Science</a:t>
+            </a:r>
+          </a:p>
+        </p:txBody>
+      </p:sp>
+      <p:sp>
+        <p:nvSpPr>
+          <p:cNvPr id="10" name="TextBox 9">
+            <a:extLst>
+              <a:ext uri="{FF2B5EF4-FFF2-40B4-BE49-F238E27FC236}">
+                <a16:creationId xmlns:a16="http://schemas.microsoft.com/office/drawing/2014/main" id="{CE38D39D-3F53-1EF5-8F58-4DF913CFD07D}"/>
+              </a:ext>
+            </a:extLst>
+          </p:cNvPr>
+          <p:cNvSpPr txBox="1"/>
+          <p:nvPr userDrawn="1"/>
+        </p:nvSpPr>
+        <p:spPr>
+          <a:xfrm>
+            <a:off x="676315" y="3191133"/>
+            <a:ext cx="1594604" cy="350865"/>
+          </a:xfrm>
+          <a:prstGeom prst="rect">
+            <a:avLst/>
+          </a:prstGeom>
+          <a:noFill/>
+        </p:spPr>
+        <p:txBody>
+          <a:bodyPr wrap="none" lIns="118872" tIns="91440" rIns="118872" bIns="91440" rtlCol="0" anchor="ctr" anchorCtr="0">
+            <a:spAutoFit/>
+          </a:bodyPr>
+          <a:lstStyle/>
+          <a:p>
+            <a:pPr algn="l">
+              <a:lnSpc>
+                <a:spcPct val="90000"/>
+              </a:lnSpc>
+            </a:pPr>
+            <a:r>
+              <a:rPr lang="en-US" sz="1200" i="1" dirty="0"/>
+              <a:t>In collaboration with</a:t>
+            </a:r>
+          </a:p>
+        </p:txBody>
+      </p:sp>
+      <p:sp>
+        <p:nvSpPr>
+          <p:cNvPr id="15" name="TextBox 14">
+            <a:extLst>
+              <a:ext uri="{FF2B5EF4-FFF2-40B4-BE49-F238E27FC236}">
+                <a16:creationId xmlns:a16="http://schemas.microsoft.com/office/drawing/2014/main" id="{38A567DA-27A0-BFAF-CB9E-0EA56E125664}"/>
+              </a:ext>
+            </a:extLst>
+          </p:cNvPr>
+          <p:cNvSpPr txBox="1"/>
+          <p:nvPr userDrawn="1"/>
+        </p:nvSpPr>
+        <p:spPr>
+          <a:xfrm>
+            <a:off x="572120" y="4562849"/>
+            <a:ext cx="1802994" cy="350865"/>
+          </a:xfrm>
+          <a:prstGeom prst="rect">
+            <a:avLst/>
+          </a:prstGeom>
+          <a:noFill/>
+        </p:spPr>
+        <p:txBody>
+          <a:bodyPr wrap="none" lIns="118872" tIns="91440" rIns="118872" bIns="91440" rtlCol="0" anchor="ctr" anchorCtr="0">
+            <a:spAutoFit/>
+          </a:bodyPr>
+          <a:lstStyle/>
+          <a:p>
+            <a:pPr algn="l">
+              <a:lnSpc>
+                <a:spcPct val="90000"/>
+              </a:lnSpc>
+            </a:pPr>
+            <a:r>
+              <a:rPr lang="en-US" sz="1200" i="1" dirty="0"/>
+              <a:t>With prior support from</a:t>
+            </a:r>
+          </a:p>
+        </p:txBody>
+      </p:sp>
+      <p:grpSp>
+        <p:nvGrpSpPr>
+          <p:cNvPr id="20" name="Group 19">
+            <a:extLst>
+              <a:ext uri="{FF2B5EF4-FFF2-40B4-BE49-F238E27FC236}">
+                <a16:creationId xmlns:a16="http://schemas.microsoft.com/office/drawing/2014/main" id="{63A83523-6C92-DDA5-E072-BAC75B3276B6}"/>
+              </a:ext>
+            </a:extLst>
+          </p:cNvPr>
+          <p:cNvGrpSpPr/>
+          <p:nvPr userDrawn="1"/>
+        </p:nvGrpSpPr>
+        <p:grpSpPr>
+          <a:xfrm>
+            <a:off x="355043" y="5027111"/>
+            <a:ext cx="2237149" cy="457200"/>
+            <a:chOff x="343050" y="5128711"/>
+            <a:chExt cx="2237149" cy="457200"/>
+          </a:xfrm>
+        </p:grpSpPr>
         <p:pic>
           <p:nvPicPr>
-            <p:cNvPr id="12" name="Picture 11" descr="A black and white sign with blue text&#10;&#10;Description automatically generated">
+            <p:cNvPr id="17" name="Picture 16">
               <a:extLst>
                 <a:ext uri="{FF2B5EF4-FFF2-40B4-BE49-F238E27FC236}">
-                  <a16:creationId xmlns:a16="http://schemas.microsoft.com/office/drawing/2014/main" id="{57547CB5-B70B-2ADD-668A-BE221DE80CFB}"/>
+                  <a16:creationId xmlns:a16="http://schemas.microsoft.com/office/drawing/2014/main" id="{70EB972A-C812-2D11-E993-9648F06DCD53}"/>
                 </a:ext>
               </a:extLst>
             </p:cNvPr>
@@ -1987,7 +2865,7 @@
             <p:nvPr userDrawn="1"/>
           </p:nvPicPr>
           <p:blipFill>
-            <a:blip r:embed="rId8" cstate="print">
+            <a:blip r:embed="rId9" cstate="print">
               <a:extLst>
                 <a:ext uri="{28A0092B-C50C-407E-A947-70E740481C1C}">
                   <a14:useLocalDpi xmlns:a14="http://schemas.microsoft.com/office/drawing/2010/main" val="0"/>
@@ -2000,8 +2878,44 @@
           </p:blipFill>
           <p:spPr>
             <a:xfrm>
-              <a:off x="263939" y="4401022"/>
-              <a:ext cx="2455333" cy="791711"/>
+              <a:off x="343050" y="5128711"/>
+              <a:ext cx="1002296" cy="457200"/>
+            </a:xfrm>
+            <a:prstGeom prst="rect">
+              <a:avLst/>
+            </a:prstGeom>
+          </p:spPr>
+        </p:pic>
+        <p:pic>
+          <p:nvPicPr>
+            <p:cNvPr id="18" name="Picture 17" descr="A picture containing shape&#10;&#10;Description automatically generated">
+              <a:extLst>
+                <a:ext uri="{FF2B5EF4-FFF2-40B4-BE49-F238E27FC236}">
+                  <a16:creationId xmlns:a16="http://schemas.microsoft.com/office/drawing/2014/main" id="{DC5CC62A-5FBA-A239-536C-E231ED3105F0}"/>
+                </a:ext>
+              </a:extLst>
+            </p:cNvPr>
+            <p:cNvPicPr>
+              <a:picLocks noChangeAspect="1"/>
+            </p:cNvPicPr>
+            <p:nvPr userDrawn="1"/>
+          </p:nvPicPr>
+          <p:blipFill>
+            <a:blip r:embed="rId10">
+              <a:extLst>
+                <a:ext uri="{28A0092B-C50C-407E-A947-70E740481C1C}">
+                  <a14:useLocalDpi xmlns:a14="http://schemas.microsoft.com/office/drawing/2010/main" val="0"/>
+                </a:ext>
+              </a:extLst>
+            </a:blip>
+            <a:stretch>
+              <a:fillRect/>
+            </a:stretch>
+          </p:blipFill>
+          <p:spPr>
+            <a:xfrm>
+              <a:off x="1525950" y="5128711"/>
+              <a:ext cx="1054249" cy="457200"/>
             </a:xfrm>
             <a:prstGeom prst="rect">
               <a:avLst/>
@@ -2012,7 +2926,7 @@
     </p:spTree>
     <p:extLst>
       <p:ext uri="{BB962C8B-B14F-4D97-AF65-F5344CB8AC3E}">
-        <p14:creationId xmlns:p14="http://schemas.microsoft.com/office/powerpoint/2010/main" val="451228200"/>
+        <p14:creationId xmlns:p14="http://schemas.microsoft.com/office/powerpoint/2010/main" val="4251378157"/>
       </p:ext>
     </p:extLst>
   </p:cSld>
@@ -3706,7 +4620,7 @@
           <a:p>
             <a:fld id="{68F49DD1-DDB5-AB43-B311-7649AD474C82}" type="datetimeFigureOut">
               <a:rPr lang="en-US" smtClean="0"/>
-              <a:t>4/24/2024</a:t>
+              <a:t>4/28/2024</a:t>
             </a:fld>
             <a:endParaRPr lang="en-US"/>
           </a:p>
@@ -4020,8 +4934,8 @@
   </p:cSld>
   <p:clrMap bg1="lt1" tx1="dk1" bg2="lt2" tx2="dk2" accent1="accent1" accent2="accent2" accent3="accent3" accent4="accent4" accent5="accent5" accent6="accent6" hlink="hlink" folHlink="folHlink"/>
   <p:sldLayoutIdLst>
-    <p:sldLayoutId id="2147483949" r:id="rId1"/>
-    <p:sldLayoutId id="2147483951" r:id="rId2"/>
+    <p:sldLayoutId id="2147483953" r:id="rId1"/>
+    <p:sldLayoutId id="2147483954" r:id="rId2"/>
     <p:sldLayoutId id="2147483937" r:id="rId3"/>
     <p:sldLayoutId id="2147483939" r:id="rId4"/>
     <p:sldLayoutId id="2147483950" r:id="rId5"/>
@@ -4488,73 +5402,6 @@
       </p:grpSpPr>
       <p:sp>
         <p:nvSpPr>
-          <p:cNvPr id="3" name="Subtitle 2">
-            <a:extLst>
-              <a:ext uri="{FF2B5EF4-FFF2-40B4-BE49-F238E27FC236}">
-                <a16:creationId xmlns:a16="http://schemas.microsoft.com/office/drawing/2014/main" id="{115D6CAC-8B77-472D-91BE-E47FFB7E8C7A}"/>
-              </a:ext>
-            </a:extLst>
-          </p:cNvPr>
-          <p:cNvSpPr>
-            <a:spLocks noGrp="1"/>
-          </p:cNvSpPr>
-          <p:nvPr>
-            <p:ph type="subTitle" idx="1"/>
-          </p:nvPr>
-        </p:nvSpPr>
-        <p:spPr>
-          <a:xfrm>
-            <a:off x="3177632" y="3239658"/>
-            <a:ext cx="7772308" cy="1781922"/>
-          </a:xfrm>
-        </p:spPr>
-        <p:txBody>
-          <a:bodyPr/>
-          <a:lstStyle/>
-          <a:p>
-            <a:r>
-              <a:rPr lang="en-US" sz="2000" b="0" i="0" dirty="0">
-                <a:solidFill>
-                  <a:srgbClr val="111111"/>
-                </a:solidFill>
-                <a:effectLst/>
-                <a:latin typeface="+mn-lt"/>
-              </a:rPr>
-              <a:t>Better Scientific Software tutorial @ ISC24</a:t>
-            </a:r>
-          </a:p>
-          <a:p>
-            <a:endParaRPr lang="en-US" dirty="0">
-              <a:solidFill>
-                <a:srgbClr val="111111"/>
-              </a:solidFill>
-              <a:latin typeface="+mn-lt"/>
-            </a:endParaRPr>
-          </a:p>
-          <a:p>
-            <a:r>
-              <a:rPr lang="en-US" sz="2000" dirty="0">
-                <a:latin typeface="+mn-lt"/>
-              </a:rPr>
-              <a:t>Contributors: Anshu Dubey (ANL), Mark C. Miller (LLNL), David </a:t>
-            </a:r>
-            <a:r>
-              <a:rPr lang="en-US" sz="2000" dirty="0" err="1">
-                <a:latin typeface="+mn-lt"/>
-              </a:rPr>
-              <a:t>Bernholdt</a:t>
-            </a:r>
-            <a:r>
-              <a:rPr lang="en-US" sz="2000" dirty="0">
-                <a:latin typeface="+mn-lt"/>
-              </a:rPr>
-              <a:t> (ORNL) </a:t>
-            </a:r>
-          </a:p>
-        </p:txBody>
-      </p:sp>
-      <p:sp>
-        <p:nvSpPr>
           <p:cNvPr id="7" name="Title 3">
             <a:extLst>
               <a:ext uri="{FF2B5EF4-FFF2-40B4-BE49-F238E27FC236}">
@@ -4569,10 +5416,68 @@
             <p:ph type="ctrTitle"/>
           </p:nvPr>
         </p:nvSpPr>
+        <p:spPr/>
+        <p:txBody>
+          <a:bodyPr/>
+          <a:lstStyle/>
+          <a:p>
+            <a:r>
+              <a:rPr lang="en-US" dirty="0"/>
+              <a:t>Scientific Software Design</a:t>
+            </a:r>
+          </a:p>
+        </p:txBody>
+      </p:sp>
+      <p:sp>
+        <p:nvSpPr>
+          <p:cNvPr id="3" name="Subtitle 2">
+            <a:extLst>
+              <a:ext uri="{FF2B5EF4-FFF2-40B4-BE49-F238E27FC236}">
+                <a16:creationId xmlns:a16="http://schemas.microsoft.com/office/drawing/2014/main" id="{115D6CAC-8B77-472D-91BE-E47FFB7E8C7A}"/>
+              </a:ext>
+            </a:extLst>
+          </p:cNvPr>
+          <p:cNvSpPr>
+            <a:spLocks noGrp="1"/>
+          </p:cNvSpPr>
+          <p:nvPr>
+            <p:ph type="body" sz="quarter" idx="10"/>
+          </p:nvPr>
+        </p:nvSpPr>
+        <p:spPr/>
+        <p:txBody>
+          <a:bodyPr/>
+          <a:lstStyle/>
+          <a:p>
+            <a:endParaRPr lang="en-US" dirty="0">
+              <a:solidFill>
+                <a:srgbClr val="111111"/>
+              </a:solidFill>
+              <a:latin typeface="+mn-lt"/>
+            </a:endParaRPr>
+          </a:p>
+        </p:txBody>
+      </p:sp>
+      <p:sp>
+        <p:nvSpPr>
+          <p:cNvPr id="6" name="Text Placeholder 5">
+            <a:extLst>
+              <a:ext uri="{FF2B5EF4-FFF2-40B4-BE49-F238E27FC236}">
+                <a16:creationId xmlns:a16="http://schemas.microsoft.com/office/drawing/2014/main" id="{45350191-BDAE-1AFC-C26A-B8F1EB4E82F4}"/>
+              </a:ext>
+            </a:extLst>
+          </p:cNvPr>
+          <p:cNvSpPr>
+            <a:spLocks noGrp="1"/>
+          </p:cNvSpPr>
+          <p:nvPr>
+            <p:ph type="body" sz="quarter" idx="11"/>
+          </p:nvPr>
+        </p:nvSpPr>
         <p:spPr>
           <a:xfrm>
-            <a:off x="3177633" y="503144"/>
-            <a:ext cx="8292316" cy="1030930"/>
+            <a:off x="3176924" y="2085870"/>
+            <a:ext cx="2034531" cy="424732"/>
           </a:xfrm>
         </p:spPr>
         <p:txBody>
@@ -4581,661 +5486,131 @@
           <a:p>
             <a:r>
               <a:rPr lang="en-US" dirty="0"/>
-              <a:t>Scientific Software Design</a:t>
+              <a:t>Anshu Dubey</a:t>
             </a:r>
           </a:p>
         </p:txBody>
       </p:sp>
       <p:sp>
         <p:nvSpPr>
-          <p:cNvPr id="2" name="Text Placeholder 3">
+          <p:cNvPr id="8" name="Text Placeholder 7">
             <a:extLst>
               <a:ext uri="{FF2B5EF4-FFF2-40B4-BE49-F238E27FC236}">
-                <a16:creationId xmlns:a16="http://schemas.microsoft.com/office/drawing/2014/main" id="{1AB39271-1180-C491-5A65-8C09B3FC3A89}"/>
+                <a16:creationId xmlns:a16="http://schemas.microsoft.com/office/drawing/2014/main" id="{E212497A-1AA2-20D2-4610-7F728D5C612B}"/>
               </a:ext>
             </a:extLst>
           </p:cNvPr>
-          <p:cNvSpPr txBox="1">
-            <a:spLocks/>
+          <p:cNvSpPr>
+            <a:spLocks noGrp="1"/>
           </p:cNvSpPr>
-          <p:nvPr/>
+          <p:nvPr>
+            <p:ph type="body" sz="quarter" idx="12"/>
+          </p:nvPr>
         </p:nvSpPr>
         <p:spPr>
           <a:xfrm>
-            <a:off x="3176924" y="2085870"/>
-            <a:ext cx="2806987" cy="424732"/>
+            <a:off x="5233071" y="2134517"/>
+            <a:ext cx="1690167" cy="376085"/>
           </a:xfrm>
-          <a:prstGeom prst="rect">
-            <a:avLst/>
-          </a:prstGeom>
         </p:spPr>
         <p:txBody>
           <a:bodyPr/>
-          <a:lstStyle>
-            <a:lvl1pPr marL="230188" indent="-230188" algn="l" rtl="0" eaLnBrk="1" fontAlgn="base" hangingPunct="1">
-              <a:lnSpc>
-                <a:spcPct val="90000"/>
-              </a:lnSpc>
-              <a:spcBef>
-                <a:spcPts val="1400"/>
-              </a:spcBef>
-              <a:spcAft>
-                <a:spcPct val="0"/>
-              </a:spcAft>
-              <a:buClr>
-                <a:schemeClr val="tx1"/>
-              </a:buClr>
-              <a:buFont typeface="Arial" charset="0"/>
-              <a:buChar char="•"/>
-              <a:defRPr sz="2400" kern="1200">
-                <a:solidFill>
-                  <a:schemeClr val="tx1"/>
-                </a:solidFill>
-                <a:latin typeface="+mn-lt"/>
-                <a:ea typeface="+mn-ea"/>
-                <a:cs typeface="+mn-cs"/>
-              </a:defRPr>
-            </a:lvl1pPr>
-            <a:lvl2pPr marL="625475" indent="-279400" algn="l" rtl="0" eaLnBrk="1" fontAlgn="base" hangingPunct="1">
-              <a:lnSpc>
-                <a:spcPct val="90000"/>
-              </a:lnSpc>
-              <a:spcBef>
-                <a:spcPts val="800"/>
-              </a:spcBef>
-              <a:spcAft>
-                <a:spcPct val="0"/>
-              </a:spcAft>
-              <a:buClr>
-                <a:schemeClr val="tx1"/>
-              </a:buClr>
-              <a:buFont typeface="Arial" charset="0"/>
-              <a:buChar char="–"/>
-              <a:defRPr sz="2000" kern="1200">
-                <a:solidFill>
-                  <a:schemeClr val="tx1"/>
-                </a:solidFill>
-                <a:latin typeface="+mn-lt"/>
-                <a:ea typeface="+mn-ea"/>
-                <a:cs typeface="+mn-cs"/>
-              </a:defRPr>
-            </a:lvl2pPr>
-            <a:lvl3pPr marL="914400" indent="-230188" algn="l" rtl="0" eaLnBrk="1" fontAlgn="base" hangingPunct="1">
-              <a:lnSpc>
-                <a:spcPct val="90000"/>
-              </a:lnSpc>
-              <a:spcBef>
-                <a:spcPts val="800"/>
-              </a:spcBef>
-              <a:spcAft>
-                <a:spcPct val="0"/>
-              </a:spcAft>
-              <a:buClr>
-                <a:schemeClr val="tx1"/>
-              </a:buClr>
-              <a:buFont typeface="Arial" charset="0"/>
-              <a:buChar char="•"/>
-              <a:defRPr sz="1800" kern="1200">
-                <a:solidFill>
-                  <a:schemeClr val="tx1"/>
-                </a:solidFill>
-                <a:latin typeface="+mn-lt"/>
-                <a:ea typeface="+mn-ea"/>
-                <a:cs typeface="+mn-cs"/>
-              </a:defRPr>
-            </a:lvl3pPr>
-            <a:lvl4pPr marL="1144588" indent="-173038" algn="l" rtl="0" eaLnBrk="1" fontAlgn="base" hangingPunct="1">
-              <a:lnSpc>
-                <a:spcPct val="90000"/>
-              </a:lnSpc>
-              <a:spcBef>
-                <a:spcPts val="800"/>
-              </a:spcBef>
-              <a:spcAft>
-                <a:spcPct val="0"/>
-              </a:spcAft>
-              <a:buClr>
-                <a:schemeClr val="tx1"/>
-              </a:buClr>
-              <a:buFont typeface="Arial" charset="0"/>
-              <a:buChar char="–"/>
-              <a:defRPr sz="1600" kern="1200">
-                <a:solidFill>
-                  <a:schemeClr val="tx1"/>
-                </a:solidFill>
-                <a:latin typeface="+mn-lt"/>
-                <a:ea typeface="+mn-ea"/>
-                <a:cs typeface="+mn-cs"/>
-              </a:defRPr>
-            </a:lvl4pPr>
-            <a:lvl5pPr marL="1482725" indent="-222250" algn="l" rtl="0" eaLnBrk="1" fontAlgn="base" hangingPunct="1">
-              <a:lnSpc>
-                <a:spcPct val="90000"/>
-              </a:lnSpc>
-              <a:spcBef>
-                <a:spcPts val="600"/>
-              </a:spcBef>
-              <a:spcAft>
-                <a:spcPct val="0"/>
-              </a:spcAft>
-              <a:buClr>
-                <a:schemeClr val="tx1"/>
-              </a:buClr>
-              <a:buFont typeface="Arial" charset="0"/>
-              <a:buChar char="»"/>
-              <a:defRPr sz="1600" kern="1200">
-                <a:solidFill>
-                  <a:schemeClr val="tx1"/>
-                </a:solidFill>
-                <a:latin typeface="+mn-lt"/>
-                <a:ea typeface="+mn-ea"/>
-                <a:cs typeface="+mn-cs"/>
-              </a:defRPr>
-            </a:lvl5pPr>
-            <a:lvl6pPr marL="2514600" indent="-228600" algn="l" defTabSz="914400" rtl="0" eaLnBrk="1" latinLnBrk="0" hangingPunct="1">
-              <a:spcBef>
-                <a:spcPct val="20000"/>
-              </a:spcBef>
-              <a:buFont typeface="Arial" pitchFamily="34" charset="0"/>
-              <a:buChar char="•"/>
-              <a:defRPr sz="2000" kern="1200">
-                <a:solidFill>
-                  <a:schemeClr val="tx1"/>
-                </a:solidFill>
-                <a:latin typeface="+mn-lt"/>
-                <a:ea typeface="+mn-ea"/>
-                <a:cs typeface="+mn-cs"/>
-              </a:defRPr>
-            </a:lvl6pPr>
-            <a:lvl7pPr marL="2971800" indent="-228600" algn="l" defTabSz="914400" rtl="0" eaLnBrk="1" latinLnBrk="0" hangingPunct="1">
-              <a:spcBef>
-                <a:spcPct val="20000"/>
-              </a:spcBef>
-              <a:buFont typeface="Arial" pitchFamily="34" charset="0"/>
-              <a:buChar char="•"/>
-              <a:defRPr sz="2000" kern="1200">
-                <a:solidFill>
-                  <a:schemeClr val="tx1"/>
-                </a:solidFill>
-                <a:latin typeface="+mn-lt"/>
-                <a:ea typeface="+mn-ea"/>
-                <a:cs typeface="+mn-cs"/>
-              </a:defRPr>
-            </a:lvl7pPr>
-            <a:lvl8pPr marL="3429000" indent="-228600" algn="l" defTabSz="914400" rtl="0" eaLnBrk="1" latinLnBrk="0" hangingPunct="1">
-              <a:spcBef>
-                <a:spcPct val="20000"/>
-              </a:spcBef>
-              <a:buFont typeface="Arial" pitchFamily="34" charset="0"/>
-              <a:buChar char="•"/>
-              <a:defRPr sz="2000" kern="1200">
-                <a:solidFill>
-                  <a:schemeClr val="tx1"/>
-                </a:solidFill>
-                <a:latin typeface="+mn-lt"/>
-                <a:ea typeface="+mn-ea"/>
-                <a:cs typeface="+mn-cs"/>
-              </a:defRPr>
-            </a:lvl8pPr>
-            <a:lvl9pPr marL="3886200" indent="-228600" algn="l" defTabSz="914400" rtl="0" eaLnBrk="1" latinLnBrk="0" hangingPunct="1">
-              <a:spcBef>
-                <a:spcPct val="20000"/>
-              </a:spcBef>
-              <a:buFont typeface="Arial" pitchFamily="34" charset="0"/>
-              <a:buChar char="•"/>
-              <a:defRPr sz="2000" kern="1200">
-                <a:solidFill>
-                  <a:schemeClr val="tx1"/>
-                </a:solidFill>
-                <a:latin typeface="+mn-lt"/>
-                <a:ea typeface="+mn-ea"/>
-                <a:cs typeface="+mn-cs"/>
-              </a:defRPr>
-            </a:lvl9pPr>
-          </a:lstStyle>
-          <a:p>
-            <a:pPr marL="0" indent="0">
-              <a:buNone/>
-            </a:pPr>
-            <a:r>
-              <a:rPr lang="en-US" b="1" u="sng" dirty="0"/>
-              <a:t>Anshu Dubey</a:t>
+          <a:lstStyle/>
+          <a:p>
+            <a:r>
+              <a:rPr lang="en-US" dirty="0"/>
+              <a:t>(she/her)</a:t>
             </a:r>
           </a:p>
         </p:txBody>
       </p:sp>
       <p:sp>
         <p:nvSpPr>
-          <p:cNvPr id="4" name="Text Placeholder 4">
+          <p:cNvPr id="9" name="Text Placeholder 8">
             <a:extLst>
               <a:ext uri="{FF2B5EF4-FFF2-40B4-BE49-F238E27FC236}">
-                <a16:creationId xmlns:a16="http://schemas.microsoft.com/office/drawing/2014/main" id="{A6457CA2-EC79-7239-A61D-5F31A2015901}"/>
+                <a16:creationId xmlns:a16="http://schemas.microsoft.com/office/drawing/2014/main" id="{B73D3AE9-9DC1-97B7-A7C7-B8155E1C52F1}"/>
               </a:ext>
             </a:extLst>
           </p:cNvPr>
-          <p:cNvSpPr txBox="1">
-            <a:spLocks/>
+          <p:cNvSpPr>
+            <a:spLocks noGrp="1"/>
           </p:cNvSpPr>
-          <p:nvPr/>
+          <p:nvPr>
+            <p:ph type="body" sz="quarter" idx="13"/>
+          </p:nvPr>
         </p:nvSpPr>
-        <p:spPr>
-          <a:xfrm>
-            <a:off x="5290491" y="2140952"/>
-            <a:ext cx="1690167" cy="376085"/>
-          </a:xfrm>
-          <a:prstGeom prst="rect">
-            <a:avLst/>
-          </a:prstGeom>
-        </p:spPr>
+        <p:spPr/>
         <p:txBody>
           <a:bodyPr/>
-          <a:lstStyle>
-            <a:lvl1pPr marL="230188" indent="-230188" algn="l" rtl="0" eaLnBrk="1" fontAlgn="base" hangingPunct="1">
-              <a:lnSpc>
-                <a:spcPct val="90000"/>
-              </a:lnSpc>
-              <a:spcBef>
-                <a:spcPts val="1400"/>
-              </a:spcBef>
-              <a:spcAft>
-                <a:spcPct val="0"/>
-              </a:spcAft>
-              <a:buClr>
-                <a:schemeClr val="tx1"/>
-              </a:buClr>
-              <a:buFont typeface="Arial" charset="0"/>
-              <a:buChar char="•"/>
-              <a:defRPr sz="2400" kern="1200">
-                <a:solidFill>
-                  <a:schemeClr val="tx1"/>
-                </a:solidFill>
-                <a:latin typeface="+mn-lt"/>
-                <a:ea typeface="+mn-ea"/>
-                <a:cs typeface="+mn-cs"/>
-              </a:defRPr>
-            </a:lvl1pPr>
-            <a:lvl2pPr marL="625475" indent="-279400" algn="l" rtl="0" eaLnBrk="1" fontAlgn="base" hangingPunct="1">
-              <a:lnSpc>
-                <a:spcPct val="90000"/>
-              </a:lnSpc>
-              <a:spcBef>
-                <a:spcPts val="800"/>
-              </a:spcBef>
-              <a:spcAft>
-                <a:spcPct val="0"/>
-              </a:spcAft>
-              <a:buClr>
-                <a:schemeClr val="tx1"/>
-              </a:buClr>
-              <a:buFont typeface="Arial" charset="0"/>
-              <a:buChar char="–"/>
-              <a:defRPr sz="2000" kern="1200">
-                <a:solidFill>
-                  <a:schemeClr val="tx1"/>
-                </a:solidFill>
-                <a:latin typeface="+mn-lt"/>
-                <a:ea typeface="+mn-ea"/>
-                <a:cs typeface="+mn-cs"/>
-              </a:defRPr>
-            </a:lvl2pPr>
-            <a:lvl3pPr marL="914400" indent="-230188" algn="l" rtl="0" eaLnBrk="1" fontAlgn="base" hangingPunct="1">
-              <a:lnSpc>
-                <a:spcPct val="90000"/>
-              </a:lnSpc>
-              <a:spcBef>
-                <a:spcPts val="800"/>
-              </a:spcBef>
-              <a:spcAft>
-                <a:spcPct val="0"/>
-              </a:spcAft>
-              <a:buClr>
-                <a:schemeClr val="tx1"/>
-              </a:buClr>
-              <a:buFont typeface="Arial" charset="0"/>
-              <a:buChar char="•"/>
-              <a:defRPr sz="1800" kern="1200">
-                <a:solidFill>
-                  <a:schemeClr val="tx1"/>
-                </a:solidFill>
-                <a:latin typeface="+mn-lt"/>
-                <a:ea typeface="+mn-ea"/>
-                <a:cs typeface="+mn-cs"/>
-              </a:defRPr>
-            </a:lvl3pPr>
-            <a:lvl4pPr marL="1144588" indent="-173038" algn="l" rtl="0" eaLnBrk="1" fontAlgn="base" hangingPunct="1">
-              <a:lnSpc>
-                <a:spcPct val="90000"/>
-              </a:lnSpc>
-              <a:spcBef>
-                <a:spcPts val="800"/>
-              </a:spcBef>
-              <a:spcAft>
-                <a:spcPct val="0"/>
-              </a:spcAft>
-              <a:buClr>
-                <a:schemeClr val="tx1"/>
-              </a:buClr>
-              <a:buFont typeface="Arial" charset="0"/>
-              <a:buChar char="–"/>
-              <a:defRPr sz="1600" kern="1200">
-                <a:solidFill>
-                  <a:schemeClr val="tx1"/>
-                </a:solidFill>
-                <a:latin typeface="+mn-lt"/>
-                <a:ea typeface="+mn-ea"/>
-                <a:cs typeface="+mn-cs"/>
-              </a:defRPr>
-            </a:lvl4pPr>
-            <a:lvl5pPr marL="1482725" indent="-222250" algn="l" rtl="0" eaLnBrk="1" fontAlgn="base" hangingPunct="1">
-              <a:lnSpc>
-                <a:spcPct val="90000"/>
-              </a:lnSpc>
-              <a:spcBef>
-                <a:spcPts val="600"/>
-              </a:spcBef>
-              <a:spcAft>
-                <a:spcPct val="0"/>
-              </a:spcAft>
-              <a:buClr>
-                <a:schemeClr val="tx1"/>
-              </a:buClr>
-              <a:buFont typeface="Arial" charset="0"/>
-              <a:buChar char="»"/>
-              <a:defRPr sz="1600" kern="1200">
-                <a:solidFill>
-                  <a:schemeClr val="tx1"/>
-                </a:solidFill>
-                <a:latin typeface="+mn-lt"/>
-                <a:ea typeface="+mn-ea"/>
-                <a:cs typeface="+mn-cs"/>
-              </a:defRPr>
-            </a:lvl5pPr>
-            <a:lvl6pPr marL="2514600" indent="-228600" algn="l" defTabSz="914400" rtl="0" eaLnBrk="1" latinLnBrk="0" hangingPunct="1">
-              <a:spcBef>
-                <a:spcPct val="20000"/>
-              </a:spcBef>
-              <a:buFont typeface="Arial" pitchFamily="34" charset="0"/>
-              <a:buChar char="•"/>
-              <a:defRPr sz="2000" kern="1200">
-                <a:solidFill>
-                  <a:schemeClr val="tx1"/>
-                </a:solidFill>
-                <a:latin typeface="+mn-lt"/>
-                <a:ea typeface="+mn-ea"/>
-                <a:cs typeface="+mn-cs"/>
-              </a:defRPr>
-            </a:lvl6pPr>
-            <a:lvl7pPr marL="2971800" indent="-228600" algn="l" defTabSz="914400" rtl="0" eaLnBrk="1" latinLnBrk="0" hangingPunct="1">
-              <a:spcBef>
-                <a:spcPct val="20000"/>
-              </a:spcBef>
-              <a:buFont typeface="Arial" pitchFamily="34" charset="0"/>
-              <a:buChar char="•"/>
-              <a:defRPr sz="2000" kern="1200">
-                <a:solidFill>
-                  <a:schemeClr val="tx1"/>
-                </a:solidFill>
-                <a:latin typeface="+mn-lt"/>
-                <a:ea typeface="+mn-ea"/>
-                <a:cs typeface="+mn-cs"/>
-              </a:defRPr>
-            </a:lvl7pPr>
-            <a:lvl8pPr marL="3429000" indent="-228600" algn="l" defTabSz="914400" rtl="0" eaLnBrk="1" latinLnBrk="0" hangingPunct="1">
-              <a:spcBef>
-                <a:spcPct val="20000"/>
-              </a:spcBef>
-              <a:buFont typeface="Arial" pitchFamily="34" charset="0"/>
-              <a:buChar char="•"/>
-              <a:defRPr sz="2000" kern="1200">
-                <a:solidFill>
-                  <a:schemeClr val="tx1"/>
-                </a:solidFill>
-                <a:latin typeface="+mn-lt"/>
-                <a:ea typeface="+mn-ea"/>
-                <a:cs typeface="+mn-cs"/>
-              </a:defRPr>
-            </a:lvl8pPr>
-            <a:lvl9pPr marL="3886200" indent="-228600" algn="l" defTabSz="914400" rtl="0" eaLnBrk="1" latinLnBrk="0" hangingPunct="1">
-              <a:spcBef>
-                <a:spcPct val="20000"/>
-              </a:spcBef>
-              <a:buFont typeface="Arial" pitchFamily="34" charset="0"/>
-              <a:buChar char="•"/>
-              <a:defRPr sz="2000" kern="1200">
-                <a:solidFill>
-                  <a:schemeClr val="tx1"/>
-                </a:solidFill>
-                <a:latin typeface="+mn-lt"/>
-                <a:ea typeface="+mn-ea"/>
-                <a:cs typeface="+mn-cs"/>
-              </a:defRPr>
-            </a:lvl9pPr>
-          </a:lstStyle>
-          <a:p>
-            <a:pPr marL="0" indent="0">
-              <a:buNone/>
-            </a:pPr>
-            <a:r>
-              <a:rPr lang="en-US" sz="2000" dirty="0"/>
-              <a:t>(she/her)</a:t>
+          <a:lstStyle/>
+          <a:p>
+            <a:r>
+              <a:rPr lang="en-US" dirty="0"/>
+              <a:t>Argonne National Laboratory</a:t>
             </a:r>
           </a:p>
         </p:txBody>
       </p:sp>
       <p:sp>
         <p:nvSpPr>
-          <p:cNvPr id="5" name="Text Placeholder 5">
+          <p:cNvPr id="10" name="Text Placeholder 9">
             <a:extLst>
               <a:ext uri="{FF2B5EF4-FFF2-40B4-BE49-F238E27FC236}">
-                <a16:creationId xmlns:a16="http://schemas.microsoft.com/office/drawing/2014/main" id="{CF659F22-9FE4-CC84-D3C4-0F7F24393A0A}"/>
+                <a16:creationId xmlns:a16="http://schemas.microsoft.com/office/drawing/2014/main" id="{0782C515-0750-9E3D-2C19-E510E11E1CB0}"/>
               </a:ext>
             </a:extLst>
           </p:cNvPr>
-          <p:cNvSpPr txBox="1">
-            <a:spLocks/>
+          <p:cNvSpPr>
+            <a:spLocks noGrp="1"/>
           </p:cNvSpPr>
-          <p:nvPr/>
+          <p:nvPr>
+            <p:ph type="body" sz="quarter" idx="14"/>
+          </p:nvPr>
+        </p:nvSpPr>
+        <p:spPr/>
+        <p:txBody>
+          <a:bodyPr/>
+          <a:lstStyle/>
+          <a:p>
+            <a:r>
+              <a:rPr lang="en-US" dirty="0"/>
+              <a:t>Better Scientific Software tutorial @ ISC24</a:t>
+            </a:r>
+          </a:p>
+        </p:txBody>
+      </p:sp>
+      <p:sp>
+        <p:nvSpPr>
+          <p:cNvPr id="11" name="Text Placeholder 10">
+            <a:extLst>
+              <a:ext uri="{FF2B5EF4-FFF2-40B4-BE49-F238E27FC236}">
+                <a16:creationId xmlns:a16="http://schemas.microsoft.com/office/drawing/2014/main" id="{F0362F62-5C7E-EE79-280C-5C56945C7D62}"/>
+              </a:ext>
+            </a:extLst>
+          </p:cNvPr>
+          <p:cNvSpPr>
+            <a:spLocks noGrp="1"/>
+          </p:cNvSpPr>
+          <p:nvPr>
+            <p:ph type="body" sz="quarter" idx="15"/>
+          </p:nvPr>
         </p:nvSpPr>
         <p:spPr>
           <a:xfrm>
-            <a:off x="3176924" y="2459716"/>
-            <a:ext cx="8292315" cy="369332"/>
+            <a:off x="3176924" y="3792588"/>
+            <a:ext cx="8292316" cy="646331"/>
           </a:xfrm>
-          <a:prstGeom prst="rect">
-            <a:avLst/>
-          </a:prstGeom>
         </p:spPr>
         <p:txBody>
           <a:bodyPr/>
-          <a:lstStyle>
-            <a:lvl1pPr marL="230188" indent="-230188" algn="l" rtl="0" eaLnBrk="1" fontAlgn="base" hangingPunct="1">
-              <a:lnSpc>
-                <a:spcPct val="90000"/>
-              </a:lnSpc>
-              <a:spcBef>
-                <a:spcPts val="1400"/>
-              </a:spcBef>
-              <a:spcAft>
-                <a:spcPct val="0"/>
-              </a:spcAft>
-              <a:buClr>
-                <a:schemeClr val="tx1"/>
-              </a:buClr>
-              <a:buFont typeface="Arial" charset="0"/>
-              <a:buChar char="•"/>
-              <a:defRPr sz="2400" kern="1200">
-                <a:solidFill>
-                  <a:schemeClr val="tx1"/>
-                </a:solidFill>
+          <a:lstStyle/>
+          <a:p>
+            <a:r>
+              <a:rPr lang="en-US" sz="2000" dirty="0">
                 <a:latin typeface="+mn-lt"/>
-                <a:ea typeface="+mn-ea"/>
-                <a:cs typeface="+mn-cs"/>
-              </a:defRPr>
-            </a:lvl1pPr>
-            <a:lvl2pPr marL="625475" indent="-279400" algn="l" rtl="0" eaLnBrk="1" fontAlgn="base" hangingPunct="1">
-              <a:lnSpc>
-                <a:spcPct val="90000"/>
-              </a:lnSpc>
-              <a:spcBef>
-                <a:spcPts val="800"/>
-              </a:spcBef>
-              <a:spcAft>
-                <a:spcPct val="0"/>
-              </a:spcAft>
-              <a:buClr>
-                <a:schemeClr val="tx1"/>
-              </a:buClr>
-              <a:buFont typeface="Arial" charset="0"/>
-              <a:buChar char="–"/>
-              <a:defRPr sz="2000" kern="1200">
-                <a:solidFill>
-                  <a:schemeClr val="tx1"/>
-                </a:solidFill>
-                <a:latin typeface="+mn-lt"/>
-                <a:ea typeface="+mn-ea"/>
-                <a:cs typeface="+mn-cs"/>
-              </a:defRPr>
-            </a:lvl2pPr>
-            <a:lvl3pPr marL="914400" indent="-230188" algn="l" rtl="0" eaLnBrk="1" fontAlgn="base" hangingPunct="1">
-              <a:lnSpc>
-                <a:spcPct val="90000"/>
-              </a:lnSpc>
-              <a:spcBef>
-                <a:spcPts val="800"/>
-              </a:spcBef>
-              <a:spcAft>
-                <a:spcPct val="0"/>
-              </a:spcAft>
-              <a:buClr>
-                <a:schemeClr val="tx1"/>
-              </a:buClr>
-              <a:buFont typeface="Arial" charset="0"/>
-              <a:buChar char="•"/>
-              <a:defRPr sz="1800" kern="1200">
-                <a:solidFill>
-                  <a:schemeClr val="tx1"/>
-                </a:solidFill>
-                <a:latin typeface="+mn-lt"/>
-                <a:ea typeface="+mn-ea"/>
-                <a:cs typeface="+mn-cs"/>
-              </a:defRPr>
-            </a:lvl3pPr>
-            <a:lvl4pPr marL="1144588" indent="-173038" algn="l" rtl="0" eaLnBrk="1" fontAlgn="base" hangingPunct="1">
-              <a:lnSpc>
-                <a:spcPct val="90000"/>
-              </a:lnSpc>
-              <a:spcBef>
-                <a:spcPts val="800"/>
-              </a:spcBef>
-              <a:spcAft>
-                <a:spcPct val="0"/>
-              </a:spcAft>
-              <a:buClr>
-                <a:schemeClr val="tx1"/>
-              </a:buClr>
-              <a:buFont typeface="Arial" charset="0"/>
-              <a:buChar char="–"/>
-              <a:defRPr sz="1600" kern="1200">
-                <a:solidFill>
-                  <a:schemeClr val="tx1"/>
-                </a:solidFill>
-                <a:latin typeface="+mn-lt"/>
-                <a:ea typeface="+mn-ea"/>
-                <a:cs typeface="+mn-cs"/>
-              </a:defRPr>
-            </a:lvl4pPr>
-            <a:lvl5pPr marL="1482725" indent="-222250" algn="l" rtl="0" eaLnBrk="1" fontAlgn="base" hangingPunct="1">
-              <a:lnSpc>
-                <a:spcPct val="90000"/>
-              </a:lnSpc>
-              <a:spcBef>
-                <a:spcPts val="600"/>
-              </a:spcBef>
-              <a:spcAft>
-                <a:spcPct val="0"/>
-              </a:spcAft>
-              <a:buClr>
-                <a:schemeClr val="tx1"/>
-              </a:buClr>
-              <a:buFont typeface="Arial" charset="0"/>
-              <a:buChar char="»"/>
-              <a:defRPr sz="1600" kern="1200">
-                <a:solidFill>
-                  <a:schemeClr val="tx1"/>
-                </a:solidFill>
-                <a:latin typeface="+mn-lt"/>
-                <a:ea typeface="+mn-ea"/>
-                <a:cs typeface="+mn-cs"/>
-              </a:defRPr>
-            </a:lvl5pPr>
-            <a:lvl6pPr marL="2514600" indent="-228600" algn="l" defTabSz="914400" rtl="0" eaLnBrk="1" latinLnBrk="0" hangingPunct="1">
-              <a:spcBef>
-                <a:spcPct val="20000"/>
-              </a:spcBef>
-              <a:buFont typeface="Arial" pitchFamily="34" charset="0"/>
-              <a:buChar char="•"/>
-              <a:defRPr sz="2000" kern="1200">
-                <a:solidFill>
-                  <a:schemeClr val="tx1"/>
-                </a:solidFill>
-                <a:latin typeface="+mn-lt"/>
-                <a:ea typeface="+mn-ea"/>
-                <a:cs typeface="+mn-cs"/>
-              </a:defRPr>
-            </a:lvl6pPr>
-            <a:lvl7pPr marL="2971800" indent="-228600" algn="l" defTabSz="914400" rtl="0" eaLnBrk="1" latinLnBrk="0" hangingPunct="1">
-              <a:spcBef>
-                <a:spcPct val="20000"/>
-              </a:spcBef>
-              <a:buFont typeface="Arial" pitchFamily="34" charset="0"/>
-              <a:buChar char="•"/>
-              <a:defRPr sz="2000" kern="1200">
-                <a:solidFill>
-                  <a:schemeClr val="tx1"/>
-                </a:solidFill>
-                <a:latin typeface="+mn-lt"/>
-                <a:ea typeface="+mn-ea"/>
-                <a:cs typeface="+mn-cs"/>
-              </a:defRPr>
-            </a:lvl7pPr>
-            <a:lvl8pPr marL="3429000" indent="-228600" algn="l" defTabSz="914400" rtl="0" eaLnBrk="1" latinLnBrk="0" hangingPunct="1">
-              <a:spcBef>
-                <a:spcPct val="20000"/>
-              </a:spcBef>
-              <a:buFont typeface="Arial" pitchFamily="34" charset="0"/>
-              <a:buChar char="•"/>
-              <a:defRPr sz="2000" kern="1200">
-                <a:solidFill>
-                  <a:schemeClr val="tx1"/>
-                </a:solidFill>
-                <a:latin typeface="+mn-lt"/>
-                <a:ea typeface="+mn-ea"/>
-                <a:cs typeface="+mn-cs"/>
-              </a:defRPr>
-            </a:lvl8pPr>
-            <a:lvl9pPr marL="3886200" indent="-228600" algn="l" defTabSz="914400" rtl="0" eaLnBrk="1" latinLnBrk="0" hangingPunct="1">
-              <a:spcBef>
-                <a:spcPct val="20000"/>
-              </a:spcBef>
-              <a:buFont typeface="Arial" pitchFamily="34" charset="0"/>
-              <a:buChar char="•"/>
-              <a:defRPr sz="2000" kern="1200">
-                <a:solidFill>
-                  <a:schemeClr val="tx1"/>
-                </a:solidFill>
-                <a:latin typeface="+mn-lt"/>
-                <a:ea typeface="+mn-ea"/>
-                <a:cs typeface="+mn-cs"/>
-              </a:defRPr>
-            </a:lvl9pPr>
-          </a:lstStyle>
-          <a:p>
-            <a:pPr marL="0" indent="0">
-              <a:buNone/>
-            </a:pPr>
-            <a:r>
-              <a:rPr lang="en-US" sz="2000" dirty="0"/>
-              <a:t>Argonne National Laboratory</a:t>
+              </a:rPr>
+              <a:t>Contributors: Anshu Dubey (ANL), Mark C. Miller (LLNL), David Bernholdt (ORNL) </a:t>
             </a:r>
           </a:p>
         </p:txBody>
@@ -5243,7 +5618,7 @@
     </p:spTree>
     <p:extLst>
       <p:ext uri="{BB962C8B-B14F-4D97-AF65-F5344CB8AC3E}">
-        <p14:creationId xmlns:p14="http://schemas.microsoft.com/office/powerpoint/2010/main" val="2146778437"/>
+        <p14:creationId xmlns:p14="http://schemas.microsoft.com/office/powerpoint/2010/main" val="2052365929"/>
       </p:ext>
     </p:extLst>
   </p:cSld>
@@ -7043,7 +7418,7 @@
           <a:noFill/>
           <a:extLst>
             <a:ext uri="{909E8E84-426E-40dd-AFC4-6F175D3DCCD1}">
-              <a14:hiddenFill xmlns="" xmlns:a14="http://schemas.microsoft.com/office/drawing/2010/main">
+              <a14:hiddenFill xmlns:a14="http://schemas.microsoft.com/office/drawing/2010/main" xmlns="">
                 <a:solidFill>
                   <a:srgbClr val="FFFFFF"/>
                 </a:solidFill>
@@ -11148,8 +11523,8 @@
         </p:nvSpPr>
         <p:spPr>
           <a:xfrm>
-            <a:off x="409507" y="879673"/>
-            <a:ext cx="11369809" cy="5293976"/>
+            <a:off x="409507" y="570111"/>
+            <a:ext cx="11369809" cy="4047778"/>
           </a:xfrm>
         </p:spPr>
         <p:txBody>
@@ -11209,7 +11584,28 @@
                 <a:effectLst/>
                 <a:latin typeface="+mn-lt"/>
               </a:rPr>
-              <a:t>Anshu Dubey, Better Scientific Software tutorial, in ISC High Performance, Hamburg, Germany and online, 2024</a:t>
+              <a:t>Anshu Dubey, Better Scientific Software tutorial, in ISC High Performance (ISC24), Hamburg, Germany, and online, 2024. DOI: </a:t>
+            </a:r>
+            <a:r>
+              <a:rPr lang="en-US" sz="1600" b="0" i="0" u="none" strike="noStrike" dirty="0">
+                <a:solidFill>
+                  <a:srgbClr val="2A7AE2"/>
+                </a:solidFill>
+                <a:effectLst/>
+                <a:latin typeface="+mn-lt"/>
+                <a:hlinkClick r:id="rId4"/>
+              </a:rPr>
+              <a:t>10.6084/m9.figshare.25686426</a:t>
+            </a:r>
+            <a:r>
+              <a:rPr lang="en-US" sz="1600" b="0" i="0" dirty="0">
+                <a:solidFill>
+                  <a:srgbClr val="111111"/>
+                </a:solidFill>
+                <a:effectLst/>
+                <a:latin typeface="+mn-lt"/>
+              </a:rPr>
+              <a:t>.</a:t>
             </a:r>
           </a:p>
           <a:p>
@@ -11218,26 +11614,32 @@
                 <a:spcPts val="400"/>
               </a:spcBef>
             </a:pPr>
-            <a:endParaRPr lang="en-US" sz="1600" dirty="0">
-              <a:solidFill>
-                <a:srgbClr val="111111"/>
-              </a:solidFill>
-              <a:latin typeface="+mn-lt"/>
-            </a:endParaRPr>
-          </a:p>
-          <a:p>
-            <a:pPr>
-              <a:spcBef>
-                <a:spcPts val="400"/>
-              </a:spcBef>
-            </a:pPr>
-            <a:endParaRPr lang="en-US" sz="1600" b="0" i="0" dirty="0">
-              <a:solidFill>
-                <a:srgbClr val="111111"/>
-              </a:solidFill>
-              <a:effectLst/>
-              <a:latin typeface="+mn-lt"/>
-            </a:endParaRPr>
+            <a:r>
+              <a:rPr lang="en-US" sz="1600" dirty="0"/>
+              <a:t>Individual modules may be cited as </a:t>
+            </a:r>
+            <a:r>
+              <a:rPr lang="en-US" sz="1600" i="1" dirty="0"/>
+              <a:t>Speaker, Module Title</a:t>
+            </a:r>
+            <a:r>
+              <a:rPr lang="en-US" sz="1600" dirty="0"/>
+              <a:t>, in </a:t>
+            </a:r>
+            <a:r>
+              <a:rPr lang="en-US" sz="1600" b="0" i="1" dirty="0">
+                <a:solidFill>
+                  <a:srgbClr val="111111"/>
+                </a:solidFill>
+                <a:effectLst/>
+                <a:latin typeface="+mn-lt"/>
+              </a:rPr>
+              <a:t>Tutorial Title</a:t>
+            </a:r>
+            <a:r>
+              <a:rPr lang="en-US" sz="1600" dirty="0"/>
+              <a:t>, …</a:t>
+            </a:r>
           </a:p>
           <a:p>
             <a:pPr marL="0" indent="0">
@@ -11257,7 +11659,14 @@
                 <a:spcPts val="400"/>
               </a:spcBef>
             </a:pPr>
-            <a:endParaRPr lang="en-US" sz="1400" dirty="0"/>
+            <a:r>
+              <a:rPr lang="en-US" sz="1400" dirty="0"/>
+              <a:t>This work was supported by the U.S. Department of Energy Office of Science, Office of Advanced Scientific Computing Research (ASCR), and by the Exascale Computing Project (17-SC-20-SC), a collaborative effort of the U.S. Department of Energy Office of Science and the National Nuclear Security Administration</a:t>
+            </a:r>
+            <a:r>
+              <a:rPr lang="en-US" sz="1400" i="1" dirty="0"/>
+              <a:t>.</a:t>
+            </a:r>
           </a:p>
           <a:p>
             <a:pPr>
@@ -11266,14 +11675,12 @@
               </a:spcBef>
             </a:pPr>
             <a:r>
-              <a:rPr lang="en-US" sz="1400" dirty="0"/>
-              <a:t>Material included in these presentation is derived from work supported by the U.S. Department of Energy Office of Science, Office of Advanced Scientific Computing Research (ASCR), and by the Exascale Computing Project (17-SC-20-SC), a collaborative effort of the U.S. Department of Energy Office of Science and the National Nuclear Security Administration</a:t>
-            </a:r>
-            <a:r>
-              <a:rPr lang="en-US" sz="1400" i="1" dirty="0"/>
-              <a:t>.</a:t>
-            </a:r>
-            <a:endParaRPr lang="en-US" sz="1400" dirty="0"/>
+              <a:rPr lang="en-US" sz="1400" b="0" i="0" dirty="0">
+                <a:effectLst/>
+                <a:latin typeface="+mn-lt"/>
+              </a:rPr>
+              <a:t>This work was supported by the U.S. Department of Energy, Office of Science, Office of Advanced Scientific Computing Research, Next-Generation Scientific Software Technologies (NGSST) program.</a:t>
+            </a:r>
           </a:p>
           <a:p>
             <a:pPr>
@@ -11281,7 +11688,10 @@
                 <a:spcPts val="400"/>
               </a:spcBef>
             </a:pPr>
-            <a:endParaRPr lang="en-US" sz="1400" dirty="0"/>
+            <a:r>
+              <a:rPr lang="en-US" sz="1400" dirty="0"/>
+              <a:t>This work was performed in part at the Argonne National Laboratory, which is managed by UChicago Argonne, LLC for the U.S. Department of Energy under Contract No. DE-AC02-06CH11357.</a:t>
+            </a:r>
           </a:p>
           <a:p>
             <a:pPr>
@@ -11291,7 +11701,7 @@
             </a:pPr>
             <a:r>
               <a:rPr lang="en-US" sz="1400" dirty="0"/>
-              <a:t>This work was performed in part at the Argonne National Laboratory, which is managed by UChicago Argonne, LLC for the U.S. Department of Energy under Contract No. DE-AC02-06CH11357.</a:t>
+              <a:t>This work was performed in part at the Lawrence Livermore National Laboratory, which is managed by Lawrence Livermore National Security, LLC for the U.S. Department of Energy under Contract No. DE-AC52-07NA27344.</a:t>
             </a:r>
           </a:p>
           <a:p>
@@ -11300,7 +11710,10 @@
                 <a:spcPts val="400"/>
               </a:spcBef>
             </a:pPr>
-            <a:endParaRPr lang="en-US" sz="1400" dirty="0"/>
+            <a:r>
+              <a:rPr lang="en-US" sz="1400" dirty="0"/>
+              <a:t>This work was performed in part at the Los Alamos National Laboratory, which is managed by Triad National Security, LLC for the U.S. Department of Energy under Contract No.89233218CNA000001</a:t>
+            </a:r>
           </a:p>
           <a:p>
             <a:pPr>
@@ -11319,15 +11732,10 @@
                 <a:spcPts val="400"/>
               </a:spcBef>
             </a:pPr>
-            <a:endParaRPr lang="en-US" sz="1400" dirty="0"/>
-          </a:p>
-          <a:p>
-            <a:pPr>
-              <a:spcBef>
-                <a:spcPts val="400"/>
-              </a:spcBef>
-            </a:pPr>
-            <a:endParaRPr lang="en-US" sz="1400" dirty="0"/>
+            <a:r>
+              <a:rPr lang="en-US" sz="1400" dirty="0"/>
+              <a:t>This work was performed in part at Sandia National Laboratories. Sandia National Laboratories is a multi-mission laboratory managed and operated by National Technology and Engineering Solutions of Sandia, LLC., a wholly owned subsidiary of Honeywell International, Inc., for the U.S. Department of Energy’s National Nuclear Security Administration under contract DE-NA0003525.</a:t>
+            </a:r>
           </a:p>
         </p:txBody>
       </p:sp>
@@ -11346,7 +11754,7 @@
           <p:nvPr/>
         </p:nvPicPr>
         <p:blipFill>
-          <a:blip r:embed="rId4">
+          <a:blip r:embed="rId5">
             <a:extLst>
               <a:ext uri="{28A0092B-C50C-407E-A947-70E740481C1C}">
                 <a14:useLocalDpi xmlns:a14="http://schemas.microsoft.com/office/drawing/2010/main" val="0"/>
@@ -11381,7 +11789,7 @@
     </p:spTree>
     <p:extLst>
       <p:ext uri="{BB962C8B-B14F-4D97-AF65-F5344CB8AC3E}">
-        <p14:creationId xmlns:p14="http://schemas.microsoft.com/office/powerpoint/2010/main" val="300521932"/>
+        <p14:creationId xmlns:p14="http://schemas.microsoft.com/office/powerpoint/2010/main" val="978726433"/>
       </p:ext>
     </p:extLst>
   </p:cSld>
@@ -21944,7 +22352,7 @@
               <a:effectLst/>
               <a:extLst>
                 <a:ext uri="{C572A759-6A51-4108-AA02-DFA0A04FC94B}">
-                  <ma14:wrappingTextBoxFlag xmlns="" xmlns:m="http://schemas.openxmlformats.org/officeDocument/2006/math" xmlns:a14="http://schemas.microsoft.com/office/drawing/2010/main" xmlns:ma14="http://schemas.microsoft.com/office/mac/drawingml/2011/main" val="1"/>
+                  <ma14:wrappingTextBoxFlag xmlns:ma14="http://schemas.microsoft.com/office/mac/drawingml/2011/main" xmlns:a14="http://schemas.microsoft.com/office/drawing/2010/main" xmlns:m="http://schemas.openxmlformats.org/officeDocument/2006/math" xmlns="" val="1"/>
                 </a:ext>
               </a:extLst>
             </p:spPr>
@@ -22061,7 +22469,7 @@
               <a:effectLst/>
               <a:extLst>
                 <a:ext uri="{C572A759-6A51-4108-AA02-DFA0A04FC94B}">
-                  <ma14:wrappingTextBoxFlag xmlns="" xmlns:m="http://schemas.openxmlformats.org/officeDocument/2006/math" xmlns:a14="http://schemas.microsoft.com/office/drawing/2010/main" xmlns:ma14="http://schemas.microsoft.com/office/mac/drawingml/2011/main" val="1"/>
+                  <ma14:wrappingTextBoxFlag xmlns:ma14="http://schemas.microsoft.com/office/mac/drawingml/2011/main" xmlns:a14="http://schemas.microsoft.com/office/drawing/2010/main" xmlns:m="http://schemas.openxmlformats.org/officeDocument/2006/math" xmlns="" val="1"/>
                 </a:ext>
               </a:extLst>
             </p:spPr>
@@ -22191,7 +22599,7 @@
               <a:effectLst/>
               <a:extLst>
                 <a:ext uri="{C572A759-6A51-4108-AA02-DFA0A04FC94B}">
-                  <ma14:wrappingTextBoxFlag xmlns="" xmlns:m="http://schemas.openxmlformats.org/officeDocument/2006/math" xmlns:a14="http://schemas.microsoft.com/office/drawing/2010/main" xmlns:ma14="http://schemas.microsoft.com/office/mac/drawingml/2011/main" val="1"/>
+                  <ma14:wrappingTextBoxFlag xmlns:ma14="http://schemas.microsoft.com/office/mac/drawingml/2011/main" xmlns:a14="http://schemas.microsoft.com/office/drawing/2010/main" xmlns:m="http://schemas.openxmlformats.org/officeDocument/2006/math" xmlns="" val="1"/>
                 </a:ext>
               </a:extLst>
             </p:spPr>
@@ -22316,7 +22724,7 @@
               <a:effectLst/>
               <a:extLst>
                 <a:ext uri="{C572A759-6A51-4108-AA02-DFA0A04FC94B}">
-                  <ma14:wrappingTextBoxFlag xmlns="" xmlns:m="http://schemas.openxmlformats.org/officeDocument/2006/math" xmlns:a14="http://schemas.microsoft.com/office/drawing/2010/main" xmlns:ma14="http://schemas.microsoft.com/office/mac/drawingml/2011/main" val="1"/>
+                  <ma14:wrappingTextBoxFlag xmlns:ma14="http://schemas.microsoft.com/office/mac/drawingml/2011/main" xmlns:a14="http://schemas.microsoft.com/office/drawing/2010/main" xmlns:m="http://schemas.openxmlformats.org/officeDocument/2006/math" xmlns="" val="1"/>
                 </a:ext>
               </a:extLst>
             </p:spPr>
@@ -22473,7 +22881,7 @@
               <a:effectLst/>
               <a:extLst>
                 <a:ext uri="{C572A759-6A51-4108-AA02-DFA0A04FC94B}">
-                  <ma14:wrappingTextBoxFlag xmlns="" xmlns:m="http://schemas.openxmlformats.org/officeDocument/2006/math" xmlns:a14="http://schemas.microsoft.com/office/drawing/2010/main" xmlns:ma14="http://schemas.microsoft.com/office/mac/drawingml/2011/main" val="1"/>
+                  <ma14:wrappingTextBoxFlag xmlns:ma14="http://schemas.microsoft.com/office/mac/drawingml/2011/main" xmlns:a14="http://schemas.microsoft.com/office/drawing/2010/main" xmlns:m="http://schemas.openxmlformats.org/officeDocument/2006/math" xmlns="" val="1"/>
                 </a:ext>
               </a:extLst>
             </p:spPr>
@@ -22593,7 +23001,7 @@
               <a:effectLst/>
               <a:extLst>
                 <a:ext uri="{C572A759-6A51-4108-AA02-DFA0A04FC94B}">
-                  <ma14:wrappingTextBoxFlag xmlns="" xmlns:m="http://schemas.openxmlformats.org/officeDocument/2006/math" xmlns:a14="http://schemas.microsoft.com/office/drawing/2010/main" xmlns:ma14="http://schemas.microsoft.com/office/mac/drawingml/2011/main" val="1"/>
+                  <ma14:wrappingTextBoxFlag xmlns:ma14="http://schemas.microsoft.com/office/mac/drawingml/2011/main" xmlns:a14="http://schemas.microsoft.com/office/drawing/2010/main" xmlns:m="http://schemas.openxmlformats.org/officeDocument/2006/math" xmlns="" val="1"/>
                 </a:ext>
               </a:extLst>
             </p:spPr>
@@ -22721,7 +23129,7 @@
               <a:effectLst/>
               <a:extLst>
                 <a:ext uri="{C572A759-6A51-4108-AA02-DFA0A04FC94B}">
-                  <ma14:wrappingTextBoxFlag xmlns="" xmlns:m="http://schemas.openxmlformats.org/officeDocument/2006/math" xmlns:a14="http://schemas.microsoft.com/office/drawing/2010/main" xmlns:ma14="http://schemas.microsoft.com/office/mac/drawingml/2011/main" val="1"/>
+                  <ma14:wrappingTextBoxFlag xmlns:ma14="http://schemas.microsoft.com/office/mac/drawingml/2011/main" xmlns:a14="http://schemas.microsoft.com/office/drawing/2010/main" xmlns:m="http://schemas.openxmlformats.org/officeDocument/2006/math" xmlns="" val="1"/>
                 </a:ext>
               </a:extLst>
             </p:spPr>
@@ -22850,7 +23258,7 @@
               <a:effectLst/>
               <a:extLst>
                 <a:ext uri="{C572A759-6A51-4108-AA02-DFA0A04FC94B}">
-                  <ma14:wrappingTextBoxFlag xmlns="" xmlns:m="http://schemas.openxmlformats.org/officeDocument/2006/math" xmlns:a14="http://schemas.microsoft.com/office/drawing/2010/main" xmlns:ma14="http://schemas.microsoft.com/office/mac/drawingml/2011/main" val="1"/>
+                  <ma14:wrappingTextBoxFlag xmlns:ma14="http://schemas.microsoft.com/office/mac/drawingml/2011/main" xmlns:a14="http://schemas.microsoft.com/office/drawing/2010/main" xmlns:m="http://schemas.openxmlformats.org/officeDocument/2006/math" xmlns="" val="1"/>
                 </a:ext>
               </a:extLst>
             </p:spPr>
@@ -23027,7 +23435,7 @@
               <a:effectLst/>
               <a:extLst>
                 <a:ext uri="{C572A759-6A51-4108-AA02-DFA0A04FC94B}">
-                  <ma14:wrappingTextBoxFlag xmlns="" xmlns:m="http://schemas.openxmlformats.org/officeDocument/2006/math" xmlns:a14="http://schemas.microsoft.com/office/drawing/2010/main" xmlns:ma14="http://schemas.microsoft.com/office/mac/drawingml/2011/main" val="1"/>
+                  <ma14:wrappingTextBoxFlag xmlns:ma14="http://schemas.microsoft.com/office/mac/drawingml/2011/main" xmlns:a14="http://schemas.microsoft.com/office/drawing/2010/main" xmlns:m="http://schemas.openxmlformats.org/officeDocument/2006/math" xmlns="" val="1"/>
                 </a:ext>
               </a:extLst>
             </p:spPr>
@@ -23144,7 +23552,7 @@
               <a:effectLst/>
               <a:extLst>
                 <a:ext uri="{C572A759-6A51-4108-AA02-DFA0A04FC94B}">
-                  <ma14:wrappingTextBoxFlag xmlns="" xmlns:m="http://schemas.openxmlformats.org/officeDocument/2006/math" xmlns:a14="http://schemas.microsoft.com/office/drawing/2010/main" xmlns:ma14="http://schemas.microsoft.com/office/mac/drawingml/2011/main" val="1"/>
+                  <ma14:wrappingTextBoxFlag xmlns:ma14="http://schemas.microsoft.com/office/mac/drawingml/2011/main" xmlns:a14="http://schemas.microsoft.com/office/drawing/2010/main" xmlns:m="http://schemas.openxmlformats.org/officeDocument/2006/math" xmlns="" val="1"/>
                 </a:ext>
               </a:extLst>
             </p:spPr>
@@ -23273,7 +23681,7 @@
               <a:effectLst/>
               <a:extLst>
                 <a:ext uri="{C572A759-6A51-4108-AA02-DFA0A04FC94B}">
-                  <ma14:wrappingTextBoxFlag xmlns="" xmlns:m="http://schemas.openxmlformats.org/officeDocument/2006/math" xmlns:a14="http://schemas.microsoft.com/office/drawing/2010/main" xmlns:ma14="http://schemas.microsoft.com/office/mac/drawingml/2011/main" val="1"/>
+                  <ma14:wrappingTextBoxFlag xmlns:ma14="http://schemas.microsoft.com/office/mac/drawingml/2011/main" xmlns:a14="http://schemas.microsoft.com/office/drawing/2010/main" xmlns:m="http://schemas.openxmlformats.org/officeDocument/2006/math" xmlns="" val="1"/>
                 </a:ext>
               </a:extLst>
             </p:spPr>
@@ -23396,7 +23804,7 @@
               <a:effectLst/>
               <a:extLst>
                 <a:ext uri="{C572A759-6A51-4108-AA02-DFA0A04FC94B}">
-                  <ma14:wrappingTextBoxFlag xmlns="" xmlns:m="http://schemas.openxmlformats.org/officeDocument/2006/math" xmlns:a14="http://schemas.microsoft.com/office/drawing/2010/main" xmlns:ma14="http://schemas.microsoft.com/office/mac/drawingml/2011/main" val="1"/>
+                  <ma14:wrappingTextBoxFlag xmlns:ma14="http://schemas.microsoft.com/office/mac/drawingml/2011/main" xmlns:a14="http://schemas.microsoft.com/office/drawing/2010/main" xmlns:m="http://schemas.openxmlformats.org/officeDocument/2006/math" xmlns="" val="1"/>
                 </a:ext>
               </a:extLst>
             </p:spPr>
@@ -24003,7 +24411,7 @@
               <a:effectLst/>
               <a:extLst>
                 <a:ext uri="{C572A759-6A51-4108-AA02-DFA0A04FC94B}">
-                  <ma14:wrappingTextBoxFlag xmlns="" xmlns:m="http://schemas.openxmlformats.org/officeDocument/2006/math" xmlns:a14="http://schemas.microsoft.com/office/drawing/2010/main" xmlns:ma14="http://schemas.microsoft.com/office/mac/drawingml/2011/main" val="1"/>
+                  <ma14:wrappingTextBoxFlag xmlns:ma14="http://schemas.microsoft.com/office/mac/drawingml/2011/main" xmlns:a14="http://schemas.microsoft.com/office/drawing/2010/main" xmlns:m="http://schemas.openxmlformats.org/officeDocument/2006/math" xmlns="" val="1"/>
                 </a:ext>
               </a:extLst>
             </p:spPr>
@@ -24137,7 +24545,7 @@
               <a:effectLst/>
               <a:extLst>
                 <a:ext uri="{C572A759-6A51-4108-AA02-DFA0A04FC94B}">
-                  <ma14:wrappingTextBoxFlag xmlns="" xmlns:m="http://schemas.openxmlformats.org/officeDocument/2006/math" xmlns:a14="http://schemas.microsoft.com/office/drawing/2010/main" xmlns:ma14="http://schemas.microsoft.com/office/mac/drawingml/2011/main" val="1"/>
+                  <ma14:wrappingTextBoxFlag xmlns:ma14="http://schemas.microsoft.com/office/mac/drawingml/2011/main" xmlns:a14="http://schemas.microsoft.com/office/drawing/2010/main" xmlns:m="http://schemas.openxmlformats.org/officeDocument/2006/math" xmlns="" val="1"/>
                 </a:ext>
               </a:extLst>
             </p:spPr>
@@ -24254,7 +24662,7 @@
               <a:effectLst/>
               <a:extLst>
                 <a:ext uri="{C572A759-6A51-4108-AA02-DFA0A04FC94B}">
-                  <ma14:wrappingTextBoxFlag xmlns="" xmlns:m="http://schemas.openxmlformats.org/officeDocument/2006/math" xmlns:a14="http://schemas.microsoft.com/office/drawing/2010/main" xmlns:ma14="http://schemas.microsoft.com/office/mac/drawingml/2011/main" val="1"/>
+                  <ma14:wrappingTextBoxFlag xmlns:ma14="http://schemas.microsoft.com/office/mac/drawingml/2011/main" xmlns:a14="http://schemas.microsoft.com/office/drawing/2010/main" xmlns:m="http://schemas.openxmlformats.org/officeDocument/2006/math" xmlns="" val="1"/>
                 </a:ext>
               </a:extLst>
             </p:spPr>
@@ -24387,7 +24795,7 @@
               <a:effectLst/>
               <a:extLst>
                 <a:ext uri="{C572A759-6A51-4108-AA02-DFA0A04FC94B}">
-                  <ma14:wrappingTextBoxFlag xmlns="" xmlns:m="http://schemas.openxmlformats.org/officeDocument/2006/math" xmlns:a14="http://schemas.microsoft.com/office/drawing/2010/main" xmlns:ma14="http://schemas.microsoft.com/office/mac/drawingml/2011/main" val="1"/>
+                  <ma14:wrappingTextBoxFlag xmlns:ma14="http://schemas.microsoft.com/office/mac/drawingml/2011/main" xmlns:a14="http://schemas.microsoft.com/office/drawing/2010/main" xmlns:m="http://schemas.openxmlformats.org/officeDocument/2006/math" xmlns="" val="1"/>
                 </a:ext>
               </a:extLst>
             </p:spPr>
@@ -29078,18 +29486,18 @@
 </file>
 
 <file path=customXml/item1.xml><?xml version="1.0" encoding="utf-8"?>
-<p:properties xmlns:p="http://schemas.microsoft.com/office/2006/metadata/properties" xmlns:xsi="http://www.w3.org/2001/XMLSchema-instance" xmlns:pc="http://schemas.microsoft.com/office/infopath/2007/PartnerControls">
-  <documentManagement/>
-</p:properties>
-</file>
-
-<file path=customXml/item2.xml><?xml version="1.0" encoding="utf-8"?>
 <?mso-contentType ?>
 <FormTemplates xmlns="http://schemas.microsoft.com/sharepoint/v3/contenttype/forms">
   <Display>DocumentLibraryForm</Display>
   <Edit>DocumentLibraryForm</Edit>
   <New>DocumentLibraryForm</New>
 </FormTemplates>
+</file>
+
+<file path=customXml/item2.xml><?xml version="1.0" encoding="utf-8"?>
+<p:properties xmlns:p="http://schemas.microsoft.com/office/2006/metadata/properties" xmlns:xsi="http://www.w3.org/2001/XMLSchema-instance" xmlns:pc="http://schemas.microsoft.com/office/infopath/2007/PartnerControls">
+  <documentManagement/>
+</p:properties>
 </file>
 
 <file path=customXml/item3.xml><?xml version="1.0" encoding="utf-8"?>
@@ -29142,6 +29550,14 @@
 </file>
 
 <file path=customXml/itemProps1.xml><?xml version="1.0" encoding="utf-8"?>
+<ds:datastoreItem xmlns:ds="http://schemas.openxmlformats.org/officeDocument/2006/customXml" ds:itemID="{19E20559-B232-4371-8690-E3D8007EDB82}">
+  <ds:schemaRefs>
+    <ds:schemaRef ds:uri="http://schemas.microsoft.com/sharepoint/v3/contenttype/forms"/>
+  </ds:schemaRefs>
+</ds:datastoreItem>
+</file>
+
+<file path=customXml/itemProps2.xml><?xml version="1.0" encoding="utf-8"?>
 <ds:datastoreItem xmlns:ds="http://schemas.openxmlformats.org/officeDocument/2006/customXml" ds:itemID="{A50EC660-24D0-43A0-AE5E-E274115E726B}">
   <ds:schemaRefs>
     <ds:schemaRef ds:uri="http://purl.org/dc/elements/1.1/"/>
@@ -29152,14 +29568,6 @@
     <ds:schemaRef ds:uri="http://www.w3.org/XML/1998/namespace"/>
     <ds:schemaRef ds:uri="http://purl.org/dc/dcmitype/"/>
     <ds:schemaRef ds:uri="http://schemas.microsoft.com/office/infopath/2007/PartnerControls"/>
-  </ds:schemaRefs>
-</ds:datastoreItem>
-</file>
-
-<file path=customXml/itemProps2.xml><?xml version="1.0" encoding="utf-8"?>
-<ds:datastoreItem xmlns:ds="http://schemas.openxmlformats.org/officeDocument/2006/customXml" ds:itemID="{19E20559-B232-4371-8690-E3D8007EDB82}">
-  <ds:schemaRefs>
-    <ds:schemaRef ds:uri="http://schemas.microsoft.com/sharepoint/v3/contenttype/forms"/>
   </ds:schemaRefs>
 </ds:datastoreItem>
 </file>

</xml_diff>